<commit_message>
updated arch, added submission pdf
</commit_message>
<xml_diff>
--- a/figs/figs.pptx
+++ b/figs/figs.pptx
@@ -6,6 +6,7 @@
   </p:sldMasterIdLst>
   <p:sldIdLst>
     <p:sldId id="256" r:id="rId2"/>
+    <p:sldId id="257" r:id="rId3"/>
   </p:sldIdLst>
   <p:sldSz cx="9144000" cy="6858000" type="screen4x3"/>
   <p:notesSz cx="6858000" cy="9144000"/>
@@ -104,6 +105,22 @@
       </a:defRPr>
     </a:lvl9pPr>
   </p:defaultTextStyle>
+  <p:extLst>
+    <p:ext uri="{EFAFB233-063F-42B5-8137-9DF3F51BA10A}">
+      <p15:sldGuideLst xmlns:p15="http://schemas.microsoft.com/office/powerpoint/2012/main">
+        <p15:guide id="1" orient="horz" pos="2160">
+          <p15:clr>
+            <a:srgbClr val="A4A3A4"/>
+          </p15:clr>
+        </p15:guide>
+        <p15:guide id="2" pos="2880">
+          <p15:clr>
+            <a:srgbClr val="A4A3A4"/>
+          </p15:clr>
+        </p15:guide>
+      </p15:sldGuideLst>
+    </p:ext>
+  </p:extLst>
 </p:presentation>
 </file>
 
@@ -288,7 +305,7 @@
           <a:p>
             <a:fld id="{73A4B2A3-D9DC-064E-90FE-771C025222F9}" type="datetimeFigureOut">
               <a:rPr lang="en-US" smtClean="0"/>
-              <a:t>7/15/15</a:t>
+              <a:t>9/30/15</a:t>
             </a:fld>
             <a:endParaRPr lang="en-US"/>
           </a:p>
@@ -458,7 +475,7 @@
           <a:p>
             <a:fld id="{73A4B2A3-D9DC-064E-90FE-771C025222F9}" type="datetimeFigureOut">
               <a:rPr lang="en-US" smtClean="0"/>
-              <a:t>7/15/15</a:t>
+              <a:t>9/30/15</a:t>
             </a:fld>
             <a:endParaRPr lang="en-US"/>
           </a:p>
@@ -638,7 +655,7 @@
           <a:p>
             <a:fld id="{73A4B2A3-D9DC-064E-90FE-771C025222F9}" type="datetimeFigureOut">
               <a:rPr lang="en-US" smtClean="0"/>
-              <a:t>7/15/15</a:t>
+              <a:t>9/30/15</a:t>
             </a:fld>
             <a:endParaRPr lang="en-US"/>
           </a:p>
@@ -808,7 +825,7 @@
           <a:p>
             <a:fld id="{73A4B2A3-D9DC-064E-90FE-771C025222F9}" type="datetimeFigureOut">
               <a:rPr lang="en-US" smtClean="0"/>
-              <a:t>7/15/15</a:t>
+              <a:t>9/30/15</a:t>
             </a:fld>
             <a:endParaRPr lang="en-US"/>
           </a:p>
@@ -1054,7 +1071,7 @@
           <a:p>
             <a:fld id="{73A4B2A3-D9DC-064E-90FE-771C025222F9}" type="datetimeFigureOut">
               <a:rPr lang="en-US" smtClean="0"/>
-              <a:t>7/15/15</a:t>
+              <a:t>9/30/15</a:t>
             </a:fld>
             <a:endParaRPr lang="en-US"/>
           </a:p>
@@ -1342,7 +1359,7 @@
           <a:p>
             <a:fld id="{73A4B2A3-D9DC-064E-90FE-771C025222F9}" type="datetimeFigureOut">
               <a:rPr lang="en-US" smtClean="0"/>
-              <a:t>7/15/15</a:t>
+              <a:t>9/30/15</a:t>
             </a:fld>
             <a:endParaRPr lang="en-US"/>
           </a:p>
@@ -1764,7 +1781,7 @@
           <a:p>
             <a:fld id="{73A4B2A3-D9DC-064E-90FE-771C025222F9}" type="datetimeFigureOut">
               <a:rPr lang="en-US" smtClean="0"/>
-              <a:t>7/15/15</a:t>
+              <a:t>9/30/15</a:t>
             </a:fld>
             <a:endParaRPr lang="en-US"/>
           </a:p>
@@ -1882,7 +1899,7 @@
           <a:p>
             <a:fld id="{73A4B2A3-D9DC-064E-90FE-771C025222F9}" type="datetimeFigureOut">
               <a:rPr lang="en-US" smtClean="0"/>
-              <a:t>7/15/15</a:t>
+              <a:t>9/30/15</a:t>
             </a:fld>
             <a:endParaRPr lang="en-US"/>
           </a:p>
@@ -1977,7 +1994,7 @@
           <a:p>
             <a:fld id="{73A4B2A3-D9DC-064E-90FE-771C025222F9}" type="datetimeFigureOut">
               <a:rPr lang="en-US" smtClean="0"/>
-              <a:t>7/15/15</a:t>
+              <a:t>9/30/15</a:t>
             </a:fld>
             <a:endParaRPr lang="en-US"/>
           </a:p>
@@ -2254,7 +2271,7 @@
           <a:p>
             <a:fld id="{73A4B2A3-D9DC-064E-90FE-771C025222F9}" type="datetimeFigureOut">
               <a:rPr lang="en-US" smtClean="0"/>
-              <a:t>7/15/15</a:t>
+              <a:t>9/30/15</a:t>
             </a:fld>
             <a:endParaRPr lang="en-US"/>
           </a:p>
@@ -2507,7 +2524,7 @@
           <a:p>
             <a:fld id="{73A4B2A3-D9DC-064E-90FE-771C025222F9}" type="datetimeFigureOut">
               <a:rPr lang="en-US" smtClean="0"/>
-              <a:t>7/15/15</a:t>
+              <a:t>9/30/15</a:t>
             </a:fld>
             <a:endParaRPr lang="en-US"/>
           </a:p>
@@ -2720,7 +2737,7 @@
           <a:p>
             <a:fld id="{73A4B2A3-D9DC-064E-90FE-771C025222F9}" type="datetimeFigureOut">
               <a:rPr lang="en-US" smtClean="0"/>
-              <a:t>7/15/15</a:t>
+              <a:t>9/30/15</a:t>
             </a:fld>
             <a:endParaRPr lang="en-US"/>
           </a:p>
@@ -4308,17 +4325,7 @@
                   <a:latin typeface="Gill Sans"/>
                   <a:cs typeface="Gill Sans"/>
                 </a:rPr>
-                <a:t>Best </a:t>
-              </a:r>
-              <a:r>
-                <a:rPr lang="en-US" sz="1600" dirty="0" smtClean="0">
-                  <a:solidFill>
-                    <a:schemeClr val="tx1"/>
-                  </a:solidFill>
-                  <a:latin typeface="Gill Sans"/>
-                  <a:cs typeface="Gill Sans"/>
-                </a:rPr>
-                <a:t>Model</a:t>
+                <a:t>Best Model</a:t>
               </a:r>
               <a:endParaRPr lang="en-US" sz="1600" dirty="0">
                 <a:solidFill>
@@ -5142,6 +5149,1212 @@
 </p:sld>
 </file>
 
+<file path=ppt/slides/slide2.xml><?xml version="1.0" encoding="utf-8"?>
+<p:sld xmlns:a="http://schemas.openxmlformats.org/drawingml/2006/main" xmlns:r="http://schemas.openxmlformats.org/officeDocument/2006/relationships" xmlns:p="http://schemas.openxmlformats.org/presentationml/2006/main">
+  <p:cSld>
+    <p:spTree>
+      <p:nvGrpSpPr>
+        <p:cNvPr id="1" name=""/>
+        <p:cNvGrpSpPr/>
+        <p:nvPr/>
+      </p:nvGrpSpPr>
+      <p:grpSpPr>
+        <a:xfrm>
+          <a:off x="0" y="0"/>
+          <a:ext cx="0" cy="0"/>
+          <a:chOff x="0" y="0"/>
+          <a:chExt cx="0" cy="0"/>
+        </a:xfrm>
+      </p:grpSpPr>
+      <p:sp>
+        <p:nvSpPr>
+          <p:cNvPr id="76" name="Rectangle 75"/>
+          <p:cNvSpPr/>
+          <p:nvPr/>
+        </p:nvSpPr>
+        <p:spPr>
+          <a:xfrm>
+            <a:off x="2163901" y="1556951"/>
+            <a:ext cx="4780596" cy="2586681"/>
+          </a:xfrm>
+          <a:prstGeom prst="rect">
+            <a:avLst/>
+          </a:prstGeom>
+          <a:solidFill>
+            <a:schemeClr val="bg1"/>
+          </a:solidFill>
+          <a:ln w="28575" cmpd="sng">
+            <a:solidFill>
+              <a:schemeClr val="bg1">
+                <a:lumMod val="50000"/>
+              </a:schemeClr>
+            </a:solidFill>
+          </a:ln>
+          <a:effectLst/>
+        </p:spPr>
+        <p:style>
+          <a:lnRef idx="1">
+            <a:schemeClr val="accent1"/>
+          </a:lnRef>
+          <a:fillRef idx="3">
+            <a:schemeClr val="accent1"/>
+          </a:fillRef>
+          <a:effectRef idx="2">
+            <a:schemeClr val="accent1"/>
+          </a:effectRef>
+          <a:fontRef idx="minor">
+            <a:schemeClr val="lt1"/>
+          </a:fontRef>
+        </p:style>
+        <p:txBody>
+          <a:bodyPr rtlCol="0" anchor="t"/>
+          <a:lstStyle/>
+          <a:p>
+            <a:r>
+              <a:rPr lang="en-US" sz="2000" dirty="0" err="1" smtClean="0">
+                <a:solidFill>
+                  <a:schemeClr val="tx1"/>
+                </a:solidFill>
+                <a:latin typeface="Helvetica Neue Thin" charset="0"/>
+                <a:ea typeface="Helvetica Neue Thin" charset="0"/>
+                <a:cs typeface="Helvetica Neue Thin" charset="0"/>
+              </a:rPr>
+              <a:t>ActiveClean</a:t>
+            </a:r>
+            <a:endParaRPr lang="en-US" sz="2000" dirty="0">
+              <a:solidFill>
+                <a:schemeClr val="tx1"/>
+              </a:solidFill>
+              <a:latin typeface="Helvetica Neue Thin" charset="0"/>
+              <a:ea typeface="Helvetica Neue Thin" charset="0"/>
+              <a:cs typeface="Helvetica Neue Thin" charset="0"/>
+            </a:endParaRPr>
+          </a:p>
+        </p:txBody>
+      </p:sp>
+      <p:sp>
+        <p:nvSpPr>
+          <p:cNvPr id="81" name="Rectangle 80"/>
+          <p:cNvSpPr/>
+          <p:nvPr/>
+        </p:nvSpPr>
+        <p:spPr>
+          <a:xfrm>
+            <a:off x="2421404" y="2527092"/>
+            <a:ext cx="1250732" cy="729102"/>
+          </a:xfrm>
+          <a:prstGeom prst="rect">
+            <a:avLst/>
+          </a:prstGeom>
+          <a:solidFill>
+            <a:schemeClr val="bg1"/>
+          </a:solidFill>
+          <a:ln w="28575" cmpd="sng">
+            <a:solidFill>
+              <a:schemeClr val="bg1">
+                <a:lumMod val="50000"/>
+              </a:schemeClr>
+            </a:solidFill>
+          </a:ln>
+          <a:effectLst/>
+        </p:spPr>
+        <p:style>
+          <a:lnRef idx="1">
+            <a:schemeClr val="accent1"/>
+          </a:lnRef>
+          <a:fillRef idx="3">
+            <a:schemeClr val="accent1"/>
+          </a:fillRef>
+          <a:effectRef idx="2">
+            <a:schemeClr val="accent1"/>
+          </a:effectRef>
+          <a:fontRef idx="minor">
+            <a:schemeClr val="lt1"/>
+          </a:fontRef>
+        </p:style>
+        <p:txBody>
+          <a:bodyPr rtlCol="0" anchor="t"/>
+          <a:lstStyle/>
+          <a:p>
+            <a:pPr algn="ctr"/>
+            <a:r>
+              <a:rPr lang="en-US" sz="1400" dirty="0" smtClean="0">
+                <a:solidFill>
+                  <a:schemeClr val="bg1">
+                    <a:lumMod val="50000"/>
+                  </a:schemeClr>
+                </a:solidFill>
+                <a:latin typeface="Gill Sans"/>
+                <a:cs typeface="Gill Sans"/>
+              </a:rPr>
+              <a:t>Sampler</a:t>
+            </a:r>
+            <a:endParaRPr lang="en-US" sz="1400" dirty="0">
+              <a:solidFill>
+                <a:schemeClr val="bg1">
+                  <a:lumMod val="50000"/>
+                </a:schemeClr>
+              </a:solidFill>
+              <a:latin typeface="Gill Sans"/>
+              <a:cs typeface="Gill Sans"/>
+            </a:endParaRPr>
+          </a:p>
+        </p:txBody>
+      </p:sp>
+      <p:sp>
+        <p:nvSpPr>
+          <p:cNvPr id="82" name="Rectangle 81"/>
+          <p:cNvSpPr/>
+          <p:nvPr/>
+        </p:nvSpPr>
+        <p:spPr>
+          <a:xfrm>
+            <a:off x="2525831" y="2831405"/>
+            <a:ext cx="1050157" cy="316986"/>
+          </a:xfrm>
+          <a:prstGeom prst="rect">
+            <a:avLst/>
+          </a:prstGeom>
+          <a:solidFill>
+            <a:schemeClr val="bg1"/>
+          </a:solidFill>
+          <a:ln w="28575" cmpd="sng">
+            <a:solidFill>
+              <a:schemeClr val="bg1">
+                <a:lumMod val="50000"/>
+              </a:schemeClr>
+            </a:solidFill>
+            <a:prstDash val="sysDot"/>
+          </a:ln>
+          <a:effectLst/>
+        </p:spPr>
+        <p:style>
+          <a:lnRef idx="1">
+            <a:schemeClr val="accent1"/>
+          </a:lnRef>
+          <a:fillRef idx="3">
+            <a:schemeClr val="accent1"/>
+          </a:fillRef>
+          <a:effectRef idx="2">
+            <a:schemeClr val="accent1"/>
+          </a:effectRef>
+          <a:fontRef idx="minor">
+            <a:schemeClr val="lt1"/>
+          </a:fontRef>
+        </p:style>
+        <p:txBody>
+          <a:bodyPr rtlCol="0" anchor="ctr"/>
+          <a:lstStyle/>
+          <a:p>
+            <a:pPr algn="ctr"/>
+            <a:r>
+              <a:rPr lang="en-US" sz="1400" dirty="0" smtClean="0">
+                <a:solidFill>
+                  <a:schemeClr val="bg1">
+                    <a:lumMod val="50000"/>
+                  </a:schemeClr>
+                </a:solidFill>
+                <a:latin typeface="Gill Sans"/>
+                <a:cs typeface="Gill Sans"/>
+              </a:rPr>
+              <a:t>Detectors</a:t>
+            </a:r>
+            <a:endParaRPr lang="en-US" sz="1400" dirty="0">
+              <a:solidFill>
+                <a:schemeClr val="bg1">
+                  <a:lumMod val="50000"/>
+                </a:schemeClr>
+              </a:solidFill>
+              <a:latin typeface="Gill Sans"/>
+              <a:cs typeface="Gill Sans"/>
+            </a:endParaRPr>
+          </a:p>
+        </p:txBody>
+      </p:sp>
+      <p:sp>
+        <p:nvSpPr>
+          <p:cNvPr id="83" name="Rectangle 82"/>
+          <p:cNvSpPr/>
+          <p:nvPr/>
+        </p:nvSpPr>
+        <p:spPr>
+          <a:xfrm>
+            <a:off x="3963784" y="2535412"/>
+            <a:ext cx="894517" cy="713415"/>
+          </a:xfrm>
+          <a:prstGeom prst="rect">
+            <a:avLst/>
+          </a:prstGeom>
+          <a:solidFill>
+            <a:schemeClr val="bg1"/>
+          </a:solidFill>
+          <a:ln w="28575" cmpd="sng">
+            <a:solidFill>
+              <a:schemeClr val="bg1">
+                <a:lumMod val="50000"/>
+              </a:schemeClr>
+            </a:solidFill>
+          </a:ln>
+          <a:effectLst/>
+        </p:spPr>
+        <p:style>
+          <a:lnRef idx="1">
+            <a:schemeClr val="accent1"/>
+          </a:lnRef>
+          <a:fillRef idx="3">
+            <a:schemeClr val="accent1"/>
+          </a:fillRef>
+          <a:effectRef idx="2">
+            <a:schemeClr val="accent1"/>
+          </a:effectRef>
+          <a:fontRef idx="minor">
+            <a:schemeClr val="lt1"/>
+          </a:fontRef>
+        </p:style>
+        <p:txBody>
+          <a:bodyPr rtlCol="0" anchor="ctr"/>
+          <a:lstStyle/>
+          <a:p>
+            <a:pPr algn="ctr"/>
+            <a:r>
+              <a:rPr lang="en-US" sz="1400" dirty="0" smtClean="0">
+                <a:solidFill>
+                  <a:schemeClr val="bg1">
+                    <a:lumMod val="50000"/>
+                  </a:schemeClr>
+                </a:solidFill>
+                <a:latin typeface="Gill Sans"/>
+                <a:cs typeface="Gill Sans"/>
+              </a:rPr>
+              <a:t>Cleaner</a:t>
+            </a:r>
+            <a:endParaRPr lang="en-US" sz="1400" dirty="0">
+              <a:solidFill>
+                <a:schemeClr val="bg1">
+                  <a:lumMod val="50000"/>
+                </a:schemeClr>
+              </a:solidFill>
+              <a:latin typeface="Gill Sans"/>
+              <a:cs typeface="Gill Sans"/>
+            </a:endParaRPr>
+          </a:p>
+        </p:txBody>
+      </p:sp>
+      <p:sp>
+        <p:nvSpPr>
+          <p:cNvPr id="84" name="Rectangle 83"/>
+          <p:cNvSpPr/>
+          <p:nvPr/>
+        </p:nvSpPr>
+        <p:spPr>
+          <a:xfrm>
+            <a:off x="3963784" y="1926990"/>
+            <a:ext cx="894517" cy="342123"/>
+          </a:xfrm>
+          <a:prstGeom prst="rect">
+            <a:avLst/>
+          </a:prstGeom>
+          <a:solidFill>
+            <a:schemeClr val="bg1"/>
+          </a:solidFill>
+          <a:ln w="28575" cmpd="sng">
+            <a:solidFill>
+              <a:schemeClr val="bg1">
+                <a:lumMod val="50000"/>
+              </a:schemeClr>
+            </a:solidFill>
+            <a:prstDash val="sysDot"/>
+          </a:ln>
+          <a:effectLst/>
+        </p:spPr>
+        <p:style>
+          <a:lnRef idx="1">
+            <a:schemeClr val="accent1"/>
+          </a:lnRef>
+          <a:fillRef idx="3">
+            <a:schemeClr val="accent1"/>
+          </a:fillRef>
+          <a:effectRef idx="2">
+            <a:schemeClr val="accent1"/>
+          </a:effectRef>
+          <a:fontRef idx="minor">
+            <a:schemeClr val="lt1"/>
+          </a:fontRef>
+        </p:style>
+        <p:txBody>
+          <a:bodyPr rtlCol="0" anchor="ctr"/>
+          <a:lstStyle/>
+          <a:p>
+            <a:pPr algn="ctr"/>
+            <a:r>
+              <a:rPr lang="en-US" sz="1400" dirty="0" smtClean="0">
+                <a:solidFill>
+                  <a:schemeClr val="bg1">
+                    <a:lumMod val="50000"/>
+                  </a:schemeClr>
+                </a:solidFill>
+                <a:latin typeface="Gill Sans"/>
+                <a:cs typeface="Gill Sans"/>
+              </a:rPr>
+              <a:t>Estimator</a:t>
+            </a:r>
+            <a:endParaRPr lang="en-US" sz="1400" dirty="0">
+              <a:solidFill>
+                <a:schemeClr val="bg1">
+                  <a:lumMod val="50000"/>
+                </a:schemeClr>
+              </a:solidFill>
+              <a:latin typeface="Gill Sans"/>
+              <a:cs typeface="Gill Sans"/>
+            </a:endParaRPr>
+          </a:p>
+        </p:txBody>
+      </p:sp>
+      <p:sp>
+        <p:nvSpPr>
+          <p:cNvPr id="85" name="Can 84"/>
+          <p:cNvSpPr/>
+          <p:nvPr/>
+        </p:nvSpPr>
+        <p:spPr>
+          <a:xfrm>
+            <a:off x="806313" y="2535413"/>
+            <a:ext cx="1129870" cy="756745"/>
+          </a:xfrm>
+          <a:prstGeom prst="can">
+            <a:avLst/>
+          </a:prstGeom>
+          <a:solidFill>
+            <a:schemeClr val="bg1"/>
+          </a:solidFill>
+          <a:ln w="28575" cmpd="sng">
+            <a:solidFill>
+              <a:schemeClr val="bg1">
+                <a:lumMod val="50000"/>
+              </a:schemeClr>
+            </a:solidFill>
+          </a:ln>
+          <a:effectLst/>
+        </p:spPr>
+        <p:style>
+          <a:lnRef idx="1">
+            <a:schemeClr val="accent1"/>
+          </a:lnRef>
+          <a:fillRef idx="3">
+            <a:schemeClr val="accent1"/>
+          </a:fillRef>
+          <a:effectRef idx="2">
+            <a:schemeClr val="accent1"/>
+          </a:effectRef>
+          <a:fontRef idx="minor">
+            <a:schemeClr val="lt1"/>
+          </a:fontRef>
+        </p:style>
+        <p:txBody>
+          <a:bodyPr rtlCol="0" anchor="ctr"/>
+          <a:lstStyle/>
+          <a:p>
+            <a:pPr algn="ctr"/>
+            <a:r>
+              <a:rPr lang="en-US" sz="1400" dirty="0" smtClean="0">
+                <a:solidFill>
+                  <a:schemeClr val="bg1">
+                    <a:lumMod val="50000"/>
+                  </a:schemeClr>
+                </a:solidFill>
+                <a:latin typeface="Gill Sans"/>
+                <a:cs typeface="Gill Sans"/>
+              </a:rPr>
+              <a:t>Dirty Data</a:t>
+            </a:r>
+            <a:endParaRPr lang="en-US" sz="1400" dirty="0">
+              <a:solidFill>
+                <a:schemeClr val="bg1">
+                  <a:lumMod val="50000"/>
+                </a:schemeClr>
+              </a:solidFill>
+              <a:latin typeface="Gill Sans"/>
+              <a:cs typeface="Gill Sans"/>
+            </a:endParaRPr>
+          </a:p>
+        </p:txBody>
+      </p:sp>
+      <p:cxnSp>
+        <p:nvCxnSpPr>
+          <p:cNvPr id="86" name="Straight Arrow Connector 85"/>
+          <p:cNvCxnSpPr>
+            <a:stCxn id="85" idx="4"/>
+            <a:endCxn id="81" idx="1"/>
+          </p:cNvCxnSpPr>
+          <p:nvPr/>
+        </p:nvCxnSpPr>
+        <p:spPr>
+          <a:xfrm flipV="1">
+            <a:off x="1936183" y="2891643"/>
+            <a:ext cx="485221" cy="22143"/>
+          </a:xfrm>
+          <a:prstGeom prst="straightConnector1">
+            <a:avLst/>
+          </a:prstGeom>
+          <a:ln w="28575" cmpd="sng">
+            <a:solidFill>
+              <a:srgbClr val="7F7F7F"/>
+            </a:solidFill>
+            <a:headEnd type="none"/>
+            <a:tailEnd type="triangle"/>
+          </a:ln>
+          <a:effectLst/>
+        </p:spPr>
+        <p:style>
+          <a:lnRef idx="2">
+            <a:schemeClr val="accent1"/>
+          </a:lnRef>
+          <a:fillRef idx="0">
+            <a:schemeClr val="accent1"/>
+          </a:fillRef>
+          <a:effectRef idx="1">
+            <a:schemeClr val="accent1"/>
+          </a:effectRef>
+          <a:fontRef idx="minor">
+            <a:schemeClr val="tx1"/>
+          </a:fontRef>
+        </p:style>
+      </p:cxnSp>
+      <p:cxnSp>
+        <p:nvCxnSpPr>
+          <p:cNvPr id="87" name="Straight Arrow Connector 86"/>
+          <p:cNvCxnSpPr>
+            <a:stCxn id="2" idx="0"/>
+            <a:endCxn id="44" idx="3"/>
+          </p:cNvCxnSpPr>
+          <p:nvPr/>
+        </p:nvCxnSpPr>
+        <p:spPr>
+          <a:xfrm>
+            <a:off x="1916652" y="3744058"/>
+            <a:ext cx="3685081" cy="0"/>
+          </a:xfrm>
+          <a:prstGeom prst="straightConnector1">
+            <a:avLst/>
+          </a:prstGeom>
+          <a:ln w="28575" cmpd="sng">
+            <a:solidFill>
+              <a:srgbClr val="7F7F7F"/>
+            </a:solidFill>
+            <a:headEnd type="none"/>
+            <a:tailEnd type="triangle"/>
+          </a:ln>
+          <a:effectLst/>
+        </p:spPr>
+        <p:style>
+          <a:lnRef idx="2">
+            <a:schemeClr val="accent1"/>
+          </a:lnRef>
+          <a:fillRef idx="0">
+            <a:schemeClr val="accent1"/>
+          </a:fillRef>
+          <a:effectRef idx="1">
+            <a:schemeClr val="accent1"/>
+          </a:effectRef>
+          <a:fontRef idx="minor">
+            <a:schemeClr val="tx1"/>
+          </a:fontRef>
+        </p:style>
+      </p:cxnSp>
+      <p:cxnSp>
+        <p:nvCxnSpPr>
+          <p:cNvPr id="88" name="Straight Arrow Connector 87"/>
+          <p:cNvCxnSpPr>
+            <a:stCxn id="85" idx="3"/>
+          </p:cNvCxnSpPr>
+          <p:nvPr/>
+        </p:nvCxnSpPr>
+        <p:spPr>
+          <a:xfrm>
+            <a:off x="1371248" y="3292158"/>
+            <a:ext cx="4471" cy="373702"/>
+          </a:xfrm>
+          <a:prstGeom prst="straightConnector1">
+            <a:avLst/>
+          </a:prstGeom>
+          <a:ln w="28575" cmpd="sng">
+            <a:solidFill>
+              <a:srgbClr val="7F7F7F"/>
+            </a:solidFill>
+            <a:headEnd type="none"/>
+            <a:tailEnd type="triangle"/>
+          </a:ln>
+          <a:effectLst/>
+        </p:spPr>
+        <p:style>
+          <a:lnRef idx="2">
+            <a:schemeClr val="accent1"/>
+          </a:lnRef>
+          <a:fillRef idx="0">
+            <a:schemeClr val="accent1"/>
+          </a:fillRef>
+          <a:effectRef idx="1">
+            <a:schemeClr val="accent1"/>
+          </a:effectRef>
+          <a:fontRef idx="minor">
+            <a:schemeClr val="tx1"/>
+          </a:fontRef>
+        </p:style>
+      </p:cxnSp>
+      <p:cxnSp>
+        <p:nvCxnSpPr>
+          <p:cNvPr id="89" name="Straight Arrow Connector 88"/>
+          <p:cNvCxnSpPr>
+            <a:stCxn id="81" idx="3"/>
+            <a:endCxn id="83" idx="1"/>
+          </p:cNvCxnSpPr>
+          <p:nvPr/>
+        </p:nvCxnSpPr>
+        <p:spPr>
+          <a:xfrm>
+            <a:off x="3672136" y="2891643"/>
+            <a:ext cx="291648" cy="477"/>
+          </a:xfrm>
+          <a:prstGeom prst="straightConnector1">
+            <a:avLst/>
+          </a:prstGeom>
+          <a:ln w="28575" cmpd="sng">
+            <a:solidFill>
+              <a:srgbClr val="7F7F7F"/>
+            </a:solidFill>
+            <a:headEnd type="none"/>
+            <a:tailEnd type="triangle"/>
+          </a:ln>
+          <a:effectLst/>
+        </p:spPr>
+        <p:style>
+          <a:lnRef idx="2">
+            <a:schemeClr val="accent1"/>
+          </a:lnRef>
+          <a:fillRef idx="0">
+            <a:schemeClr val="accent1"/>
+          </a:fillRef>
+          <a:effectRef idx="1">
+            <a:schemeClr val="accent1"/>
+          </a:effectRef>
+          <a:fontRef idx="minor">
+            <a:schemeClr val="tx1"/>
+          </a:fontRef>
+        </p:style>
+      </p:cxnSp>
+      <p:cxnSp>
+        <p:nvCxnSpPr>
+          <p:cNvPr id="90" name="Straight Arrow Connector 89"/>
+          <p:cNvCxnSpPr>
+            <a:stCxn id="83" idx="3"/>
+            <a:endCxn id="54" idx="1"/>
+          </p:cNvCxnSpPr>
+          <p:nvPr/>
+        </p:nvCxnSpPr>
+        <p:spPr>
+          <a:xfrm>
+            <a:off x="4858301" y="2892120"/>
+            <a:ext cx="828645" cy="1"/>
+          </a:xfrm>
+          <a:prstGeom prst="straightConnector1">
+            <a:avLst/>
+          </a:prstGeom>
+          <a:ln w="28575" cmpd="sng">
+            <a:solidFill>
+              <a:srgbClr val="7F7F7F"/>
+            </a:solidFill>
+            <a:headEnd type="none"/>
+            <a:tailEnd type="triangle"/>
+          </a:ln>
+          <a:effectLst/>
+        </p:spPr>
+        <p:style>
+          <a:lnRef idx="2">
+            <a:schemeClr val="accent1"/>
+          </a:lnRef>
+          <a:fillRef idx="0">
+            <a:schemeClr val="accent1"/>
+          </a:fillRef>
+          <a:effectRef idx="1">
+            <a:schemeClr val="accent1"/>
+          </a:effectRef>
+          <a:fontRef idx="minor">
+            <a:schemeClr val="tx1"/>
+          </a:fontRef>
+        </p:style>
+      </p:cxnSp>
+      <p:cxnSp>
+        <p:nvCxnSpPr>
+          <p:cNvPr id="91" name="Elbow Connector 90"/>
+          <p:cNvCxnSpPr>
+            <a:stCxn id="54" idx="0"/>
+            <a:endCxn id="84" idx="3"/>
+          </p:cNvCxnSpPr>
+          <p:nvPr/>
+        </p:nvCxnSpPr>
+        <p:spPr>
+          <a:xfrm rot="16200000" flipV="1">
+            <a:off x="5296559" y="1659794"/>
+            <a:ext cx="437362" cy="1313878"/>
+          </a:xfrm>
+          <a:prstGeom prst="bentConnector2">
+            <a:avLst/>
+          </a:prstGeom>
+          <a:ln w="28575" cmpd="sng">
+            <a:solidFill>
+              <a:schemeClr val="bg1">
+                <a:lumMod val="50000"/>
+              </a:schemeClr>
+            </a:solidFill>
+            <a:headEnd type="none"/>
+            <a:tailEnd type="triangle"/>
+          </a:ln>
+          <a:effectLst/>
+        </p:spPr>
+        <p:style>
+          <a:lnRef idx="2">
+            <a:schemeClr val="accent1"/>
+          </a:lnRef>
+          <a:fillRef idx="0">
+            <a:schemeClr val="accent1"/>
+          </a:fillRef>
+          <a:effectRef idx="1">
+            <a:schemeClr val="accent1"/>
+          </a:effectRef>
+          <a:fontRef idx="minor">
+            <a:schemeClr val="tx1"/>
+          </a:fontRef>
+        </p:style>
+      </p:cxnSp>
+      <p:cxnSp>
+        <p:nvCxnSpPr>
+          <p:cNvPr id="93" name="Straight Arrow Connector 92"/>
+          <p:cNvCxnSpPr>
+            <a:stCxn id="54" idx="2"/>
+          </p:cNvCxnSpPr>
+          <p:nvPr/>
+        </p:nvCxnSpPr>
+        <p:spPr>
+          <a:xfrm flipH="1">
+            <a:off x="6170143" y="3248828"/>
+            <a:ext cx="2036" cy="417032"/>
+          </a:xfrm>
+          <a:prstGeom prst="straightConnector1">
+            <a:avLst/>
+          </a:prstGeom>
+          <a:ln w="28575" cmpd="sng">
+            <a:solidFill>
+              <a:srgbClr val="7F7F7F"/>
+            </a:solidFill>
+            <a:headEnd type="none"/>
+            <a:tailEnd type="triangle"/>
+          </a:ln>
+          <a:effectLst/>
+        </p:spPr>
+        <p:style>
+          <a:lnRef idx="2">
+            <a:schemeClr val="accent1"/>
+          </a:lnRef>
+          <a:fillRef idx="0">
+            <a:schemeClr val="accent1"/>
+          </a:fillRef>
+          <a:effectRef idx="1">
+            <a:schemeClr val="accent1"/>
+          </a:effectRef>
+          <a:fontRef idx="minor">
+            <a:schemeClr val="tx1"/>
+          </a:fontRef>
+        </p:style>
+      </p:cxnSp>
+      <p:sp>
+        <p:nvSpPr>
+          <p:cNvPr id="2" name="Hexagon 1"/>
+          <p:cNvSpPr/>
+          <p:nvPr/>
+        </p:nvSpPr>
+        <p:spPr>
+          <a:xfrm>
+            <a:off x="806065" y="3509338"/>
+            <a:ext cx="1110587" cy="469440"/>
+          </a:xfrm>
+          <a:prstGeom prst="hexagon">
+            <a:avLst/>
+          </a:prstGeom>
+          <a:solidFill>
+            <a:schemeClr val="bg1"/>
+          </a:solidFill>
+          <a:ln w="28575">
+            <a:solidFill>
+              <a:schemeClr val="bg1">
+                <a:lumMod val="50000"/>
+              </a:schemeClr>
+            </a:solidFill>
+          </a:ln>
+          <a:effectLst/>
+        </p:spPr>
+        <p:style>
+          <a:lnRef idx="1">
+            <a:schemeClr val="accent1"/>
+          </a:lnRef>
+          <a:fillRef idx="3">
+            <a:schemeClr val="accent1"/>
+          </a:fillRef>
+          <a:effectRef idx="2">
+            <a:schemeClr val="accent1"/>
+          </a:effectRef>
+          <a:fontRef idx="minor">
+            <a:schemeClr val="lt1"/>
+          </a:fontRef>
+        </p:style>
+        <p:txBody>
+          <a:bodyPr rtlCol="0" anchor="ctr"/>
+          <a:lstStyle/>
+          <a:p>
+            <a:pPr algn="ctr"/>
+            <a:r>
+              <a:rPr lang="en-US" sz="1400" dirty="0" smtClean="0">
+                <a:solidFill>
+                  <a:schemeClr val="bg1">
+                    <a:lumMod val="50000"/>
+                  </a:schemeClr>
+                </a:solidFill>
+                <a:latin typeface="Gill Sans" charset="0"/>
+                <a:ea typeface="Gill Sans" charset="0"/>
+                <a:cs typeface="Gill Sans" charset="0"/>
+              </a:rPr>
+              <a:t>Dirty</a:t>
+            </a:r>
+          </a:p>
+          <a:p>
+            <a:pPr algn="ctr"/>
+            <a:r>
+              <a:rPr lang="en-US" sz="1400" dirty="0" smtClean="0">
+                <a:solidFill>
+                  <a:schemeClr val="bg1">
+                    <a:lumMod val="50000"/>
+                  </a:schemeClr>
+                </a:solidFill>
+                <a:latin typeface="Gill Sans" charset="0"/>
+                <a:ea typeface="Gill Sans" charset="0"/>
+                <a:cs typeface="Gill Sans" charset="0"/>
+              </a:rPr>
+              <a:t>Model</a:t>
+            </a:r>
+            <a:endParaRPr lang="en-US" sz="1400" dirty="0">
+              <a:solidFill>
+                <a:schemeClr val="bg1">
+                  <a:lumMod val="50000"/>
+                </a:schemeClr>
+              </a:solidFill>
+              <a:latin typeface="Gill Sans" charset="0"/>
+              <a:ea typeface="Gill Sans" charset="0"/>
+              <a:cs typeface="Gill Sans" charset="0"/>
+            </a:endParaRPr>
+          </a:p>
+        </p:txBody>
+      </p:sp>
+      <p:sp>
+        <p:nvSpPr>
+          <p:cNvPr id="18" name="TextBox 17"/>
+          <p:cNvSpPr txBox="1"/>
+          <p:nvPr/>
+        </p:nvSpPr>
+        <p:spPr>
+          <a:xfrm>
+            <a:off x="4858302" y="2616016"/>
+            <a:ext cx="832279" cy="523220"/>
+          </a:xfrm>
+          <a:prstGeom prst="rect">
+            <a:avLst/>
+          </a:prstGeom>
+          <a:noFill/>
+        </p:spPr>
+        <p:txBody>
+          <a:bodyPr wrap="none" rtlCol="0">
+            <a:spAutoFit/>
+          </a:bodyPr>
+          <a:lstStyle/>
+          <a:p>
+            <a:pPr algn="ctr"/>
+            <a:r>
+              <a:rPr lang="en-US" sz="1400" dirty="0" smtClean="0">
+                <a:solidFill>
+                  <a:schemeClr val="bg1">
+                    <a:lumMod val="50000"/>
+                  </a:schemeClr>
+                </a:solidFill>
+                <a:latin typeface="Gill Sans" charset="0"/>
+                <a:ea typeface="Gill Sans" charset="0"/>
+                <a:cs typeface="Gill Sans" charset="0"/>
+              </a:rPr>
+              <a:t>Cleaned </a:t>
+            </a:r>
+          </a:p>
+          <a:p>
+            <a:pPr algn="ctr"/>
+            <a:r>
+              <a:rPr lang="en-US" sz="1400" dirty="0" smtClean="0">
+                <a:solidFill>
+                  <a:schemeClr val="bg1">
+                    <a:lumMod val="50000"/>
+                  </a:schemeClr>
+                </a:solidFill>
+                <a:latin typeface="Gill Sans" charset="0"/>
+                <a:ea typeface="Gill Sans" charset="0"/>
+                <a:cs typeface="Gill Sans" charset="0"/>
+              </a:rPr>
+              <a:t>Samples</a:t>
+            </a:r>
+            <a:endParaRPr lang="en-US" sz="1400" dirty="0">
+              <a:solidFill>
+                <a:schemeClr val="bg1">
+                  <a:lumMod val="50000"/>
+                </a:schemeClr>
+              </a:solidFill>
+              <a:latin typeface="Gill Sans" charset="0"/>
+              <a:ea typeface="Gill Sans" charset="0"/>
+              <a:cs typeface="Gill Sans" charset="0"/>
+            </a:endParaRPr>
+          </a:p>
+        </p:txBody>
+      </p:sp>
+      <p:sp>
+        <p:nvSpPr>
+          <p:cNvPr id="54" name="Rectangle 53"/>
+          <p:cNvSpPr/>
+          <p:nvPr/>
+        </p:nvSpPr>
+        <p:spPr>
+          <a:xfrm>
+            <a:off x="5686946" y="2535414"/>
+            <a:ext cx="970465" cy="713414"/>
+          </a:xfrm>
+          <a:prstGeom prst="rect">
+            <a:avLst/>
+          </a:prstGeom>
+          <a:solidFill>
+            <a:schemeClr val="bg1"/>
+          </a:solidFill>
+          <a:ln w="28575" cmpd="sng">
+            <a:solidFill>
+              <a:schemeClr val="bg1">
+                <a:lumMod val="50000"/>
+              </a:schemeClr>
+            </a:solidFill>
+          </a:ln>
+          <a:effectLst/>
+        </p:spPr>
+        <p:style>
+          <a:lnRef idx="1">
+            <a:schemeClr val="accent1"/>
+          </a:lnRef>
+          <a:fillRef idx="3">
+            <a:schemeClr val="accent1"/>
+          </a:fillRef>
+          <a:effectRef idx="2">
+            <a:schemeClr val="accent1"/>
+          </a:effectRef>
+          <a:fontRef idx="minor">
+            <a:schemeClr val="lt1"/>
+          </a:fontRef>
+        </p:style>
+        <p:txBody>
+          <a:bodyPr rtlCol="0" anchor="ctr"/>
+          <a:lstStyle/>
+          <a:p>
+            <a:pPr algn="ctr"/>
+            <a:r>
+              <a:rPr lang="en-US" sz="1400" dirty="0" smtClean="0">
+                <a:solidFill>
+                  <a:schemeClr val="bg1">
+                    <a:lumMod val="50000"/>
+                  </a:schemeClr>
+                </a:solidFill>
+                <a:latin typeface="Gill Sans"/>
+                <a:cs typeface="Gill Sans"/>
+              </a:rPr>
+              <a:t>Updater</a:t>
+            </a:r>
+            <a:endParaRPr lang="en-US" sz="1400" dirty="0">
+              <a:solidFill>
+                <a:schemeClr val="bg1">
+                  <a:lumMod val="50000"/>
+                </a:schemeClr>
+              </a:solidFill>
+              <a:latin typeface="Gill Sans"/>
+              <a:cs typeface="Gill Sans"/>
+            </a:endParaRPr>
+          </a:p>
+        </p:txBody>
+      </p:sp>
+      <p:cxnSp>
+        <p:nvCxnSpPr>
+          <p:cNvPr id="65" name="Elbow Connector 64"/>
+          <p:cNvCxnSpPr>
+            <a:stCxn id="84" idx="1"/>
+            <a:endCxn id="81" idx="0"/>
+          </p:cNvCxnSpPr>
+          <p:nvPr/>
+        </p:nvCxnSpPr>
+        <p:spPr>
+          <a:xfrm rot="10800000" flipV="1">
+            <a:off x="3046770" y="2098052"/>
+            <a:ext cx="917014" cy="429040"/>
+          </a:xfrm>
+          <a:prstGeom prst="bentConnector2">
+            <a:avLst/>
+          </a:prstGeom>
+          <a:ln w="28575" cmpd="sng">
+            <a:solidFill>
+              <a:schemeClr val="bg1">
+                <a:lumMod val="50000"/>
+              </a:schemeClr>
+            </a:solidFill>
+            <a:headEnd type="none"/>
+            <a:tailEnd type="triangle"/>
+          </a:ln>
+          <a:effectLst/>
+        </p:spPr>
+        <p:style>
+          <a:lnRef idx="2">
+            <a:schemeClr val="accent1"/>
+          </a:lnRef>
+          <a:fillRef idx="0">
+            <a:schemeClr val="accent1"/>
+          </a:fillRef>
+          <a:effectRef idx="1">
+            <a:schemeClr val="accent1"/>
+          </a:effectRef>
+          <a:fontRef idx="minor">
+            <a:schemeClr val="tx1"/>
+          </a:fontRef>
+        </p:style>
+      </p:cxnSp>
+      <p:sp>
+        <p:nvSpPr>
+          <p:cNvPr id="98" name="Hexagon 97"/>
+          <p:cNvSpPr/>
+          <p:nvPr/>
+        </p:nvSpPr>
+        <p:spPr>
+          <a:xfrm>
+            <a:off x="7179664" y="3509338"/>
+            <a:ext cx="977731" cy="469440"/>
+          </a:xfrm>
+          <a:prstGeom prst="hexagon">
+            <a:avLst/>
+          </a:prstGeom>
+          <a:solidFill>
+            <a:schemeClr val="bg1"/>
+          </a:solidFill>
+          <a:ln w="28575">
+            <a:solidFill>
+              <a:schemeClr val="bg1">
+                <a:lumMod val="50000"/>
+              </a:schemeClr>
+            </a:solidFill>
+          </a:ln>
+          <a:effectLst/>
+        </p:spPr>
+        <p:style>
+          <a:lnRef idx="1">
+            <a:schemeClr val="accent1"/>
+          </a:lnRef>
+          <a:fillRef idx="3">
+            <a:schemeClr val="accent1"/>
+          </a:fillRef>
+          <a:effectRef idx="2">
+            <a:schemeClr val="accent1"/>
+          </a:effectRef>
+          <a:fontRef idx="minor">
+            <a:schemeClr val="lt1"/>
+          </a:fontRef>
+        </p:style>
+        <p:txBody>
+          <a:bodyPr rtlCol="0" anchor="ctr"/>
+          <a:lstStyle/>
+          <a:p>
+            <a:pPr algn="ctr"/>
+            <a:r>
+              <a:rPr lang="en-US" sz="1400" dirty="0" smtClean="0">
+                <a:solidFill>
+                  <a:schemeClr val="bg1">
+                    <a:lumMod val="50000"/>
+                  </a:schemeClr>
+                </a:solidFill>
+                <a:latin typeface="Gill Sans" charset="0"/>
+                <a:ea typeface="Gill Sans" charset="0"/>
+                <a:cs typeface="Gill Sans" charset="0"/>
+              </a:rPr>
+              <a:t>Clean</a:t>
+            </a:r>
+          </a:p>
+          <a:p>
+            <a:pPr algn="ctr"/>
+            <a:r>
+              <a:rPr lang="en-US" sz="1400" dirty="0" smtClean="0">
+                <a:solidFill>
+                  <a:schemeClr val="bg1">
+                    <a:lumMod val="50000"/>
+                  </a:schemeClr>
+                </a:solidFill>
+                <a:latin typeface="Gill Sans" charset="0"/>
+                <a:ea typeface="Gill Sans" charset="0"/>
+                <a:cs typeface="Gill Sans" charset="0"/>
+              </a:rPr>
+              <a:t>Model</a:t>
+            </a:r>
+            <a:endParaRPr lang="en-US" sz="1400" dirty="0">
+              <a:solidFill>
+                <a:schemeClr val="bg1">
+                  <a:lumMod val="50000"/>
+                </a:schemeClr>
+              </a:solidFill>
+              <a:latin typeface="Gill Sans" charset="0"/>
+              <a:ea typeface="Gill Sans" charset="0"/>
+              <a:cs typeface="Gill Sans" charset="0"/>
+            </a:endParaRPr>
+          </a:p>
+        </p:txBody>
+      </p:sp>
+      <p:cxnSp>
+        <p:nvCxnSpPr>
+          <p:cNvPr id="99" name="Straight Arrow Connector 98"/>
+          <p:cNvCxnSpPr/>
+          <p:nvPr/>
+        </p:nvCxnSpPr>
+        <p:spPr>
+          <a:xfrm>
+            <a:off x="6517362" y="3744058"/>
+            <a:ext cx="657407" cy="0"/>
+          </a:xfrm>
+          <a:prstGeom prst="straightConnector1">
+            <a:avLst/>
+          </a:prstGeom>
+          <a:ln w="28575" cmpd="sng">
+            <a:solidFill>
+              <a:srgbClr val="7F7F7F"/>
+            </a:solidFill>
+            <a:headEnd type="none"/>
+            <a:tailEnd type="triangle"/>
+          </a:ln>
+          <a:effectLst/>
+        </p:spPr>
+        <p:style>
+          <a:lnRef idx="2">
+            <a:schemeClr val="accent1"/>
+          </a:lnRef>
+          <a:fillRef idx="0">
+            <a:schemeClr val="accent1"/>
+          </a:fillRef>
+          <a:effectRef idx="1">
+            <a:schemeClr val="accent1"/>
+          </a:effectRef>
+          <a:fontRef idx="minor">
+            <a:schemeClr val="tx1"/>
+          </a:fontRef>
+        </p:style>
+      </p:cxnSp>
+      <p:sp>
+        <p:nvSpPr>
+          <p:cNvPr id="44" name="Hexagon 43"/>
+          <p:cNvSpPr/>
+          <p:nvPr/>
+        </p:nvSpPr>
+        <p:spPr>
+          <a:xfrm>
+            <a:off x="5601733" y="3509338"/>
+            <a:ext cx="1138058" cy="469440"/>
+          </a:xfrm>
+          <a:prstGeom prst="hexagon">
+            <a:avLst/>
+          </a:prstGeom>
+          <a:solidFill>
+            <a:schemeClr val="bg1"/>
+          </a:solidFill>
+          <a:ln w="28575">
+            <a:solidFill>
+              <a:schemeClr val="bg1">
+                <a:lumMod val="50000"/>
+              </a:schemeClr>
+            </a:solidFill>
+          </a:ln>
+          <a:effectLst/>
+        </p:spPr>
+        <p:style>
+          <a:lnRef idx="1">
+            <a:schemeClr val="accent1"/>
+          </a:lnRef>
+          <a:fillRef idx="3">
+            <a:schemeClr val="accent1"/>
+          </a:fillRef>
+          <a:effectRef idx="2">
+            <a:schemeClr val="accent1"/>
+          </a:effectRef>
+          <a:fontRef idx="minor">
+            <a:schemeClr val="lt1"/>
+          </a:fontRef>
+        </p:style>
+        <p:txBody>
+          <a:bodyPr rtlCol="0" anchor="ctr"/>
+          <a:lstStyle/>
+          <a:p>
+            <a:pPr algn="ctr"/>
+            <a:r>
+              <a:rPr lang="en-US" sz="1400" dirty="0" smtClean="0">
+                <a:solidFill>
+                  <a:schemeClr val="bg1">
+                    <a:lumMod val="50000"/>
+                  </a:schemeClr>
+                </a:solidFill>
+                <a:latin typeface="Gill Sans" charset="0"/>
+                <a:ea typeface="Gill Sans" charset="0"/>
+                <a:cs typeface="Gill Sans" charset="0"/>
+              </a:rPr>
+              <a:t>Cur. best</a:t>
+            </a:r>
+          </a:p>
+          <a:p>
+            <a:pPr algn="ctr"/>
+            <a:r>
+              <a:rPr lang="en-US" sz="1400" dirty="0" smtClean="0">
+                <a:solidFill>
+                  <a:schemeClr val="bg1">
+                    <a:lumMod val="50000"/>
+                  </a:schemeClr>
+                </a:solidFill>
+                <a:latin typeface="Gill Sans" charset="0"/>
+                <a:ea typeface="Gill Sans" charset="0"/>
+                <a:cs typeface="Gill Sans" charset="0"/>
+              </a:rPr>
+              <a:t>Model</a:t>
+            </a:r>
+            <a:endParaRPr lang="en-US" sz="1400" dirty="0">
+              <a:solidFill>
+                <a:schemeClr val="bg1">
+                  <a:lumMod val="50000"/>
+                </a:schemeClr>
+              </a:solidFill>
+              <a:latin typeface="Gill Sans" charset="0"/>
+              <a:ea typeface="Gill Sans" charset="0"/>
+              <a:cs typeface="Gill Sans" charset="0"/>
+            </a:endParaRPr>
+          </a:p>
+        </p:txBody>
+      </p:sp>
+    </p:spTree>
+    <p:extLst>
+      <p:ext uri="{BB962C8B-B14F-4D97-AF65-F5344CB8AC3E}">
+        <p14:creationId xmlns:p14="http://schemas.microsoft.com/office/powerpoint/2010/main" val="2134027485"/>
+      </p:ext>
+    </p:extLst>
+  </p:cSld>
+  <p:clrMapOvr>
+    <a:masterClrMapping/>
+  </p:clrMapOvr>
+</p:sld>
+</file>
+
 <file path=ppt/theme/theme1.xml><?xml version="1.0" encoding="utf-8"?>
 <a:theme xmlns:a="http://schemas.openxmlformats.org/drawingml/2006/main" name="Office Theme">
   <a:themeElements>

</xml_diff>

<commit_message>
Updated with the new cover letter
</commit_message>
<xml_diff>
--- a/figs/figs.pptx
+++ b/figs/figs.pptx
@@ -128,7 +128,7 @@
   </p:defaultTextStyle>
   <p:extLst>
     <p:ext uri="{EFAFB233-063F-42B5-8137-9DF3F51BA10A}">
-      <p15:sldGuideLst xmlns:p15="http://schemas.microsoft.com/office/powerpoint/2012/main" xmlns="">
+      <p15:sldGuideLst xmlns="" xmlns:p15="http://schemas.microsoft.com/office/powerpoint/2012/main">
         <p15:guide id="1" orient="horz" pos="2160">
           <p15:clr>
             <a:srgbClr val="A4A3A4"/>
@@ -13030,10 +13030,10 @@
         </p:nvGrpSpPr>
         <p:grpSpPr>
           <a:xfrm>
-            <a:off x="-6883" y="868019"/>
-            <a:ext cx="11341739" cy="3772053"/>
-            <a:chOff x="299105" y="747996"/>
-            <a:chExt cx="11341739" cy="3772053"/>
+            <a:off x="-6883" y="882014"/>
+            <a:ext cx="11341739" cy="3758058"/>
+            <a:chOff x="299105" y="761991"/>
+            <a:chExt cx="11341739" cy="3758058"/>
           </a:xfrm>
         </p:grpSpPr>
         <p:grpSp>
@@ -13044,10 +13044,10 @@
           </p:nvGrpSpPr>
           <p:grpSpPr>
             <a:xfrm>
-              <a:off x="299105" y="747996"/>
-              <a:ext cx="11341739" cy="3772053"/>
-              <a:chOff x="299105" y="747996"/>
-              <a:chExt cx="11341739" cy="3772053"/>
+              <a:off x="299105" y="761991"/>
+              <a:ext cx="11341739" cy="3758058"/>
+              <a:chOff x="299105" y="761991"/>
+              <a:chExt cx="11341739" cy="3758058"/>
             </a:xfrm>
           </p:grpSpPr>
           <p:grpSp>
@@ -13058,10 +13058,10 @@
             </p:nvGrpSpPr>
             <p:grpSpPr>
               <a:xfrm>
-                <a:off x="307236" y="747996"/>
-                <a:ext cx="11333608" cy="3772053"/>
-                <a:chOff x="1012185" y="802106"/>
-                <a:chExt cx="11333608" cy="3772053"/>
+                <a:off x="307236" y="761991"/>
+                <a:ext cx="11333608" cy="3758058"/>
+                <a:chOff x="1012185" y="816101"/>
+                <a:chExt cx="11333608" cy="3758058"/>
               </a:xfrm>
             </p:grpSpPr>
             <p:grpSp>
@@ -13072,10 +13072,10 @@
               </p:nvGrpSpPr>
               <p:grpSpPr>
                 <a:xfrm>
-                  <a:off x="1012185" y="802106"/>
-                  <a:ext cx="11333608" cy="3772053"/>
-                  <a:chOff x="1012185" y="802106"/>
-                  <a:chExt cx="11333608" cy="3772053"/>
+                  <a:off x="1012185" y="816101"/>
+                  <a:ext cx="11333608" cy="3758058"/>
+                  <a:chOff x="1012185" y="816101"/>
+                  <a:chExt cx="11333608" cy="3758058"/>
                 </a:xfrm>
               </p:grpSpPr>
               <p:grpSp>
@@ -13086,10 +13086,10 @@
                 </p:nvGrpSpPr>
                 <p:grpSpPr>
                   <a:xfrm>
-                    <a:off x="1012185" y="802106"/>
-                    <a:ext cx="11333608" cy="3772053"/>
-                    <a:chOff x="1012185" y="802106"/>
-                    <a:chExt cx="11333608" cy="3772053"/>
+                    <a:off x="1012185" y="816101"/>
+                    <a:ext cx="11333608" cy="3758058"/>
+                    <a:chOff x="1012185" y="816101"/>
+                    <a:chExt cx="11333608" cy="3758058"/>
                   </a:xfrm>
                 </p:grpSpPr>
                 <p:cxnSp>
@@ -13100,7 +13100,7 @@
                   </p:nvCxnSpPr>
                   <p:spPr>
                     <a:xfrm flipH="1" flipV="1">
-                      <a:off x="10681369" y="802106"/>
+                      <a:off x="10772070" y="816101"/>
                       <a:ext cx="1403684" cy="2874210"/>
                     </a:xfrm>
                     <a:prstGeom prst="line">
@@ -13555,7 +13555,7 @@
                   </p:nvSpPr>
                   <p:spPr>
                     <a:xfrm>
-                      <a:off x="6668041" y="1875084"/>
+                      <a:off x="6668041" y="1804529"/>
                       <a:ext cx="405915" cy="405915"/>
                     </a:xfrm>
                     <a:prstGeom prst="mathMultiply">
@@ -13602,7 +13602,7 @@
                   </p:nvSpPr>
                   <p:spPr>
                     <a:xfrm>
-                      <a:off x="6870999" y="2430485"/>
+                      <a:off x="6870999" y="2303486"/>
                       <a:ext cx="405915" cy="405915"/>
                     </a:xfrm>
                     <a:prstGeom prst="mathMultiply">
@@ -13650,7 +13650,7 @@
                   <p:spPr>
                     <a:xfrm flipH="1" flipV="1">
                       <a:off x="4896162" y="1131637"/>
-                      <a:ext cx="3482804" cy="2147422"/>
+                      <a:ext cx="3460202" cy="1885507"/>
                     </a:xfrm>
                     <a:prstGeom prst="line">
                       <a:avLst/>
@@ -14235,7 +14235,7 @@
                   </p:nvSpPr>
                   <p:spPr>
                     <a:xfrm>
-                      <a:off x="11320175" y="2349023"/>
+                      <a:off x="11320175" y="2151469"/>
                       <a:ext cx="405915" cy="405915"/>
                     </a:xfrm>
                     <a:prstGeom prst="mathMultiply">
@@ -14282,7 +14282,7 @@
                   </p:nvSpPr>
                   <p:spPr>
                     <a:xfrm>
-                      <a:off x="11137493" y="1862718"/>
+                      <a:off x="11137493" y="1665164"/>
                       <a:ext cx="405915" cy="405915"/>
                     </a:xfrm>
                     <a:prstGeom prst="mathMultiply">

</xml_diff>

<commit_message>
Updated with a new figure
</commit_message>
<xml_diff>
--- a/figs/figs.pptx
+++ b/figs/figs.pptx
@@ -128,7 +128,7 @@
   </p:defaultTextStyle>
   <p:extLst>
     <p:ext uri="{EFAFB233-063F-42B5-8137-9DF3F51BA10A}">
-      <p15:sldGuideLst xmlns:p15="http://schemas.microsoft.com/office/powerpoint/2012/main" xmlns="">
+      <p15:sldGuideLst xmlns="" xmlns:p15="http://schemas.microsoft.com/office/powerpoint/2012/main">
         <p15:guide id="1" orient="horz" pos="2160">
           <p15:clr>
             <a:srgbClr val="A4A3A4"/>
@@ -227,7 +227,7 @@
           <a:p>
             <a:fld id="{347ECA95-75C3-5E48-946C-F7960CA43F88}" type="datetimeFigureOut">
               <a:rPr lang="en-US" smtClean="0"/>
-              <a:t>5/16/16</a:t>
+              <a:t>5/23/16</a:t>
             </a:fld>
             <a:endParaRPr lang="en-US"/>
           </a:p>
@@ -844,7 +844,7 @@
           <a:p>
             <a:fld id="{73A4B2A3-D9DC-064E-90FE-771C025222F9}" type="datetimeFigureOut">
               <a:rPr lang="en-US" smtClean="0"/>
-              <a:t>5/16/16</a:t>
+              <a:t>5/23/16</a:t>
             </a:fld>
             <a:endParaRPr lang="en-US"/>
           </a:p>
@@ -1014,7 +1014,7 @@
           <a:p>
             <a:fld id="{73A4B2A3-D9DC-064E-90FE-771C025222F9}" type="datetimeFigureOut">
               <a:rPr lang="en-US" smtClean="0"/>
-              <a:t>5/16/16</a:t>
+              <a:t>5/23/16</a:t>
             </a:fld>
             <a:endParaRPr lang="en-US"/>
           </a:p>
@@ -1194,7 +1194,7 @@
           <a:p>
             <a:fld id="{73A4B2A3-D9DC-064E-90FE-771C025222F9}" type="datetimeFigureOut">
               <a:rPr lang="en-US" smtClean="0"/>
-              <a:t>5/16/16</a:t>
+              <a:t>5/23/16</a:t>
             </a:fld>
             <a:endParaRPr lang="en-US"/>
           </a:p>
@@ -1364,7 +1364,7 @@
           <a:p>
             <a:fld id="{73A4B2A3-D9DC-064E-90FE-771C025222F9}" type="datetimeFigureOut">
               <a:rPr lang="en-US" smtClean="0"/>
-              <a:t>5/16/16</a:t>
+              <a:t>5/23/16</a:t>
             </a:fld>
             <a:endParaRPr lang="en-US"/>
           </a:p>
@@ -1610,7 +1610,7 @@
           <a:p>
             <a:fld id="{73A4B2A3-D9DC-064E-90FE-771C025222F9}" type="datetimeFigureOut">
               <a:rPr lang="en-US" smtClean="0"/>
-              <a:t>5/16/16</a:t>
+              <a:t>5/23/16</a:t>
             </a:fld>
             <a:endParaRPr lang="en-US"/>
           </a:p>
@@ -1898,7 +1898,7 @@
           <a:p>
             <a:fld id="{73A4B2A3-D9DC-064E-90FE-771C025222F9}" type="datetimeFigureOut">
               <a:rPr lang="en-US" smtClean="0"/>
-              <a:t>5/16/16</a:t>
+              <a:t>5/23/16</a:t>
             </a:fld>
             <a:endParaRPr lang="en-US"/>
           </a:p>
@@ -2320,7 +2320,7 @@
           <a:p>
             <a:fld id="{73A4B2A3-D9DC-064E-90FE-771C025222F9}" type="datetimeFigureOut">
               <a:rPr lang="en-US" smtClean="0"/>
-              <a:t>5/16/16</a:t>
+              <a:t>5/23/16</a:t>
             </a:fld>
             <a:endParaRPr lang="en-US"/>
           </a:p>
@@ -2438,7 +2438,7 @@
           <a:p>
             <a:fld id="{73A4B2A3-D9DC-064E-90FE-771C025222F9}" type="datetimeFigureOut">
               <a:rPr lang="en-US" smtClean="0"/>
-              <a:t>5/16/16</a:t>
+              <a:t>5/23/16</a:t>
             </a:fld>
             <a:endParaRPr lang="en-US"/>
           </a:p>
@@ -2533,7 +2533,7 @@
           <a:p>
             <a:fld id="{73A4B2A3-D9DC-064E-90FE-771C025222F9}" type="datetimeFigureOut">
               <a:rPr lang="en-US" smtClean="0"/>
-              <a:t>5/16/16</a:t>
+              <a:t>5/23/16</a:t>
             </a:fld>
             <a:endParaRPr lang="en-US"/>
           </a:p>
@@ -2810,7 +2810,7 @@
           <a:p>
             <a:fld id="{73A4B2A3-D9DC-064E-90FE-771C025222F9}" type="datetimeFigureOut">
               <a:rPr lang="en-US" smtClean="0"/>
-              <a:t>5/16/16</a:t>
+              <a:t>5/23/16</a:t>
             </a:fld>
             <a:endParaRPr lang="en-US"/>
           </a:p>
@@ -3063,7 +3063,7 @@
           <a:p>
             <a:fld id="{73A4B2A3-D9DC-064E-90FE-771C025222F9}" type="datetimeFigureOut">
               <a:rPr lang="en-US" smtClean="0"/>
-              <a:t>5/16/16</a:t>
+              <a:t>5/23/16</a:t>
             </a:fld>
             <a:endParaRPr lang="en-US"/>
           </a:p>
@@ -3276,7 +3276,7 @@
           <a:p>
             <a:fld id="{73A4B2A3-D9DC-064E-90FE-771C025222F9}" type="datetimeFigureOut">
               <a:rPr lang="en-US" smtClean="0"/>
-              <a:t>5/16/16</a:t>
+              <a:t>5/23/16</a:t>
             </a:fld>
             <a:endParaRPr lang="en-US"/>
           </a:p>
@@ -13024,27 +13024,27 @@
       </p:grpSpPr>
       <p:grpSp>
         <p:nvGrpSpPr>
-          <p:cNvPr id="16" name="Group 15"/>
+          <p:cNvPr id="7" name="Group 6"/>
           <p:cNvGrpSpPr/>
           <p:nvPr/>
         </p:nvGrpSpPr>
         <p:grpSpPr>
           <a:xfrm>
-            <a:off x="-6883" y="882014"/>
-            <a:ext cx="11341739" cy="3758058"/>
-            <a:chOff x="299105" y="761991"/>
-            <a:chExt cx="11341739" cy="3758058"/>
+            <a:off x="-6883" y="842328"/>
+            <a:ext cx="11341739" cy="3797744"/>
+            <a:chOff x="-6883" y="842328"/>
+            <a:chExt cx="11341739" cy="3797744"/>
           </a:xfrm>
         </p:grpSpPr>
         <p:grpSp>
           <p:nvGrpSpPr>
-            <p:cNvPr id="15" name="Group 14"/>
+            <p:cNvPr id="16" name="Group 15"/>
             <p:cNvGrpSpPr/>
             <p:nvPr/>
           </p:nvGrpSpPr>
           <p:grpSpPr>
             <a:xfrm>
-              <a:off x="299105" y="761991"/>
+              <a:off x="-6883" y="882014"/>
               <a:ext cx="11341739" cy="3758058"/>
               <a:chOff x="299105" y="761991"/>
               <a:chExt cx="11341739" cy="3758058"/>
@@ -13052,27 +13052,27 @@
           </p:grpSpPr>
           <p:grpSp>
             <p:nvGrpSpPr>
-              <p:cNvPr id="5" name="Group 4"/>
+              <p:cNvPr id="15" name="Group 14"/>
               <p:cNvGrpSpPr/>
               <p:nvPr/>
             </p:nvGrpSpPr>
             <p:grpSpPr>
               <a:xfrm>
-                <a:off x="307236" y="761991"/>
-                <a:ext cx="11333608" cy="3758058"/>
-                <a:chOff x="1012185" y="816101"/>
-                <a:chExt cx="11333608" cy="3758058"/>
+                <a:off x="299105" y="761991"/>
+                <a:ext cx="11341739" cy="3758058"/>
+                <a:chOff x="299105" y="761991"/>
+                <a:chExt cx="11341739" cy="3758058"/>
               </a:xfrm>
             </p:grpSpPr>
             <p:grpSp>
               <p:nvGrpSpPr>
-                <p:cNvPr id="4" name="Group 3"/>
+                <p:cNvPr id="5" name="Group 4"/>
                 <p:cNvGrpSpPr/>
                 <p:nvPr/>
               </p:nvGrpSpPr>
               <p:grpSpPr>
                 <a:xfrm>
-                  <a:off x="1012185" y="816101"/>
+                  <a:off x="307236" y="761991"/>
                   <a:ext cx="11333608" cy="3758058"/>
                   <a:chOff x="1012185" y="816101"/>
                   <a:chExt cx="11333608" cy="3758058"/>
@@ -13080,7 +13080,7 @@
               </p:grpSpPr>
               <p:grpSp>
                 <p:nvGrpSpPr>
-                  <p:cNvPr id="84" name="Group 83"/>
+                  <p:cNvPr id="4" name="Group 3"/>
                   <p:cNvGrpSpPr/>
                   <p:nvPr/>
                 </p:nvGrpSpPr>
@@ -13092,134 +13092,1336 @@
                     <a:chExt cx="11333608" cy="3758058"/>
                   </a:xfrm>
                 </p:grpSpPr>
-                <p:cxnSp>
-                  <p:nvCxnSpPr>
-                    <p:cNvPr id="76" name="Straight Connector 75"/>
-                    <p:cNvCxnSpPr/>
+                <p:grpSp>
+                  <p:nvGrpSpPr>
+                    <p:cNvPr id="84" name="Group 83"/>
+                    <p:cNvGrpSpPr/>
                     <p:nvPr/>
-                  </p:nvCxnSpPr>
-                  <p:spPr>
-                    <a:xfrm flipH="1" flipV="1">
-                      <a:off x="10772070" y="816101"/>
-                      <a:ext cx="1403684" cy="2874210"/>
+                  </p:nvGrpSpPr>
+                  <p:grpSpPr>
+                    <a:xfrm>
+                      <a:off x="1012185" y="816101"/>
+                      <a:ext cx="11333608" cy="3758058"/>
+                      <a:chOff x="1012185" y="816101"/>
+                      <a:chExt cx="11333608" cy="3758058"/>
                     </a:xfrm>
-                    <a:prstGeom prst="line">
-                      <a:avLst/>
-                    </a:prstGeom>
-                    <a:ln w="50800">
+                  </p:grpSpPr>
+                  <p:cxnSp>
+                    <p:nvCxnSpPr>
+                      <p:cNvPr id="76" name="Straight Connector 75"/>
+                      <p:cNvCxnSpPr/>
+                      <p:nvPr/>
+                    </p:nvCxnSpPr>
+                    <p:spPr>
+                      <a:xfrm flipH="1" flipV="1">
+                        <a:off x="10772070" y="816101"/>
+                        <a:ext cx="1403684" cy="2874210"/>
+                      </a:xfrm>
+                      <a:prstGeom prst="line">
+                        <a:avLst/>
+                      </a:prstGeom>
+                      <a:ln w="50800">
+                        <a:solidFill>
+                          <a:srgbClr val="FF0000"/>
+                        </a:solidFill>
+                      </a:ln>
+                      <a:effectLst/>
+                    </p:spPr>
+                    <p:style>
+                      <a:lnRef idx="2">
+                        <a:schemeClr val="accent1"/>
+                      </a:lnRef>
+                      <a:fillRef idx="0">
+                        <a:schemeClr val="accent1"/>
+                      </a:fillRef>
+                      <a:effectRef idx="1">
+                        <a:schemeClr val="accent1"/>
+                      </a:effectRef>
+                      <a:fontRef idx="minor">
+                        <a:schemeClr val="tx1"/>
+                      </a:fontRef>
+                    </p:style>
+                  </p:cxnSp>
+                  <p:cxnSp>
+                    <p:nvCxnSpPr>
+                      <p:cNvPr id="12" name="Straight Arrow Connector 11"/>
+                      <p:cNvCxnSpPr/>
+                      <p:nvPr/>
+                    </p:nvCxnSpPr>
+                    <p:spPr>
+                      <a:xfrm flipV="1">
+                        <a:off x="1012185" y="951960"/>
+                        <a:ext cx="0" cy="3116380"/>
+                      </a:xfrm>
+                      <a:prstGeom prst="straightConnector1">
+                        <a:avLst/>
+                      </a:prstGeom>
+                      <a:ln w="50800">
+                        <a:solidFill>
+                          <a:schemeClr val="tx1"/>
+                        </a:solidFill>
+                        <a:tailEnd type="triangle"/>
+                      </a:ln>
+                      <a:effectLst/>
+                    </p:spPr>
+                    <p:style>
+                      <a:lnRef idx="2">
+                        <a:schemeClr val="accent1"/>
+                      </a:lnRef>
+                      <a:fillRef idx="0">
+                        <a:schemeClr val="accent1"/>
+                      </a:fillRef>
+                      <a:effectRef idx="1">
+                        <a:schemeClr val="accent1"/>
+                      </a:effectRef>
+                      <a:fontRef idx="minor">
+                        <a:schemeClr val="tx1"/>
+                      </a:fontRef>
+                    </p:style>
+                  </p:cxnSp>
+                  <p:cxnSp>
+                    <p:nvCxnSpPr>
+                      <p:cNvPr id="13" name="Straight Arrow Connector 12"/>
+                      <p:cNvCxnSpPr/>
+                      <p:nvPr/>
+                    </p:nvCxnSpPr>
+                    <p:spPr>
+                      <a:xfrm flipV="1">
+                        <a:off x="1012185" y="4046879"/>
+                        <a:ext cx="3482804" cy="21461"/>
+                      </a:xfrm>
+                      <a:prstGeom prst="straightConnector1">
+                        <a:avLst/>
+                      </a:prstGeom>
+                      <a:ln w="50800">
+                        <a:solidFill>
+                          <a:schemeClr val="tx1"/>
+                        </a:solidFill>
+                        <a:tailEnd type="triangle"/>
+                      </a:ln>
+                      <a:effectLst/>
+                    </p:spPr>
+                    <p:style>
+                      <a:lnRef idx="2">
+                        <a:schemeClr val="accent1"/>
+                      </a:lnRef>
+                      <a:fillRef idx="0">
+                        <a:schemeClr val="accent1"/>
+                      </a:fillRef>
+                      <a:effectRef idx="1">
+                        <a:schemeClr val="accent1"/>
+                      </a:effectRef>
+                      <a:fontRef idx="minor">
+                        <a:schemeClr val="tx1"/>
+                      </a:fontRef>
+                    </p:style>
+                  </p:cxnSp>
+                  <p:sp>
+                    <p:nvSpPr>
+                      <p:cNvPr id="25" name="Multiply 24"/>
+                      <p:cNvSpPr/>
+                      <p:nvPr/>
+                    </p:nvSpPr>
+                    <p:spPr>
+                      <a:xfrm>
+                        <a:off x="2991351" y="1143643"/>
+                        <a:ext cx="405915" cy="405915"/>
+                      </a:xfrm>
+                      <a:prstGeom prst="mathMultiply">
+                        <a:avLst/>
+                      </a:prstGeom>
                       <a:solidFill>
-                        <a:srgbClr val="FF0000"/>
+                        <a:srgbClr val="00FF66"/>
                       </a:solidFill>
-                    </a:ln>
-                    <a:effectLst/>
-                  </p:spPr>
-                  <p:style>
-                    <a:lnRef idx="2">
-                      <a:schemeClr val="accent1"/>
-                    </a:lnRef>
-                    <a:fillRef idx="0">
-                      <a:schemeClr val="accent1"/>
-                    </a:fillRef>
-                    <a:effectRef idx="1">
-                      <a:schemeClr val="accent1"/>
-                    </a:effectRef>
-                    <a:fontRef idx="minor">
-                      <a:schemeClr val="tx1"/>
-                    </a:fontRef>
-                  </p:style>
-                </p:cxnSp>
-                <p:cxnSp>
-                  <p:nvCxnSpPr>
-                    <p:cNvPr id="12" name="Straight Arrow Connector 11"/>
-                    <p:cNvCxnSpPr/>
-                    <p:nvPr/>
-                  </p:nvCxnSpPr>
-                  <p:spPr>
-                    <a:xfrm flipV="1">
-                      <a:off x="1012185" y="951960"/>
-                      <a:ext cx="0" cy="3116380"/>
-                    </a:xfrm>
-                    <a:prstGeom prst="straightConnector1">
-                      <a:avLst/>
-                    </a:prstGeom>
-                    <a:ln w="50800">
+                      <a:ln>
+                        <a:solidFill>
+                          <a:schemeClr val="tx1"/>
+                        </a:solidFill>
+                      </a:ln>
+                      <a:effectLst/>
+                    </p:spPr>
+                    <p:style>
+                      <a:lnRef idx="1">
+                        <a:schemeClr val="accent1"/>
+                      </a:lnRef>
+                      <a:fillRef idx="3">
+                        <a:schemeClr val="accent1"/>
+                      </a:fillRef>
+                      <a:effectRef idx="2">
+                        <a:schemeClr val="accent1"/>
+                      </a:effectRef>
+                      <a:fontRef idx="minor">
+                        <a:schemeClr val="lt1"/>
+                      </a:fontRef>
+                    </p:style>
+                    <p:txBody>
+                      <a:bodyPr rtlCol="0" anchor="ctr"/>
+                      <a:lstStyle/>
+                      <a:p>
+                        <a:pPr algn="ctr"/>
+                        <a:endParaRPr lang="en-US"/>
+                      </a:p>
+                    </p:txBody>
+                  </p:sp>
+                  <p:sp>
+                    <p:nvSpPr>
+                      <p:cNvPr id="26" name="Multiply 25"/>
+                      <p:cNvSpPr/>
+                      <p:nvPr/>
+                    </p:nvSpPr>
+                    <p:spPr>
+                      <a:xfrm>
+                        <a:off x="3043566" y="1776881"/>
+                        <a:ext cx="405915" cy="405915"/>
+                      </a:xfrm>
+                      <a:prstGeom prst="mathMultiply">
+                        <a:avLst/>
+                      </a:prstGeom>
                       <a:solidFill>
+                        <a:srgbClr val="00FF66"/>
+                      </a:solidFill>
+                      <a:ln>
+                        <a:solidFill>
+                          <a:schemeClr val="tx1"/>
+                        </a:solidFill>
+                      </a:ln>
+                      <a:effectLst/>
+                    </p:spPr>
+                    <p:style>
+                      <a:lnRef idx="1">
+                        <a:schemeClr val="accent1"/>
+                      </a:lnRef>
+                      <a:fillRef idx="3">
+                        <a:schemeClr val="accent1"/>
+                      </a:fillRef>
+                      <a:effectRef idx="2">
+                        <a:schemeClr val="accent1"/>
+                      </a:effectRef>
+                      <a:fontRef idx="minor">
+                        <a:schemeClr val="lt1"/>
+                      </a:fontRef>
+                    </p:style>
+                    <p:txBody>
+                      <a:bodyPr rtlCol="0" anchor="ctr"/>
+                      <a:lstStyle/>
+                      <a:p>
+                        <a:pPr algn="ctr"/>
+                        <a:endParaRPr lang="en-US"/>
+                      </a:p>
+                    </p:txBody>
+                  </p:sp>
+                  <p:sp>
+                    <p:nvSpPr>
+                      <p:cNvPr id="27" name="Multiply 26"/>
+                      <p:cNvSpPr/>
+                      <p:nvPr/>
+                    </p:nvSpPr>
+                    <p:spPr>
+                      <a:xfrm>
+                        <a:off x="3189980" y="2278086"/>
+                        <a:ext cx="405915" cy="405915"/>
+                      </a:xfrm>
+                      <a:prstGeom prst="mathMultiply">
+                        <a:avLst/>
+                      </a:prstGeom>
+                      <a:solidFill>
+                        <a:srgbClr val="00FF66"/>
+                      </a:solidFill>
+                      <a:ln>
+                        <a:solidFill>
+                          <a:schemeClr val="tx1"/>
+                        </a:solidFill>
+                      </a:ln>
+                      <a:effectLst/>
+                    </p:spPr>
+                    <p:style>
+                      <a:lnRef idx="1">
+                        <a:schemeClr val="accent1"/>
+                      </a:lnRef>
+                      <a:fillRef idx="3">
+                        <a:schemeClr val="accent1"/>
+                      </a:fillRef>
+                      <a:effectRef idx="2">
+                        <a:schemeClr val="accent1"/>
+                      </a:effectRef>
+                      <a:fontRef idx="minor">
+                        <a:schemeClr val="lt1"/>
+                      </a:fontRef>
+                    </p:style>
+                    <p:txBody>
+                      <a:bodyPr rtlCol="0" anchor="ctr"/>
+                      <a:lstStyle/>
+                      <a:p>
+                        <a:pPr algn="ctr"/>
+                        <a:endParaRPr lang="en-US"/>
+                      </a:p>
+                    </p:txBody>
+                  </p:sp>
+                  <p:sp>
+                    <p:nvSpPr>
+                      <p:cNvPr id="28" name="Multiply 27"/>
+                      <p:cNvSpPr/>
+                      <p:nvPr/>
+                    </p:nvSpPr>
+                    <p:spPr>
+                      <a:xfrm>
+                        <a:off x="3449481" y="1904915"/>
+                        <a:ext cx="405915" cy="405915"/>
+                      </a:xfrm>
+                      <a:prstGeom prst="mathMultiply">
+                        <a:avLst/>
+                      </a:prstGeom>
+                      <a:solidFill>
+                        <a:srgbClr val="00FF66"/>
+                      </a:solidFill>
+                      <a:ln>
+                        <a:solidFill>
+                          <a:schemeClr val="tx1"/>
+                        </a:solidFill>
+                      </a:ln>
+                      <a:effectLst/>
+                    </p:spPr>
+                    <p:style>
+                      <a:lnRef idx="1">
+                        <a:schemeClr val="accent1"/>
+                      </a:lnRef>
+                      <a:fillRef idx="3">
+                        <a:schemeClr val="accent1"/>
+                      </a:fillRef>
+                      <a:effectRef idx="2">
+                        <a:schemeClr val="accent1"/>
+                      </a:effectRef>
+                      <a:fontRef idx="minor">
+                        <a:schemeClr val="lt1"/>
+                      </a:fontRef>
+                    </p:style>
+                    <p:txBody>
+                      <a:bodyPr rtlCol="0" anchor="ctr"/>
+                      <a:lstStyle/>
+                      <a:p>
+                        <a:pPr algn="ctr"/>
+                        <a:endParaRPr lang="en-US"/>
+                      </a:p>
+                    </p:txBody>
+                  </p:sp>
+                  <p:sp>
+                    <p:nvSpPr>
+                      <p:cNvPr id="29" name="Multiply 28"/>
+                      <p:cNvSpPr/>
+                      <p:nvPr/>
+                    </p:nvSpPr>
+                    <p:spPr>
+                      <a:xfrm>
+                        <a:off x="3855396" y="1035421"/>
+                        <a:ext cx="405915" cy="405915"/>
+                      </a:xfrm>
+                      <a:prstGeom prst="mathMultiply">
+                        <a:avLst/>
+                      </a:prstGeom>
+                      <a:solidFill>
+                        <a:srgbClr val="00FF66"/>
+                      </a:solidFill>
+                      <a:ln>
+                        <a:solidFill>
+                          <a:schemeClr val="tx1"/>
+                        </a:solidFill>
+                      </a:ln>
+                      <a:effectLst/>
+                    </p:spPr>
+                    <p:style>
+                      <a:lnRef idx="1">
+                        <a:schemeClr val="accent1"/>
+                      </a:lnRef>
+                      <a:fillRef idx="3">
+                        <a:schemeClr val="accent1"/>
+                      </a:fillRef>
+                      <a:effectRef idx="2">
+                        <a:schemeClr val="accent1"/>
+                      </a:effectRef>
+                      <a:fontRef idx="minor">
+                        <a:schemeClr val="lt1"/>
+                      </a:fontRef>
+                    </p:style>
+                    <p:txBody>
+                      <a:bodyPr rtlCol="0" anchor="ctr"/>
+                      <a:lstStyle/>
+                      <a:p>
+                        <a:pPr algn="ctr"/>
+                        <a:endParaRPr lang="en-US"/>
+                      </a:p>
+                    </p:txBody>
+                  </p:sp>
+                  <p:sp>
+                    <p:nvSpPr>
+                      <p:cNvPr id="33" name="TextBox 32"/>
+                      <p:cNvSpPr txBox="1"/>
+                      <p:nvPr/>
+                    </p:nvSpPr>
+                    <p:spPr>
+                      <a:xfrm>
+                        <a:off x="1236114" y="4108154"/>
+                        <a:ext cx="2685351" cy="461665"/>
+                      </a:xfrm>
+                      <a:prstGeom prst="rect">
+                        <a:avLst/>
+                      </a:prstGeom>
+                      <a:noFill/>
+                    </p:spPr>
+                    <p:txBody>
+                      <a:bodyPr wrap="none" rtlCol="0">
+                        <a:spAutoFit/>
+                      </a:bodyPr>
+                      <a:lstStyle/>
+                      <a:p>
+                        <a:r>
+                          <a:rPr lang="en-US" sz="2400" dirty="0" smtClean="0">
+                            <a:latin typeface="Gill Sans"/>
+                            <a:cs typeface="Gill Sans"/>
+                          </a:rPr>
+                          <a:t>(a) Systematic Error</a:t>
+                        </a:r>
+                        <a:endParaRPr lang="en-US" sz="2400" dirty="0">
+                          <a:latin typeface="Gill Sans"/>
+                          <a:cs typeface="Gill Sans"/>
+                        </a:endParaRPr>
+                      </a:p>
+                    </p:txBody>
+                  </p:sp>
+                  <p:cxnSp>
+                    <p:nvCxnSpPr>
+                      <p:cNvPr id="34" name="Straight Arrow Connector 33"/>
+                      <p:cNvCxnSpPr/>
+                      <p:nvPr/>
+                    </p:nvCxnSpPr>
+                    <p:spPr>
+                      <a:xfrm flipV="1">
+                        <a:off x="4896162" y="922129"/>
+                        <a:ext cx="0" cy="3116380"/>
+                      </a:xfrm>
+                      <a:prstGeom prst="straightConnector1">
+                        <a:avLst/>
+                      </a:prstGeom>
+                      <a:ln w="50800">
+                        <a:solidFill>
+                          <a:schemeClr val="tx1"/>
+                        </a:solidFill>
+                        <a:tailEnd type="triangle"/>
+                      </a:ln>
+                      <a:effectLst/>
+                    </p:spPr>
+                    <p:style>
+                      <a:lnRef idx="2">
+                        <a:schemeClr val="accent1"/>
+                      </a:lnRef>
+                      <a:fillRef idx="0">
+                        <a:schemeClr val="accent1"/>
+                      </a:fillRef>
+                      <a:effectRef idx="1">
+                        <a:schemeClr val="accent1"/>
+                      </a:effectRef>
+                      <a:fontRef idx="minor">
                         <a:schemeClr val="tx1"/>
+                      </a:fontRef>
+                    </p:style>
+                  </p:cxnSp>
+                  <p:cxnSp>
+                    <p:nvCxnSpPr>
+                      <p:cNvPr id="35" name="Straight Arrow Connector 34"/>
+                      <p:cNvCxnSpPr/>
+                      <p:nvPr/>
+                    </p:nvCxnSpPr>
+                    <p:spPr>
+                      <a:xfrm flipV="1">
+                        <a:off x="4896162" y="4017048"/>
+                        <a:ext cx="3482804" cy="21461"/>
+                      </a:xfrm>
+                      <a:prstGeom prst="straightConnector1">
+                        <a:avLst/>
+                      </a:prstGeom>
+                      <a:ln w="50800">
+                        <a:solidFill>
+                          <a:schemeClr val="tx1"/>
+                        </a:solidFill>
+                        <a:tailEnd type="triangle"/>
+                      </a:ln>
+                      <a:effectLst/>
+                    </p:spPr>
+                    <p:style>
+                      <a:lnRef idx="2">
+                        <a:schemeClr val="accent1"/>
+                      </a:lnRef>
+                      <a:fillRef idx="0">
+                        <a:schemeClr val="accent1"/>
+                      </a:fillRef>
+                      <a:effectRef idx="1">
+                        <a:schemeClr val="accent1"/>
+                      </a:effectRef>
+                      <a:fontRef idx="minor">
+                        <a:schemeClr val="tx1"/>
+                      </a:fontRef>
+                    </p:style>
+                  </p:cxnSp>
+                  <p:sp>
+                    <p:nvSpPr>
+                      <p:cNvPr id="39" name="Multiply 38"/>
+                      <p:cNvSpPr/>
+                      <p:nvPr/>
+                    </p:nvSpPr>
+                    <p:spPr>
+                      <a:xfrm>
+                        <a:off x="6668041" y="1804529"/>
+                        <a:ext cx="405915" cy="405915"/>
+                      </a:xfrm>
+                      <a:prstGeom prst="mathMultiply">
+                        <a:avLst/>
+                      </a:prstGeom>
+                      <a:solidFill>
+                        <a:srgbClr val="00FF66"/>
                       </a:solidFill>
-                      <a:tailEnd type="triangle"/>
-                    </a:ln>
-                    <a:effectLst/>
-                  </p:spPr>
-                  <p:style>
-                    <a:lnRef idx="2">
-                      <a:schemeClr val="accent1"/>
-                    </a:lnRef>
-                    <a:fillRef idx="0">
-                      <a:schemeClr val="accent1"/>
-                    </a:fillRef>
-                    <a:effectRef idx="1">
-                      <a:schemeClr val="accent1"/>
-                    </a:effectRef>
-                    <a:fontRef idx="minor">
-                      <a:schemeClr val="tx1"/>
-                    </a:fontRef>
-                  </p:style>
-                </p:cxnSp>
-                <p:cxnSp>
-                  <p:nvCxnSpPr>
-                    <p:cNvPr id="13" name="Straight Arrow Connector 12"/>
-                    <p:cNvCxnSpPr/>
-                    <p:nvPr/>
-                  </p:nvCxnSpPr>
-                  <p:spPr>
-                    <a:xfrm flipV="1">
-                      <a:off x="1012185" y="4046879"/>
-                      <a:ext cx="3482804" cy="21461"/>
-                    </a:xfrm>
-                    <a:prstGeom prst="straightConnector1">
-                      <a:avLst/>
-                    </a:prstGeom>
-                    <a:ln w="50800">
+                      <a:ln>
+                        <a:solidFill>
+                          <a:schemeClr val="tx1"/>
+                        </a:solidFill>
+                      </a:ln>
+                      <a:effectLst/>
+                    </p:spPr>
+                    <p:style>
+                      <a:lnRef idx="1">
+                        <a:schemeClr val="accent1"/>
+                      </a:lnRef>
+                      <a:fillRef idx="3">
+                        <a:schemeClr val="accent1"/>
+                      </a:fillRef>
+                      <a:effectRef idx="2">
+                        <a:schemeClr val="accent1"/>
+                      </a:effectRef>
+                      <a:fontRef idx="minor">
+                        <a:schemeClr val="lt1"/>
+                      </a:fontRef>
+                    </p:style>
+                    <p:txBody>
+                      <a:bodyPr rtlCol="0" anchor="ctr"/>
+                      <a:lstStyle/>
+                      <a:p>
+                        <a:pPr algn="ctr"/>
+                        <a:endParaRPr lang="en-US"/>
+                      </a:p>
+                    </p:txBody>
+                  </p:sp>
+                  <p:sp>
+                    <p:nvSpPr>
+                      <p:cNvPr id="41" name="Multiply 40"/>
+                      <p:cNvSpPr/>
+                      <p:nvPr/>
+                    </p:nvSpPr>
+                    <p:spPr>
+                      <a:xfrm>
+                        <a:off x="6870999" y="2303486"/>
+                        <a:ext cx="405915" cy="405915"/>
+                      </a:xfrm>
+                      <a:prstGeom prst="mathMultiply">
+                        <a:avLst/>
+                      </a:prstGeom>
                       <a:solidFill>
+                        <a:srgbClr val="00FF66"/>
+                      </a:solidFill>
+                      <a:ln>
+                        <a:solidFill>
+                          <a:schemeClr val="tx1"/>
+                        </a:solidFill>
+                      </a:ln>
+                      <a:effectLst/>
+                    </p:spPr>
+                    <p:style>
+                      <a:lnRef idx="1">
+                        <a:schemeClr val="accent1"/>
+                      </a:lnRef>
+                      <a:fillRef idx="3">
+                        <a:schemeClr val="accent1"/>
+                      </a:fillRef>
+                      <a:effectRef idx="2">
+                        <a:schemeClr val="accent1"/>
+                      </a:effectRef>
+                      <a:fontRef idx="minor">
+                        <a:schemeClr val="lt1"/>
+                      </a:fontRef>
+                    </p:style>
+                    <p:txBody>
+                      <a:bodyPr rtlCol="0" anchor="ctr"/>
+                      <a:lstStyle/>
+                      <a:p>
+                        <a:pPr algn="ctr"/>
+                        <a:endParaRPr lang="en-US"/>
+                      </a:p>
+                    </p:txBody>
+                  </p:sp>
+                  <p:cxnSp>
+                    <p:nvCxnSpPr>
+                      <p:cNvPr id="42" name="Straight Connector 41"/>
+                      <p:cNvCxnSpPr/>
+                      <p:nvPr/>
+                    </p:nvCxnSpPr>
+                    <p:spPr>
+                      <a:xfrm flipH="1" flipV="1">
+                        <a:off x="4896162" y="1131637"/>
+                        <a:ext cx="3460202" cy="1885507"/>
+                      </a:xfrm>
+                      <a:prstGeom prst="line">
+                        <a:avLst/>
+                      </a:prstGeom>
+                      <a:ln w="50800">
+                        <a:solidFill>
+                          <a:srgbClr val="FF0000"/>
+                        </a:solidFill>
+                      </a:ln>
+                      <a:effectLst/>
+                    </p:spPr>
+                    <p:style>
+                      <a:lnRef idx="2">
+                        <a:schemeClr val="accent1"/>
+                      </a:lnRef>
+                      <a:fillRef idx="0">
+                        <a:schemeClr val="accent1"/>
+                      </a:fillRef>
+                      <a:effectRef idx="1">
+                        <a:schemeClr val="accent1"/>
+                      </a:effectRef>
+                      <a:fontRef idx="minor">
                         <a:schemeClr val="tx1"/>
+                      </a:fontRef>
+                    </p:style>
+                  </p:cxnSp>
+                  <p:sp>
+                    <p:nvSpPr>
+                      <p:cNvPr id="43" name="TextBox 42"/>
+                      <p:cNvSpPr txBox="1"/>
+                      <p:nvPr/>
+                    </p:nvSpPr>
+                    <p:spPr>
+                      <a:xfrm>
+                        <a:off x="4896162" y="4112494"/>
+                        <a:ext cx="3460202" cy="461665"/>
+                      </a:xfrm>
+                      <a:prstGeom prst="rect">
+                        <a:avLst/>
+                      </a:prstGeom>
+                      <a:noFill/>
+                    </p:spPr>
+                    <p:txBody>
+                      <a:bodyPr wrap="none" rtlCol="0">
+                        <a:spAutoFit/>
+                      </a:bodyPr>
+                      <a:lstStyle/>
+                      <a:p>
+                        <a:r>
+                          <a:rPr lang="en-US" sz="2400" dirty="0" smtClean="0">
+                            <a:latin typeface="Gill Sans"/>
+                            <a:cs typeface="Gill Sans"/>
+                          </a:rPr>
+                          <a:t>(b) Mixed Dirty and Clean</a:t>
+                        </a:r>
+                        <a:endParaRPr lang="en-US" sz="2400" dirty="0">
+                          <a:latin typeface="Gill Sans"/>
+                          <a:cs typeface="Gill Sans"/>
+                        </a:endParaRPr>
+                      </a:p>
+                    </p:txBody>
+                  </p:sp>
+                  <p:sp>
+                    <p:nvSpPr>
+                      <p:cNvPr id="44" name="Multiply 43"/>
+                      <p:cNvSpPr/>
+                      <p:nvPr/>
+                    </p:nvSpPr>
+                    <p:spPr>
+                      <a:xfrm>
+                        <a:off x="5200790" y="1093085"/>
+                        <a:ext cx="405915" cy="405915"/>
+                      </a:xfrm>
+                      <a:prstGeom prst="mathMultiply">
+                        <a:avLst/>
+                      </a:prstGeom>
+                      <a:solidFill>
+                        <a:schemeClr val="accent6">
+                          <a:lumMod val="50000"/>
+                          <a:alpha val="83000"/>
+                        </a:schemeClr>
                       </a:solidFill>
-                      <a:tailEnd type="triangle"/>
-                    </a:ln>
-                    <a:effectLst/>
-                  </p:spPr>
-                  <p:style>
-                    <a:lnRef idx="2">
-                      <a:schemeClr val="accent1"/>
-                    </a:lnRef>
-                    <a:fillRef idx="0">
-                      <a:schemeClr val="accent1"/>
-                    </a:fillRef>
-                    <a:effectRef idx="1">
-                      <a:schemeClr val="accent1"/>
-                    </a:effectRef>
-                    <a:fontRef idx="minor">
-                      <a:schemeClr val="tx1"/>
-                    </a:fontRef>
-                  </p:style>
-                </p:cxnSp>
+                      <a:ln>
+                        <a:solidFill>
+                          <a:schemeClr val="tx1"/>
+                        </a:solidFill>
+                      </a:ln>
+                      <a:effectLst/>
+                    </p:spPr>
+                    <p:style>
+                      <a:lnRef idx="1">
+                        <a:schemeClr val="accent1"/>
+                      </a:lnRef>
+                      <a:fillRef idx="3">
+                        <a:schemeClr val="accent1"/>
+                      </a:fillRef>
+                      <a:effectRef idx="2">
+                        <a:schemeClr val="accent1"/>
+                      </a:effectRef>
+                      <a:fontRef idx="minor">
+                        <a:schemeClr val="lt1"/>
+                      </a:fontRef>
+                    </p:style>
+                    <p:txBody>
+                      <a:bodyPr rtlCol="0" anchor="ctr"/>
+                      <a:lstStyle/>
+                      <a:p>
+                        <a:pPr algn="ctr"/>
+                        <a:endParaRPr lang="en-US"/>
+                      </a:p>
+                    </p:txBody>
+                  </p:sp>
+                  <p:sp>
+                    <p:nvSpPr>
+                      <p:cNvPr id="45" name="Multiply 44"/>
+                      <p:cNvSpPr/>
+                      <p:nvPr/>
+                    </p:nvSpPr>
+                    <p:spPr>
+                      <a:xfrm>
+                        <a:off x="5606705" y="1979838"/>
+                        <a:ext cx="405915" cy="405915"/>
+                      </a:xfrm>
+                      <a:prstGeom prst="mathMultiply">
+                        <a:avLst/>
+                      </a:prstGeom>
+                      <a:solidFill>
+                        <a:schemeClr val="accent6">
+                          <a:lumMod val="50000"/>
+                          <a:alpha val="83000"/>
+                        </a:schemeClr>
+                      </a:solidFill>
+                      <a:ln>
+                        <a:solidFill>
+                          <a:schemeClr val="tx1"/>
+                        </a:solidFill>
+                      </a:ln>
+                      <a:effectLst/>
+                    </p:spPr>
+                    <p:style>
+                      <a:lnRef idx="1">
+                        <a:schemeClr val="accent1"/>
+                      </a:lnRef>
+                      <a:fillRef idx="3">
+                        <a:schemeClr val="accent1"/>
+                      </a:fillRef>
+                      <a:effectRef idx="2">
+                        <a:schemeClr val="accent1"/>
+                      </a:effectRef>
+                      <a:fontRef idx="minor">
+                        <a:schemeClr val="lt1"/>
+                      </a:fontRef>
+                    </p:style>
+                    <p:txBody>
+                      <a:bodyPr rtlCol="0" anchor="ctr"/>
+                      <a:lstStyle/>
+                      <a:p>
+                        <a:pPr algn="ctr"/>
+                        <a:endParaRPr lang="en-US"/>
+                      </a:p>
+                    </p:txBody>
+                  </p:sp>
+                  <p:sp>
+                    <p:nvSpPr>
+                      <p:cNvPr id="47" name="Multiply 46"/>
+                      <p:cNvSpPr/>
+                      <p:nvPr/>
+                    </p:nvSpPr>
+                    <p:spPr>
+                      <a:xfrm>
+                        <a:off x="6015940" y="1093085"/>
+                        <a:ext cx="405915" cy="405915"/>
+                      </a:xfrm>
+                      <a:prstGeom prst="mathMultiply">
+                        <a:avLst/>
+                      </a:prstGeom>
+                      <a:solidFill>
+                        <a:schemeClr val="accent6">
+                          <a:lumMod val="50000"/>
+                          <a:alpha val="83000"/>
+                        </a:schemeClr>
+                      </a:solidFill>
+                      <a:ln>
+                        <a:solidFill>
+                          <a:schemeClr val="tx1"/>
+                        </a:solidFill>
+                      </a:ln>
+                      <a:effectLst/>
+                    </p:spPr>
+                    <p:style>
+                      <a:lnRef idx="1">
+                        <a:schemeClr val="accent1"/>
+                      </a:lnRef>
+                      <a:fillRef idx="3">
+                        <a:schemeClr val="accent1"/>
+                      </a:fillRef>
+                      <a:effectRef idx="2">
+                        <a:schemeClr val="accent1"/>
+                      </a:effectRef>
+                      <a:fontRef idx="minor">
+                        <a:schemeClr val="lt1"/>
+                      </a:fontRef>
+                    </p:style>
+                    <p:txBody>
+                      <a:bodyPr rtlCol="0" anchor="ctr"/>
+                      <a:lstStyle/>
+                      <a:p>
+                        <a:pPr algn="ctr"/>
+                        <a:endParaRPr lang="en-US"/>
+                      </a:p>
+                    </p:txBody>
+                  </p:sp>
+                  <p:sp>
+                    <p:nvSpPr>
+                      <p:cNvPr id="52" name="Multiply 51"/>
+                      <p:cNvSpPr/>
+                      <p:nvPr/>
+                    </p:nvSpPr>
+                    <p:spPr>
+                      <a:xfrm>
+                        <a:off x="1253911" y="1134190"/>
+                        <a:ext cx="405915" cy="405915"/>
+                      </a:xfrm>
+                      <a:prstGeom prst="mathMultiply">
+                        <a:avLst/>
+                      </a:prstGeom>
+                      <a:solidFill>
+                        <a:schemeClr val="accent6">
+                          <a:lumMod val="50000"/>
+                          <a:alpha val="83000"/>
+                        </a:schemeClr>
+                      </a:solidFill>
+                      <a:ln>
+                        <a:solidFill>
+                          <a:schemeClr val="tx1"/>
+                        </a:solidFill>
+                      </a:ln>
+                      <a:effectLst/>
+                    </p:spPr>
+                    <p:style>
+                      <a:lnRef idx="1">
+                        <a:schemeClr val="accent1"/>
+                      </a:lnRef>
+                      <a:fillRef idx="3">
+                        <a:schemeClr val="accent1"/>
+                      </a:fillRef>
+                      <a:effectRef idx="2">
+                        <a:schemeClr val="accent1"/>
+                      </a:effectRef>
+                      <a:fontRef idx="minor">
+                        <a:schemeClr val="lt1"/>
+                      </a:fontRef>
+                    </p:style>
+                    <p:txBody>
+                      <a:bodyPr rtlCol="0" anchor="ctr"/>
+                      <a:lstStyle/>
+                      <a:p>
+                        <a:pPr algn="ctr"/>
+                        <a:endParaRPr lang="en-US"/>
+                      </a:p>
+                    </p:txBody>
+                  </p:sp>
+                  <p:sp>
+                    <p:nvSpPr>
+                      <p:cNvPr id="53" name="Multiply 52"/>
+                      <p:cNvSpPr/>
+                      <p:nvPr/>
+                    </p:nvSpPr>
+                    <p:spPr>
+                      <a:xfrm>
+                        <a:off x="1306126" y="1767428"/>
+                        <a:ext cx="405915" cy="405915"/>
+                      </a:xfrm>
+                      <a:prstGeom prst="mathMultiply">
+                        <a:avLst/>
+                      </a:prstGeom>
+                      <a:solidFill>
+                        <a:schemeClr val="accent6">
+                          <a:lumMod val="50000"/>
+                          <a:alpha val="83000"/>
+                        </a:schemeClr>
+                      </a:solidFill>
+                      <a:ln>
+                        <a:solidFill>
+                          <a:schemeClr val="tx1"/>
+                        </a:solidFill>
+                      </a:ln>
+                      <a:effectLst/>
+                    </p:spPr>
+                    <p:style>
+                      <a:lnRef idx="1">
+                        <a:schemeClr val="accent1"/>
+                      </a:lnRef>
+                      <a:fillRef idx="3">
+                        <a:schemeClr val="accent1"/>
+                      </a:fillRef>
+                      <a:effectRef idx="2">
+                        <a:schemeClr val="accent1"/>
+                      </a:effectRef>
+                      <a:fontRef idx="minor">
+                        <a:schemeClr val="lt1"/>
+                      </a:fontRef>
+                    </p:style>
+                    <p:txBody>
+                      <a:bodyPr rtlCol="0" anchor="ctr"/>
+                      <a:lstStyle/>
+                      <a:p>
+                        <a:pPr algn="ctr"/>
+                        <a:endParaRPr lang="en-US"/>
+                      </a:p>
+                    </p:txBody>
+                  </p:sp>
+                  <p:sp>
+                    <p:nvSpPr>
+                      <p:cNvPr id="54" name="Multiply 53"/>
+                      <p:cNvSpPr/>
+                      <p:nvPr/>
+                    </p:nvSpPr>
+                    <p:spPr>
+                      <a:xfrm>
+                        <a:off x="1452540" y="2268633"/>
+                        <a:ext cx="405915" cy="405915"/>
+                      </a:xfrm>
+                      <a:prstGeom prst="mathMultiply">
+                        <a:avLst/>
+                      </a:prstGeom>
+                      <a:solidFill>
+                        <a:schemeClr val="accent6">
+                          <a:lumMod val="50000"/>
+                          <a:alpha val="83000"/>
+                        </a:schemeClr>
+                      </a:solidFill>
+                      <a:ln>
+                        <a:solidFill>
+                          <a:schemeClr val="tx1"/>
+                        </a:solidFill>
+                      </a:ln>
+                      <a:effectLst/>
+                    </p:spPr>
+                    <p:style>
+                      <a:lnRef idx="1">
+                        <a:schemeClr val="accent1"/>
+                      </a:lnRef>
+                      <a:fillRef idx="3">
+                        <a:schemeClr val="accent1"/>
+                      </a:fillRef>
+                      <a:effectRef idx="2">
+                        <a:schemeClr val="accent1"/>
+                      </a:effectRef>
+                      <a:fontRef idx="minor">
+                        <a:schemeClr val="lt1"/>
+                      </a:fontRef>
+                    </p:style>
+                    <p:txBody>
+                      <a:bodyPr rtlCol="0" anchor="ctr"/>
+                      <a:lstStyle/>
+                      <a:p>
+                        <a:pPr algn="ctr"/>
+                        <a:endParaRPr lang="en-US"/>
+                      </a:p>
+                    </p:txBody>
+                  </p:sp>
+                  <p:sp>
+                    <p:nvSpPr>
+                      <p:cNvPr id="55" name="Multiply 54"/>
+                      <p:cNvSpPr/>
+                      <p:nvPr/>
+                    </p:nvSpPr>
+                    <p:spPr>
+                      <a:xfrm>
+                        <a:off x="1712041" y="1895462"/>
+                        <a:ext cx="405915" cy="405915"/>
+                      </a:xfrm>
+                      <a:prstGeom prst="mathMultiply">
+                        <a:avLst/>
+                      </a:prstGeom>
+                      <a:solidFill>
+                        <a:schemeClr val="accent6">
+                          <a:lumMod val="50000"/>
+                          <a:alpha val="83000"/>
+                        </a:schemeClr>
+                      </a:solidFill>
+                      <a:ln>
+                        <a:solidFill>
+                          <a:schemeClr val="tx1"/>
+                        </a:solidFill>
+                      </a:ln>
+                      <a:effectLst/>
+                    </p:spPr>
+                    <p:style>
+                      <a:lnRef idx="1">
+                        <a:schemeClr val="accent1"/>
+                      </a:lnRef>
+                      <a:fillRef idx="3">
+                        <a:schemeClr val="accent1"/>
+                      </a:fillRef>
+                      <a:effectRef idx="2">
+                        <a:schemeClr val="accent1"/>
+                      </a:effectRef>
+                      <a:fontRef idx="minor">
+                        <a:schemeClr val="lt1"/>
+                      </a:fontRef>
+                    </p:style>
+                    <p:txBody>
+                      <a:bodyPr rtlCol="0" anchor="ctr"/>
+                      <a:lstStyle/>
+                      <a:p>
+                        <a:pPr algn="ctr"/>
+                        <a:endParaRPr lang="en-US"/>
+                      </a:p>
+                    </p:txBody>
+                  </p:sp>
+                  <p:sp>
+                    <p:nvSpPr>
+                      <p:cNvPr id="56" name="Multiply 55"/>
+                      <p:cNvSpPr/>
+                      <p:nvPr/>
+                    </p:nvSpPr>
+                    <p:spPr>
+                      <a:xfrm>
+                        <a:off x="2065741" y="1035421"/>
+                        <a:ext cx="405915" cy="405915"/>
+                      </a:xfrm>
+                      <a:prstGeom prst="mathMultiply">
+                        <a:avLst/>
+                      </a:prstGeom>
+                      <a:solidFill>
+                        <a:schemeClr val="accent6">
+                          <a:lumMod val="50000"/>
+                          <a:alpha val="83000"/>
+                        </a:schemeClr>
+                      </a:solidFill>
+                      <a:ln>
+                        <a:solidFill>
+                          <a:schemeClr val="tx1"/>
+                        </a:solidFill>
+                      </a:ln>
+                      <a:effectLst/>
+                    </p:spPr>
+                    <p:style>
+                      <a:lnRef idx="1">
+                        <a:schemeClr val="accent1"/>
+                      </a:lnRef>
+                      <a:fillRef idx="3">
+                        <a:schemeClr val="accent1"/>
+                      </a:fillRef>
+                      <a:effectRef idx="2">
+                        <a:schemeClr val="accent1"/>
+                      </a:effectRef>
+                      <a:fontRef idx="minor">
+                        <a:schemeClr val="lt1"/>
+                      </a:fontRef>
+                    </p:style>
+                    <p:txBody>
+                      <a:bodyPr rtlCol="0" anchor="ctr"/>
+                      <a:lstStyle/>
+                      <a:p>
+                        <a:pPr algn="ctr"/>
+                        <a:endParaRPr lang="en-US"/>
+                      </a:p>
+                    </p:txBody>
+                  </p:sp>
+                  <p:cxnSp>
+                    <p:nvCxnSpPr>
+                      <p:cNvPr id="72" name="Straight Arrow Connector 71"/>
+                      <p:cNvCxnSpPr/>
+                      <p:nvPr/>
+                    </p:nvCxnSpPr>
+                    <p:spPr>
+                      <a:xfrm flipV="1">
+                        <a:off x="8862989" y="932859"/>
+                        <a:ext cx="0" cy="3116380"/>
+                      </a:xfrm>
+                      <a:prstGeom prst="straightConnector1">
+                        <a:avLst/>
+                      </a:prstGeom>
+                      <a:ln w="50800">
+                        <a:solidFill>
+                          <a:schemeClr val="tx1"/>
+                        </a:solidFill>
+                        <a:tailEnd type="triangle"/>
+                      </a:ln>
+                      <a:effectLst/>
+                    </p:spPr>
+                    <p:style>
+                      <a:lnRef idx="2">
+                        <a:schemeClr val="accent1"/>
+                      </a:lnRef>
+                      <a:fillRef idx="0">
+                        <a:schemeClr val="accent1"/>
+                      </a:fillRef>
+                      <a:effectRef idx="1">
+                        <a:schemeClr val="accent1"/>
+                      </a:effectRef>
+                      <a:fontRef idx="minor">
+                        <a:schemeClr val="tx1"/>
+                      </a:fontRef>
+                    </p:style>
+                  </p:cxnSp>
+                  <p:cxnSp>
+                    <p:nvCxnSpPr>
+                      <p:cNvPr id="73" name="Straight Arrow Connector 72"/>
+                      <p:cNvCxnSpPr/>
+                      <p:nvPr/>
+                    </p:nvCxnSpPr>
+                    <p:spPr>
+                      <a:xfrm flipV="1">
+                        <a:off x="8862989" y="4027778"/>
+                        <a:ext cx="3482804" cy="21461"/>
+                      </a:xfrm>
+                      <a:prstGeom prst="straightConnector1">
+                        <a:avLst/>
+                      </a:prstGeom>
+                      <a:ln w="50800">
+                        <a:solidFill>
+                          <a:schemeClr val="tx1"/>
+                        </a:solidFill>
+                        <a:tailEnd type="triangle"/>
+                      </a:ln>
+                      <a:effectLst/>
+                    </p:spPr>
+                    <p:style>
+                      <a:lnRef idx="2">
+                        <a:schemeClr val="accent1"/>
+                      </a:lnRef>
+                      <a:fillRef idx="0">
+                        <a:schemeClr val="accent1"/>
+                      </a:fillRef>
+                      <a:effectRef idx="1">
+                        <a:schemeClr val="accent1"/>
+                      </a:effectRef>
+                      <a:fontRef idx="minor">
+                        <a:schemeClr val="tx1"/>
+                      </a:fontRef>
+                    </p:style>
+                  </p:cxnSp>
+                  <p:sp>
+                    <p:nvSpPr>
+                      <p:cNvPr id="74" name="Multiply 73"/>
+                      <p:cNvSpPr/>
+                      <p:nvPr/>
+                    </p:nvSpPr>
+                    <p:spPr>
+                      <a:xfrm>
+                        <a:off x="11320175" y="2165580"/>
+                        <a:ext cx="405915" cy="405915"/>
+                      </a:xfrm>
+                      <a:prstGeom prst="mathMultiply">
+                        <a:avLst/>
+                      </a:prstGeom>
+                      <a:solidFill>
+                        <a:srgbClr val="00FF66"/>
+                      </a:solidFill>
+                      <a:ln>
+                        <a:solidFill>
+                          <a:schemeClr val="tx1"/>
+                        </a:solidFill>
+                      </a:ln>
+                      <a:effectLst/>
+                    </p:spPr>
+                    <p:style>
+                      <a:lnRef idx="1">
+                        <a:schemeClr val="accent1"/>
+                      </a:lnRef>
+                      <a:fillRef idx="3">
+                        <a:schemeClr val="accent1"/>
+                      </a:fillRef>
+                      <a:effectRef idx="2">
+                        <a:schemeClr val="accent1"/>
+                      </a:effectRef>
+                      <a:fontRef idx="minor">
+                        <a:schemeClr val="lt1"/>
+                      </a:fontRef>
+                    </p:style>
+                    <p:txBody>
+                      <a:bodyPr rtlCol="0" anchor="ctr"/>
+                      <a:lstStyle/>
+                      <a:p>
+                        <a:pPr algn="ctr"/>
+                        <a:endParaRPr lang="en-US"/>
+                      </a:p>
+                    </p:txBody>
+                  </p:sp>
+                  <p:sp>
+                    <p:nvSpPr>
+                      <p:cNvPr id="75" name="Multiply 74"/>
+                      <p:cNvSpPr/>
+                      <p:nvPr/>
+                    </p:nvSpPr>
+                    <p:spPr>
+                      <a:xfrm>
+                        <a:off x="11137493" y="1665164"/>
+                        <a:ext cx="405915" cy="405915"/>
+                      </a:xfrm>
+                      <a:prstGeom prst="mathMultiply">
+                        <a:avLst/>
+                      </a:prstGeom>
+                      <a:solidFill>
+                        <a:srgbClr val="00FF66"/>
+                      </a:solidFill>
+                      <a:ln>
+                        <a:solidFill>
+                          <a:schemeClr val="tx1"/>
+                        </a:solidFill>
+                      </a:ln>
+                      <a:effectLst/>
+                    </p:spPr>
+                    <p:style>
+                      <a:lnRef idx="1">
+                        <a:schemeClr val="accent1"/>
+                      </a:lnRef>
+                      <a:fillRef idx="3">
+                        <a:schemeClr val="accent1"/>
+                      </a:fillRef>
+                      <a:effectRef idx="2">
+                        <a:schemeClr val="accent1"/>
+                      </a:effectRef>
+                      <a:fontRef idx="minor">
+                        <a:schemeClr val="lt1"/>
+                      </a:fontRef>
+                    </p:style>
+                    <p:txBody>
+                      <a:bodyPr rtlCol="0" anchor="ctr"/>
+                      <a:lstStyle/>
+                      <a:p>
+                        <a:pPr algn="ctr"/>
+                        <a:endParaRPr lang="en-US"/>
+                      </a:p>
+                    </p:txBody>
+                  </p:sp>
+                  <p:sp>
+                    <p:nvSpPr>
+                      <p:cNvPr id="77" name="TextBox 76"/>
+                      <p:cNvSpPr txBox="1"/>
+                      <p:nvPr/>
+                    </p:nvSpPr>
+                    <p:spPr>
+                      <a:xfrm>
+                        <a:off x="9051431" y="4112494"/>
+                        <a:ext cx="3124323" cy="461665"/>
+                      </a:xfrm>
+                      <a:prstGeom prst="rect">
+                        <a:avLst/>
+                      </a:prstGeom>
+                      <a:noFill/>
+                    </p:spPr>
+                    <p:txBody>
+                      <a:bodyPr wrap="none" rtlCol="0">
+                        <a:spAutoFit/>
+                      </a:bodyPr>
+                      <a:lstStyle/>
+                      <a:p>
+                        <a:r>
+                          <a:rPr lang="en-US" sz="2400" dirty="0" smtClean="0">
+                            <a:latin typeface="Gill Sans"/>
+                            <a:cs typeface="Gill Sans"/>
+                          </a:rPr>
+                          <a:t>(c) Sampled Clean Data</a:t>
+                        </a:r>
+                        <a:endParaRPr lang="en-US" sz="2400" dirty="0">
+                          <a:latin typeface="Gill Sans"/>
+                          <a:cs typeface="Gill Sans"/>
+                        </a:endParaRPr>
+                      </a:p>
+                    </p:txBody>
+                  </p:sp>
+                  <p:cxnSp>
+                    <p:nvCxnSpPr>
+                      <p:cNvPr id="31" name="Straight Connector 30"/>
+                      <p:cNvCxnSpPr/>
+                      <p:nvPr/>
+                    </p:nvCxnSpPr>
+                    <p:spPr>
+                      <a:xfrm flipV="1">
+                        <a:off x="1921357" y="964236"/>
+                        <a:ext cx="2142643" cy="3125833"/>
+                      </a:xfrm>
+                      <a:prstGeom prst="line">
+                        <a:avLst/>
+                      </a:prstGeom>
+                      <a:ln w="50800">
+                        <a:solidFill>
+                          <a:srgbClr val="3366FF"/>
+                        </a:solidFill>
+                      </a:ln>
+                      <a:effectLst/>
+                    </p:spPr>
+                    <p:style>
+                      <a:lnRef idx="2">
+                        <a:schemeClr val="accent1"/>
+                      </a:lnRef>
+                      <a:fillRef idx="0">
+                        <a:schemeClr val="accent1"/>
+                      </a:fillRef>
+                      <a:effectRef idx="1">
+                        <a:schemeClr val="accent1"/>
+                      </a:effectRef>
+                      <a:fontRef idx="minor">
+                        <a:schemeClr val="tx1"/>
+                      </a:fontRef>
+                    </p:style>
+                  </p:cxnSp>
+                  <p:cxnSp>
+                    <p:nvCxnSpPr>
+                      <p:cNvPr id="51" name="Straight Connector 50"/>
+                      <p:cNvCxnSpPr/>
+                      <p:nvPr/>
+                    </p:nvCxnSpPr>
+                    <p:spPr>
+                      <a:xfrm flipV="1">
+                        <a:off x="1046625" y="964236"/>
+                        <a:ext cx="1163141" cy="1790702"/>
+                      </a:xfrm>
+                      <a:prstGeom prst="line">
+                        <a:avLst/>
+                      </a:prstGeom>
+                      <a:ln w="50800">
+                        <a:solidFill>
+                          <a:srgbClr val="FF0000"/>
+                        </a:solidFill>
+                      </a:ln>
+                      <a:effectLst/>
+                    </p:spPr>
+                    <p:style>
+                      <a:lnRef idx="2">
+                        <a:schemeClr val="accent1"/>
+                      </a:lnRef>
+                      <a:fillRef idx="0">
+                        <a:schemeClr val="accent1"/>
+                      </a:fillRef>
+                      <a:effectRef idx="1">
+                        <a:schemeClr val="accent1"/>
+                      </a:effectRef>
+                      <a:fontRef idx="minor">
+                        <a:schemeClr val="tx1"/>
+                      </a:fontRef>
+                    </p:style>
+                  </p:cxnSp>
+                </p:grpSp>
                 <p:sp>
                   <p:nvSpPr>
-                    <p:cNvPr id="25" name="Multiply 24"/>
+                    <p:cNvPr id="2" name="Rectangle 1"/>
                     <p:cNvSpPr/>
                     <p:nvPr/>
                   </p:nvSpPr>
                   <p:spPr>
                     <a:xfrm>
-                      <a:off x="2991351" y="1143643"/>
-                      <a:ext cx="405915" cy="405915"/>
+                      <a:off x="3539845" y="3334016"/>
+                      <a:ext cx="197311" cy="200528"/>
                     </a:xfrm>
-                    <a:prstGeom prst="mathMultiply">
+                    <a:prstGeom prst="rect">
                       <a:avLst/>
                     </a:prstGeom>
                     <a:solidFill>
                       <a:srgbClr val="00FF66"/>
                     </a:solidFill>
-                    <a:ln>
+                    <a:ln w="34925">
                       <a:solidFill>
                         <a:schemeClr val="tx1"/>
                       </a:solidFill>
@@ -13251,22 +14453,60 @@
                 </p:sp>
                 <p:sp>
                   <p:nvSpPr>
-                    <p:cNvPr id="26" name="Multiply 25"/>
+                    <p:cNvPr id="3" name="TextBox 2"/>
+                    <p:cNvSpPr txBox="1"/>
+                    <p:nvPr/>
+                  </p:nvSpPr>
+                  <p:spPr>
+                    <a:xfrm>
+                      <a:off x="3700024" y="3249614"/>
+                      <a:ext cx="723200" cy="369332"/>
+                    </a:xfrm>
+                    <a:prstGeom prst="rect">
+                      <a:avLst/>
+                    </a:prstGeom>
+                    <a:noFill/>
+                  </p:spPr>
+                  <p:txBody>
+                    <a:bodyPr wrap="none" rtlCol="0">
+                      <a:spAutoFit/>
+                    </a:bodyPr>
+                    <a:lstStyle/>
+                    <a:p>
+                      <a:r>
+                        <a:rPr lang="en-US" dirty="0" smtClean="0">
+                          <a:latin typeface="Gill Sans"/>
+                          <a:cs typeface="Gill Sans"/>
+                        </a:rPr>
+                        <a:t>Clean</a:t>
+                      </a:r>
+                      <a:endParaRPr lang="en-US" dirty="0">
+                        <a:latin typeface="Gill Sans"/>
+                        <a:cs typeface="Gill Sans"/>
+                      </a:endParaRPr>
+                    </a:p>
+                  </p:txBody>
+                </p:sp>
+                <p:sp>
+                  <p:nvSpPr>
+                    <p:cNvPr id="49" name="Rectangle 48"/>
                     <p:cNvSpPr/>
                     <p:nvPr/>
                   </p:nvSpPr>
                   <p:spPr>
                     <a:xfrm>
-                      <a:off x="3043566" y="1776881"/>
-                      <a:ext cx="405915" cy="405915"/>
+                      <a:off x="3539845" y="3703348"/>
+                      <a:ext cx="197311" cy="200528"/>
                     </a:xfrm>
-                    <a:prstGeom prst="mathMultiply">
+                    <a:prstGeom prst="rect">
                       <a:avLst/>
                     </a:prstGeom>
                     <a:solidFill>
-                      <a:srgbClr val="00FF66"/>
+                      <a:schemeClr val="accent6">
+                        <a:lumMod val="50000"/>
+                      </a:schemeClr>
                     </a:solidFill>
-                    <a:ln>
+                    <a:ln w="34925">
                       <a:solidFill>
                         <a:schemeClr val="tx1"/>
                       </a:solidFill>
@@ -13298,155 +14538,14 @@
                 </p:sp>
                 <p:sp>
                   <p:nvSpPr>
-                    <p:cNvPr id="27" name="Multiply 26"/>
-                    <p:cNvSpPr/>
-                    <p:nvPr/>
-                  </p:nvSpPr>
-                  <p:spPr>
-                    <a:xfrm>
-                      <a:off x="3189980" y="2278086"/>
-                      <a:ext cx="405915" cy="405915"/>
-                    </a:xfrm>
-                    <a:prstGeom prst="mathMultiply">
-                      <a:avLst/>
-                    </a:prstGeom>
-                    <a:solidFill>
-                      <a:srgbClr val="00FF66"/>
-                    </a:solidFill>
-                    <a:ln>
-                      <a:solidFill>
-                        <a:schemeClr val="tx1"/>
-                      </a:solidFill>
-                    </a:ln>
-                    <a:effectLst/>
-                  </p:spPr>
-                  <p:style>
-                    <a:lnRef idx="1">
-                      <a:schemeClr val="accent1"/>
-                    </a:lnRef>
-                    <a:fillRef idx="3">
-                      <a:schemeClr val="accent1"/>
-                    </a:fillRef>
-                    <a:effectRef idx="2">
-                      <a:schemeClr val="accent1"/>
-                    </a:effectRef>
-                    <a:fontRef idx="minor">
-                      <a:schemeClr val="lt1"/>
-                    </a:fontRef>
-                  </p:style>
-                  <p:txBody>
-                    <a:bodyPr rtlCol="0" anchor="ctr"/>
-                    <a:lstStyle/>
-                    <a:p>
-                      <a:pPr algn="ctr"/>
-                      <a:endParaRPr lang="en-US"/>
-                    </a:p>
-                  </p:txBody>
-                </p:sp>
-                <p:sp>
-                  <p:nvSpPr>
-                    <p:cNvPr id="28" name="Multiply 27"/>
-                    <p:cNvSpPr/>
-                    <p:nvPr/>
-                  </p:nvSpPr>
-                  <p:spPr>
-                    <a:xfrm>
-                      <a:off x="3449481" y="1904915"/>
-                      <a:ext cx="405915" cy="405915"/>
-                    </a:xfrm>
-                    <a:prstGeom prst="mathMultiply">
-                      <a:avLst/>
-                    </a:prstGeom>
-                    <a:solidFill>
-                      <a:srgbClr val="00FF66"/>
-                    </a:solidFill>
-                    <a:ln>
-                      <a:solidFill>
-                        <a:schemeClr val="tx1"/>
-                      </a:solidFill>
-                    </a:ln>
-                    <a:effectLst/>
-                  </p:spPr>
-                  <p:style>
-                    <a:lnRef idx="1">
-                      <a:schemeClr val="accent1"/>
-                    </a:lnRef>
-                    <a:fillRef idx="3">
-                      <a:schemeClr val="accent1"/>
-                    </a:fillRef>
-                    <a:effectRef idx="2">
-                      <a:schemeClr val="accent1"/>
-                    </a:effectRef>
-                    <a:fontRef idx="minor">
-                      <a:schemeClr val="lt1"/>
-                    </a:fontRef>
-                  </p:style>
-                  <p:txBody>
-                    <a:bodyPr rtlCol="0" anchor="ctr"/>
-                    <a:lstStyle/>
-                    <a:p>
-                      <a:pPr algn="ctr"/>
-                      <a:endParaRPr lang="en-US"/>
-                    </a:p>
-                  </p:txBody>
-                </p:sp>
-                <p:sp>
-                  <p:nvSpPr>
-                    <p:cNvPr id="29" name="Multiply 28"/>
-                    <p:cNvSpPr/>
-                    <p:nvPr/>
-                  </p:nvSpPr>
-                  <p:spPr>
-                    <a:xfrm>
-                      <a:off x="3855396" y="1035421"/>
-                      <a:ext cx="405915" cy="405915"/>
-                    </a:xfrm>
-                    <a:prstGeom prst="mathMultiply">
-                      <a:avLst/>
-                    </a:prstGeom>
-                    <a:solidFill>
-                      <a:srgbClr val="00FF66"/>
-                    </a:solidFill>
-                    <a:ln>
-                      <a:solidFill>
-                        <a:schemeClr val="tx1"/>
-                      </a:solidFill>
-                    </a:ln>
-                    <a:effectLst/>
-                  </p:spPr>
-                  <p:style>
-                    <a:lnRef idx="1">
-                      <a:schemeClr val="accent1"/>
-                    </a:lnRef>
-                    <a:fillRef idx="3">
-                      <a:schemeClr val="accent1"/>
-                    </a:fillRef>
-                    <a:effectRef idx="2">
-                      <a:schemeClr val="accent1"/>
-                    </a:effectRef>
-                    <a:fontRef idx="minor">
-                      <a:schemeClr val="lt1"/>
-                    </a:fontRef>
-                  </p:style>
-                  <p:txBody>
-                    <a:bodyPr rtlCol="0" anchor="ctr"/>
-                    <a:lstStyle/>
-                    <a:p>
-                      <a:pPr algn="ctr"/>
-                      <a:endParaRPr lang="en-US"/>
-                    </a:p>
-                  </p:txBody>
-                </p:sp>
-                <p:sp>
-                  <p:nvSpPr>
-                    <p:cNvPr id="33" name="TextBox 32"/>
+                    <p:cNvPr id="50" name="TextBox 49"/>
                     <p:cNvSpPr txBox="1"/>
                     <p:nvPr/>
                   </p:nvSpPr>
                   <p:spPr>
                     <a:xfrm>
-                      <a:off x="1236114" y="4108154"/>
-                      <a:ext cx="2685351" cy="461665"/>
+                      <a:off x="3700024" y="3618946"/>
+                      <a:ext cx="684803" cy="369332"/>
                     </a:xfrm>
                     <a:prstGeom prst="rect">
                       <a:avLst/>
@@ -13460,1231 +14559,275 @@
                     <a:lstStyle/>
                     <a:p>
                       <a:r>
-                        <a:rPr lang="en-US" sz="2400" dirty="0" smtClean="0">
+                        <a:rPr lang="en-US" dirty="0" smtClean="0">
                           <a:latin typeface="Gill Sans"/>
                           <a:cs typeface="Gill Sans"/>
                         </a:rPr>
-                        <a:t>(a) Systematic Error</a:t>
+                        <a:t>Dirty</a:t>
                       </a:r>
-                      <a:endParaRPr lang="en-US" sz="2400" dirty="0">
+                      <a:endParaRPr lang="en-US" dirty="0">
                         <a:latin typeface="Gill Sans"/>
                         <a:cs typeface="Gill Sans"/>
                       </a:endParaRPr>
                     </a:p>
                   </p:txBody>
                 </p:sp>
-                <p:cxnSp>
-                  <p:nvCxnSpPr>
-                    <p:cNvPr id="34" name="Straight Arrow Connector 33"/>
-                    <p:cNvCxnSpPr/>
-                    <p:nvPr/>
-                  </p:nvCxnSpPr>
-                  <p:spPr>
-                    <a:xfrm flipV="1">
-                      <a:off x="4896162" y="922129"/>
-                      <a:ext cx="0" cy="3116380"/>
-                    </a:xfrm>
-                    <a:prstGeom prst="straightConnector1">
-                      <a:avLst/>
-                    </a:prstGeom>
-                    <a:ln w="50800">
-                      <a:solidFill>
-                        <a:schemeClr val="tx1"/>
-                      </a:solidFill>
-                      <a:tailEnd type="triangle"/>
-                    </a:ln>
-                    <a:effectLst/>
-                  </p:spPr>
-                  <p:style>
-                    <a:lnRef idx="2">
-                      <a:schemeClr val="accent1"/>
-                    </a:lnRef>
-                    <a:fillRef idx="0">
-                      <a:schemeClr val="accent1"/>
-                    </a:fillRef>
-                    <a:effectRef idx="1">
-                      <a:schemeClr val="accent1"/>
-                    </a:effectRef>
-                    <a:fontRef idx="minor">
-                      <a:schemeClr val="tx1"/>
-                    </a:fontRef>
-                  </p:style>
-                </p:cxnSp>
-                <p:cxnSp>
-                  <p:nvCxnSpPr>
-                    <p:cNvPr id="35" name="Straight Arrow Connector 34"/>
-                    <p:cNvCxnSpPr/>
-                    <p:nvPr/>
-                  </p:nvCxnSpPr>
-                  <p:spPr>
-                    <a:xfrm flipV="1">
-                      <a:off x="4896162" y="4017048"/>
-                      <a:ext cx="3482804" cy="21461"/>
-                    </a:xfrm>
-                    <a:prstGeom prst="straightConnector1">
-                      <a:avLst/>
-                    </a:prstGeom>
-                    <a:ln w="50800">
-                      <a:solidFill>
-                        <a:schemeClr val="tx1"/>
-                      </a:solidFill>
-                      <a:tailEnd type="triangle"/>
-                    </a:ln>
-                    <a:effectLst/>
-                  </p:spPr>
-                  <p:style>
-                    <a:lnRef idx="2">
-                      <a:schemeClr val="accent1"/>
-                    </a:lnRef>
-                    <a:fillRef idx="0">
-                      <a:schemeClr val="accent1"/>
-                    </a:fillRef>
-                    <a:effectRef idx="1">
-                      <a:schemeClr val="accent1"/>
-                    </a:effectRef>
-                    <a:fontRef idx="minor">
-                      <a:schemeClr val="tx1"/>
-                    </a:fontRef>
-                  </p:style>
-                </p:cxnSp>
-                <p:sp>
-                  <p:nvSpPr>
-                    <p:cNvPr id="39" name="Multiply 38"/>
-                    <p:cNvSpPr/>
-                    <p:nvPr/>
-                  </p:nvSpPr>
-                  <p:spPr>
-                    <a:xfrm>
-                      <a:off x="6668041" y="1804529"/>
-                      <a:ext cx="405915" cy="405915"/>
-                    </a:xfrm>
-                    <a:prstGeom prst="mathMultiply">
-                      <a:avLst/>
-                    </a:prstGeom>
-                    <a:solidFill>
-                      <a:srgbClr val="00FF66"/>
-                    </a:solidFill>
-                    <a:ln>
-                      <a:solidFill>
-                        <a:schemeClr val="tx1"/>
-                      </a:solidFill>
-                    </a:ln>
-                    <a:effectLst/>
-                  </p:spPr>
-                  <p:style>
-                    <a:lnRef idx="1">
-                      <a:schemeClr val="accent1"/>
-                    </a:lnRef>
-                    <a:fillRef idx="3">
-                      <a:schemeClr val="accent1"/>
-                    </a:fillRef>
-                    <a:effectRef idx="2">
-                      <a:schemeClr val="accent1"/>
-                    </a:effectRef>
-                    <a:fontRef idx="minor">
-                      <a:schemeClr val="lt1"/>
-                    </a:fontRef>
-                  </p:style>
-                  <p:txBody>
-                    <a:bodyPr rtlCol="0" anchor="ctr"/>
-                    <a:lstStyle/>
-                    <a:p>
-                      <a:pPr algn="ctr"/>
-                      <a:endParaRPr lang="en-US"/>
-                    </a:p>
-                  </p:txBody>
-                </p:sp>
-                <p:sp>
-                  <p:nvSpPr>
-                    <p:cNvPr id="41" name="Multiply 40"/>
-                    <p:cNvSpPr/>
-                    <p:nvPr/>
-                  </p:nvSpPr>
-                  <p:spPr>
-                    <a:xfrm>
-                      <a:off x="6870999" y="2303486"/>
-                      <a:ext cx="405915" cy="405915"/>
-                    </a:xfrm>
-                    <a:prstGeom prst="mathMultiply">
-                      <a:avLst/>
-                    </a:prstGeom>
-                    <a:solidFill>
-                      <a:srgbClr val="00FF66"/>
-                    </a:solidFill>
-                    <a:ln>
-                      <a:solidFill>
-                        <a:schemeClr val="tx1"/>
-                      </a:solidFill>
-                    </a:ln>
-                    <a:effectLst/>
-                  </p:spPr>
-                  <p:style>
-                    <a:lnRef idx="1">
-                      <a:schemeClr val="accent1"/>
-                    </a:lnRef>
-                    <a:fillRef idx="3">
-                      <a:schemeClr val="accent1"/>
-                    </a:fillRef>
-                    <a:effectRef idx="2">
-                      <a:schemeClr val="accent1"/>
-                    </a:effectRef>
-                    <a:fontRef idx="minor">
-                      <a:schemeClr val="lt1"/>
-                    </a:fontRef>
-                  </p:style>
-                  <p:txBody>
-                    <a:bodyPr rtlCol="0" anchor="ctr"/>
-                    <a:lstStyle/>
-                    <a:p>
-                      <a:pPr algn="ctr"/>
-                      <a:endParaRPr lang="en-US"/>
-                    </a:p>
-                  </p:txBody>
-                </p:sp>
-                <p:cxnSp>
-                  <p:nvCxnSpPr>
-                    <p:cNvPr id="42" name="Straight Connector 41"/>
-                    <p:cNvCxnSpPr/>
-                    <p:nvPr/>
-                  </p:nvCxnSpPr>
-                  <p:spPr>
-                    <a:xfrm flipH="1" flipV="1">
-                      <a:off x="4896162" y="1131637"/>
-                      <a:ext cx="3460202" cy="1885507"/>
-                    </a:xfrm>
-                    <a:prstGeom prst="line">
-                      <a:avLst/>
-                    </a:prstGeom>
-                    <a:ln w="50800">
-                      <a:solidFill>
-                        <a:srgbClr val="FF0000"/>
-                      </a:solidFill>
-                    </a:ln>
-                    <a:effectLst/>
-                  </p:spPr>
-                  <p:style>
-                    <a:lnRef idx="2">
-                      <a:schemeClr val="accent1"/>
-                    </a:lnRef>
-                    <a:fillRef idx="0">
-                      <a:schemeClr val="accent1"/>
-                    </a:fillRef>
-                    <a:effectRef idx="1">
-                      <a:schemeClr val="accent1"/>
-                    </a:effectRef>
-                    <a:fontRef idx="minor">
-                      <a:schemeClr val="tx1"/>
-                    </a:fontRef>
-                  </p:style>
-                </p:cxnSp>
-                <p:sp>
-                  <p:nvSpPr>
-                    <p:cNvPr id="43" name="TextBox 42"/>
-                    <p:cNvSpPr txBox="1"/>
-                    <p:nvPr/>
-                  </p:nvSpPr>
-                  <p:spPr>
-                    <a:xfrm>
-                      <a:off x="4896162" y="4112494"/>
-                      <a:ext cx="3460202" cy="461665"/>
-                    </a:xfrm>
-                    <a:prstGeom prst="rect">
-                      <a:avLst/>
-                    </a:prstGeom>
-                    <a:noFill/>
-                  </p:spPr>
-                  <p:txBody>
-                    <a:bodyPr wrap="none" rtlCol="0">
-                      <a:spAutoFit/>
-                    </a:bodyPr>
-                    <a:lstStyle/>
-                    <a:p>
-                      <a:r>
-                        <a:rPr lang="en-US" sz="2400" dirty="0" smtClean="0">
-                          <a:latin typeface="Gill Sans"/>
-                          <a:cs typeface="Gill Sans"/>
-                        </a:rPr>
-                        <a:t>(b) Mixed Dirty and Clean</a:t>
-                      </a:r>
-                      <a:endParaRPr lang="en-US" sz="2400" dirty="0">
-                        <a:latin typeface="Gill Sans"/>
-                        <a:cs typeface="Gill Sans"/>
-                      </a:endParaRPr>
-                    </a:p>
-                  </p:txBody>
-                </p:sp>
-                <p:sp>
-                  <p:nvSpPr>
-                    <p:cNvPr id="44" name="Multiply 43"/>
-                    <p:cNvSpPr/>
-                    <p:nvPr/>
-                  </p:nvSpPr>
-                  <p:spPr>
-                    <a:xfrm>
-                      <a:off x="5200790" y="1093085"/>
-                      <a:ext cx="405915" cy="405915"/>
-                    </a:xfrm>
-                    <a:prstGeom prst="mathMultiply">
-                      <a:avLst/>
-                    </a:prstGeom>
-                    <a:solidFill>
-                      <a:schemeClr val="accent6">
-                        <a:lumMod val="50000"/>
-                        <a:alpha val="83000"/>
-                      </a:schemeClr>
-                    </a:solidFill>
-                    <a:ln>
-                      <a:solidFill>
-                        <a:schemeClr val="tx1"/>
-                      </a:solidFill>
-                    </a:ln>
-                    <a:effectLst/>
-                  </p:spPr>
-                  <p:style>
-                    <a:lnRef idx="1">
-                      <a:schemeClr val="accent1"/>
-                    </a:lnRef>
-                    <a:fillRef idx="3">
-                      <a:schemeClr val="accent1"/>
-                    </a:fillRef>
-                    <a:effectRef idx="2">
-                      <a:schemeClr val="accent1"/>
-                    </a:effectRef>
-                    <a:fontRef idx="minor">
-                      <a:schemeClr val="lt1"/>
-                    </a:fontRef>
-                  </p:style>
-                  <p:txBody>
-                    <a:bodyPr rtlCol="0" anchor="ctr"/>
-                    <a:lstStyle/>
-                    <a:p>
-                      <a:pPr algn="ctr"/>
-                      <a:endParaRPr lang="en-US"/>
-                    </a:p>
-                  </p:txBody>
-                </p:sp>
-                <p:sp>
-                  <p:nvSpPr>
-                    <p:cNvPr id="45" name="Multiply 44"/>
-                    <p:cNvSpPr/>
-                    <p:nvPr/>
-                  </p:nvSpPr>
-                  <p:spPr>
-                    <a:xfrm>
-                      <a:off x="5606705" y="1979838"/>
-                      <a:ext cx="405915" cy="405915"/>
-                    </a:xfrm>
-                    <a:prstGeom prst="mathMultiply">
-                      <a:avLst/>
-                    </a:prstGeom>
-                    <a:solidFill>
-                      <a:schemeClr val="accent6">
-                        <a:lumMod val="50000"/>
-                        <a:alpha val="83000"/>
-                      </a:schemeClr>
-                    </a:solidFill>
-                    <a:ln>
-                      <a:solidFill>
-                        <a:schemeClr val="tx1"/>
-                      </a:solidFill>
-                    </a:ln>
-                    <a:effectLst/>
-                  </p:spPr>
-                  <p:style>
-                    <a:lnRef idx="1">
-                      <a:schemeClr val="accent1"/>
-                    </a:lnRef>
-                    <a:fillRef idx="3">
-                      <a:schemeClr val="accent1"/>
-                    </a:fillRef>
-                    <a:effectRef idx="2">
-                      <a:schemeClr val="accent1"/>
-                    </a:effectRef>
-                    <a:fontRef idx="minor">
-                      <a:schemeClr val="lt1"/>
-                    </a:fontRef>
-                  </p:style>
-                  <p:txBody>
-                    <a:bodyPr rtlCol="0" anchor="ctr"/>
-                    <a:lstStyle/>
-                    <a:p>
-                      <a:pPr algn="ctr"/>
-                      <a:endParaRPr lang="en-US"/>
-                    </a:p>
-                  </p:txBody>
-                </p:sp>
-                <p:sp>
-                  <p:nvSpPr>
-                    <p:cNvPr id="47" name="Multiply 46"/>
-                    <p:cNvSpPr/>
-                    <p:nvPr/>
-                  </p:nvSpPr>
-                  <p:spPr>
-                    <a:xfrm>
-                      <a:off x="6015940" y="1093085"/>
-                      <a:ext cx="405915" cy="405915"/>
-                    </a:xfrm>
-                    <a:prstGeom prst="mathMultiply">
-                      <a:avLst/>
-                    </a:prstGeom>
-                    <a:solidFill>
-                      <a:schemeClr val="accent6">
-                        <a:lumMod val="50000"/>
-                        <a:alpha val="83000"/>
-                      </a:schemeClr>
-                    </a:solidFill>
-                    <a:ln>
-                      <a:solidFill>
-                        <a:schemeClr val="tx1"/>
-                      </a:solidFill>
-                    </a:ln>
-                    <a:effectLst/>
-                  </p:spPr>
-                  <p:style>
-                    <a:lnRef idx="1">
-                      <a:schemeClr val="accent1"/>
-                    </a:lnRef>
-                    <a:fillRef idx="3">
-                      <a:schemeClr val="accent1"/>
-                    </a:fillRef>
-                    <a:effectRef idx="2">
-                      <a:schemeClr val="accent1"/>
-                    </a:effectRef>
-                    <a:fontRef idx="minor">
-                      <a:schemeClr val="lt1"/>
-                    </a:fontRef>
-                  </p:style>
-                  <p:txBody>
-                    <a:bodyPr rtlCol="0" anchor="ctr"/>
-                    <a:lstStyle/>
-                    <a:p>
-                      <a:pPr algn="ctr"/>
-                      <a:endParaRPr lang="en-US"/>
-                    </a:p>
-                  </p:txBody>
-                </p:sp>
-                <p:sp>
-                  <p:nvSpPr>
-                    <p:cNvPr id="52" name="Multiply 51"/>
-                    <p:cNvSpPr/>
-                    <p:nvPr/>
-                  </p:nvSpPr>
-                  <p:spPr>
-                    <a:xfrm>
-                      <a:off x="1253911" y="1134190"/>
-                      <a:ext cx="405915" cy="405915"/>
-                    </a:xfrm>
-                    <a:prstGeom prst="mathMultiply">
-                      <a:avLst/>
-                    </a:prstGeom>
-                    <a:solidFill>
-                      <a:schemeClr val="accent6">
-                        <a:lumMod val="50000"/>
-                        <a:alpha val="83000"/>
-                      </a:schemeClr>
-                    </a:solidFill>
-                    <a:ln>
-                      <a:solidFill>
-                        <a:schemeClr val="tx1"/>
-                      </a:solidFill>
-                    </a:ln>
-                    <a:effectLst/>
-                  </p:spPr>
-                  <p:style>
-                    <a:lnRef idx="1">
-                      <a:schemeClr val="accent1"/>
-                    </a:lnRef>
-                    <a:fillRef idx="3">
-                      <a:schemeClr val="accent1"/>
-                    </a:fillRef>
-                    <a:effectRef idx="2">
-                      <a:schemeClr val="accent1"/>
-                    </a:effectRef>
-                    <a:fontRef idx="minor">
-                      <a:schemeClr val="lt1"/>
-                    </a:fontRef>
-                  </p:style>
-                  <p:txBody>
-                    <a:bodyPr rtlCol="0" anchor="ctr"/>
-                    <a:lstStyle/>
-                    <a:p>
-                      <a:pPr algn="ctr"/>
-                      <a:endParaRPr lang="en-US"/>
-                    </a:p>
-                  </p:txBody>
-                </p:sp>
-                <p:sp>
-                  <p:nvSpPr>
-                    <p:cNvPr id="53" name="Multiply 52"/>
-                    <p:cNvSpPr/>
-                    <p:nvPr/>
-                  </p:nvSpPr>
-                  <p:spPr>
-                    <a:xfrm>
-                      <a:off x="1306126" y="1767428"/>
-                      <a:ext cx="405915" cy="405915"/>
-                    </a:xfrm>
-                    <a:prstGeom prst="mathMultiply">
-                      <a:avLst/>
-                    </a:prstGeom>
-                    <a:solidFill>
-                      <a:schemeClr val="accent6">
-                        <a:lumMod val="50000"/>
-                        <a:alpha val="83000"/>
-                      </a:schemeClr>
-                    </a:solidFill>
-                    <a:ln>
-                      <a:solidFill>
-                        <a:schemeClr val="tx1"/>
-                      </a:solidFill>
-                    </a:ln>
-                    <a:effectLst/>
-                  </p:spPr>
-                  <p:style>
-                    <a:lnRef idx="1">
-                      <a:schemeClr val="accent1"/>
-                    </a:lnRef>
-                    <a:fillRef idx="3">
-                      <a:schemeClr val="accent1"/>
-                    </a:fillRef>
-                    <a:effectRef idx="2">
-                      <a:schemeClr val="accent1"/>
-                    </a:effectRef>
-                    <a:fontRef idx="minor">
-                      <a:schemeClr val="lt1"/>
-                    </a:fontRef>
-                  </p:style>
-                  <p:txBody>
-                    <a:bodyPr rtlCol="0" anchor="ctr"/>
-                    <a:lstStyle/>
-                    <a:p>
-                      <a:pPr algn="ctr"/>
-                      <a:endParaRPr lang="en-US"/>
-                    </a:p>
-                  </p:txBody>
-                </p:sp>
-                <p:sp>
-                  <p:nvSpPr>
-                    <p:cNvPr id="54" name="Multiply 53"/>
-                    <p:cNvSpPr/>
-                    <p:nvPr/>
-                  </p:nvSpPr>
-                  <p:spPr>
-                    <a:xfrm>
-                      <a:off x="1452540" y="2268633"/>
-                      <a:ext cx="405915" cy="405915"/>
-                    </a:xfrm>
-                    <a:prstGeom prst="mathMultiply">
-                      <a:avLst/>
-                    </a:prstGeom>
-                    <a:solidFill>
-                      <a:schemeClr val="accent6">
-                        <a:lumMod val="50000"/>
-                        <a:alpha val="83000"/>
-                      </a:schemeClr>
-                    </a:solidFill>
-                    <a:ln>
-                      <a:solidFill>
-                        <a:schemeClr val="tx1"/>
-                      </a:solidFill>
-                    </a:ln>
-                    <a:effectLst/>
-                  </p:spPr>
-                  <p:style>
-                    <a:lnRef idx="1">
-                      <a:schemeClr val="accent1"/>
-                    </a:lnRef>
-                    <a:fillRef idx="3">
-                      <a:schemeClr val="accent1"/>
-                    </a:fillRef>
-                    <a:effectRef idx="2">
-                      <a:schemeClr val="accent1"/>
-                    </a:effectRef>
-                    <a:fontRef idx="minor">
-                      <a:schemeClr val="lt1"/>
-                    </a:fontRef>
-                  </p:style>
-                  <p:txBody>
-                    <a:bodyPr rtlCol="0" anchor="ctr"/>
-                    <a:lstStyle/>
-                    <a:p>
-                      <a:pPr algn="ctr"/>
-                      <a:endParaRPr lang="en-US"/>
-                    </a:p>
-                  </p:txBody>
-                </p:sp>
-                <p:sp>
-                  <p:nvSpPr>
-                    <p:cNvPr id="55" name="Multiply 54"/>
-                    <p:cNvSpPr/>
-                    <p:nvPr/>
-                  </p:nvSpPr>
-                  <p:spPr>
-                    <a:xfrm>
-                      <a:off x="1712041" y="1895462"/>
-                      <a:ext cx="405915" cy="405915"/>
-                    </a:xfrm>
-                    <a:prstGeom prst="mathMultiply">
-                      <a:avLst/>
-                    </a:prstGeom>
-                    <a:solidFill>
-                      <a:schemeClr val="accent6">
-                        <a:lumMod val="50000"/>
-                        <a:alpha val="83000"/>
-                      </a:schemeClr>
-                    </a:solidFill>
-                    <a:ln>
-                      <a:solidFill>
-                        <a:schemeClr val="tx1"/>
-                      </a:solidFill>
-                    </a:ln>
-                    <a:effectLst/>
-                  </p:spPr>
-                  <p:style>
-                    <a:lnRef idx="1">
-                      <a:schemeClr val="accent1"/>
-                    </a:lnRef>
-                    <a:fillRef idx="3">
-                      <a:schemeClr val="accent1"/>
-                    </a:fillRef>
-                    <a:effectRef idx="2">
-                      <a:schemeClr val="accent1"/>
-                    </a:effectRef>
-                    <a:fontRef idx="minor">
-                      <a:schemeClr val="lt1"/>
-                    </a:fontRef>
-                  </p:style>
-                  <p:txBody>
-                    <a:bodyPr rtlCol="0" anchor="ctr"/>
-                    <a:lstStyle/>
-                    <a:p>
-                      <a:pPr algn="ctr"/>
-                      <a:endParaRPr lang="en-US"/>
-                    </a:p>
-                  </p:txBody>
-                </p:sp>
-                <p:sp>
-                  <p:nvSpPr>
-                    <p:cNvPr id="56" name="Multiply 55"/>
-                    <p:cNvSpPr/>
-                    <p:nvPr/>
-                  </p:nvSpPr>
-                  <p:spPr>
-                    <a:xfrm>
-                      <a:off x="2065741" y="1035421"/>
-                      <a:ext cx="405915" cy="405915"/>
-                    </a:xfrm>
-                    <a:prstGeom prst="mathMultiply">
-                      <a:avLst/>
-                    </a:prstGeom>
-                    <a:solidFill>
-                      <a:schemeClr val="accent6">
-                        <a:lumMod val="50000"/>
-                        <a:alpha val="83000"/>
-                      </a:schemeClr>
-                    </a:solidFill>
-                    <a:ln>
-                      <a:solidFill>
-                        <a:schemeClr val="tx1"/>
-                      </a:solidFill>
-                    </a:ln>
-                    <a:effectLst/>
-                  </p:spPr>
-                  <p:style>
-                    <a:lnRef idx="1">
-                      <a:schemeClr val="accent1"/>
-                    </a:lnRef>
-                    <a:fillRef idx="3">
-                      <a:schemeClr val="accent1"/>
-                    </a:fillRef>
-                    <a:effectRef idx="2">
-                      <a:schemeClr val="accent1"/>
-                    </a:effectRef>
-                    <a:fontRef idx="minor">
-                      <a:schemeClr val="lt1"/>
-                    </a:fontRef>
-                  </p:style>
-                  <p:txBody>
-                    <a:bodyPr rtlCol="0" anchor="ctr"/>
-                    <a:lstStyle/>
-                    <a:p>
-                      <a:pPr algn="ctr"/>
-                      <a:endParaRPr lang="en-US"/>
-                    </a:p>
-                  </p:txBody>
-                </p:sp>
-                <p:cxnSp>
-                  <p:nvCxnSpPr>
-                    <p:cNvPr id="61" name="Straight Arrow Connector 60"/>
-                    <p:cNvCxnSpPr/>
-                    <p:nvPr/>
-                  </p:nvCxnSpPr>
-                  <p:spPr>
-                    <a:xfrm flipV="1">
-                      <a:off x="2254249" y="2173343"/>
-                      <a:ext cx="737102" cy="1"/>
-                    </a:xfrm>
-                    <a:prstGeom prst="straightConnector1">
-                      <a:avLst/>
-                    </a:prstGeom>
-                    <a:ln w="63500">
-                      <a:solidFill>
-                        <a:schemeClr val="tx1">
-                          <a:lumMod val="50000"/>
-                          <a:lumOff val="50000"/>
-                        </a:schemeClr>
-                      </a:solidFill>
-                      <a:tailEnd type="triangle"/>
-                    </a:ln>
-                    <a:effectLst/>
-                  </p:spPr>
-                  <p:style>
-                    <a:lnRef idx="2">
-                      <a:schemeClr val="accent1"/>
-                    </a:lnRef>
-                    <a:fillRef idx="0">
-                      <a:schemeClr val="accent1"/>
-                    </a:fillRef>
-                    <a:effectRef idx="1">
-                      <a:schemeClr val="accent1"/>
-                    </a:effectRef>
-                    <a:fontRef idx="minor">
-                      <a:schemeClr val="tx1"/>
-                    </a:fontRef>
-                  </p:style>
-                </p:cxnSp>
-                <p:cxnSp>
-                  <p:nvCxnSpPr>
-                    <p:cNvPr id="72" name="Straight Arrow Connector 71"/>
-                    <p:cNvCxnSpPr/>
-                    <p:nvPr/>
-                  </p:nvCxnSpPr>
-                  <p:spPr>
-                    <a:xfrm flipV="1">
-                      <a:off x="8862989" y="932859"/>
-                      <a:ext cx="0" cy="3116380"/>
-                    </a:xfrm>
-                    <a:prstGeom prst="straightConnector1">
-                      <a:avLst/>
-                    </a:prstGeom>
-                    <a:ln w="50800">
-                      <a:solidFill>
-                        <a:schemeClr val="tx1"/>
-                      </a:solidFill>
-                      <a:tailEnd type="triangle"/>
-                    </a:ln>
-                    <a:effectLst/>
-                  </p:spPr>
-                  <p:style>
-                    <a:lnRef idx="2">
-                      <a:schemeClr val="accent1"/>
-                    </a:lnRef>
-                    <a:fillRef idx="0">
-                      <a:schemeClr val="accent1"/>
-                    </a:fillRef>
-                    <a:effectRef idx="1">
-                      <a:schemeClr val="accent1"/>
-                    </a:effectRef>
-                    <a:fontRef idx="minor">
-                      <a:schemeClr val="tx1"/>
-                    </a:fontRef>
-                  </p:style>
-                </p:cxnSp>
-                <p:cxnSp>
-                  <p:nvCxnSpPr>
-                    <p:cNvPr id="73" name="Straight Arrow Connector 72"/>
-                    <p:cNvCxnSpPr/>
-                    <p:nvPr/>
-                  </p:nvCxnSpPr>
-                  <p:spPr>
-                    <a:xfrm flipV="1">
-                      <a:off x="8862989" y="4027778"/>
-                      <a:ext cx="3482804" cy="21461"/>
-                    </a:xfrm>
-                    <a:prstGeom prst="straightConnector1">
-                      <a:avLst/>
-                    </a:prstGeom>
-                    <a:ln w="50800">
-                      <a:solidFill>
-                        <a:schemeClr val="tx1"/>
-                      </a:solidFill>
-                      <a:tailEnd type="triangle"/>
-                    </a:ln>
-                    <a:effectLst/>
-                  </p:spPr>
-                  <p:style>
-                    <a:lnRef idx="2">
-                      <a:schemeClr val="accent1"/>
-                    </a:lnRef>
-                    <a:fillRef idx="0">
-                      <a:schemeClr val="accent1"/>
-                    </a:fillRef>
-                    <a:effectRef idx="1">
-                      <a:schemeClr val="accent1"/>
-                    </a:effectRef>
-                    <a:fontRef idx="minor">
-                      <a:schemeClr val="tx1"/>
-                    </a:fontRef>
-                  </p:style>
-                </p:cxnSp>
-                <p:sp>
-                  <p:nvSpPr>
-                    <p:cNvPr id="74" name="Multiply 73"/>
-                    <p:cNvSpPr/>
-                    <p:nvPr/>
-                  </p:nvSpPr>
-                  <p:spPr>
-                    <a:xfrm>
-                      <a:off x="11320175" y="2151469"/>
-                      <a:ext cx="405915" cy="405915"/>
-                    </a:xfrm>
-                    <a:prstGeom prst="mathMultiply">
-                      <a:avLst/>
-                    </a:prstGeom>
-                    <a:solidFill>
-                      <a:srgbClr val="00FF66"/>
-                    </a:solidFill>
-                    <a:ln>
-                      <a:solidFill>
-                        <a:schemeClr val="tx1"/>
-                      </a:solidFill>
-                    </a:ln>
-                    <a:effectLst/>
-                  </p:spPr>
-                  <p:style>
-                    <a:lnRef idx="1">
-                      <a:schemeClr val="accent1"/>
-                    </a:lnRef>
-                    <a:fillRef idx="3">
-                      <a:schemeClr val="accent1"/>
-                    </a:fillRef>
-                    <a:effectRef idx="2">
-                      <a:schemeClr val="accent1"/>
-                    </a:effectRef>
-                    <a:fontRef idx="minor">
-                      <a:schemeClr val="lt1"/>
-                    </a:fontRef>
-                  </p:style>
-                  <p:txBody>
-                    <a:bodyPr rtlCol="0" anchor="ctr"/>
-                    <a:lstStyle/>
-                    <a:p>
-                      <a:pPr algn="ctr"/>
-                      <a:endParaRPr lang="en-US"/>
-                    </a:p>
-                  </p:txBody>
-                </p:sp>
-                <p:sp>
-                  <p:nvSpPr>
-                    <p:cNvPr id="75" name="Multiply 74"/>
-                    <p:cNvSpPr/>
-                    <p:nvPr/>
-                  </p:nvSpPr>
-                  <p:spPr>
-                    <a:xfrm>
-                      <a:off x="11137493" y="1665164"/>
-                      <a:ext cx="405915" cy="405915"/>
-                    </a:xfrm>
-                    <a:prstGeom prst="mathMultiply">
-                      <a:avLst/>
-                    </a:prstGeom>
-                    <a:solidFill>
-                      <a:srgbClr val="00FF66"/>
-                    </a:solidFill>
-                    <a:ln>
-                      <a:solidFill>
-                        <a:schemeClr val="tx1"/>
-                      </a:solidFill>
-                    </a:ln>
-                    <a:effectLst/>
-                  </p:spPr>
-                  <p:style>
-                    <a:lnRef idx="1">
-                      <a:schemeClr val="accent1"/>
-                    </a:lnRef>
-                    <a:fillRef idx="3">
-                      <a:schemeClr val="accent1"/>
-                    </a:fillRef>
-                    <a:effectRef idx="2">
-                      <a:schemeClr val="accent1"/>
-                    </a:effectRef>
-                    <a:fontRef idx="minor">
-                      <a:schemeClr val="lt1"/>
-                    </a:fontRef>
-                  </p:style>
-                  <p:txBody>
-                    <a:bodyPr rtlCol="0" anchor="ctr"/>
-                    <a:lstStyle/>
-                    <a:p>
-                      <a:pPr algn="ctr"/>
-                      <a:endParaRPr lang="en-US"/>
-                    </a:p>
-                  </p:txBody>
-                </p:sp>
-                <p:sp>
-                  <p:nvSpPr>
-                    <p:cNvPr id="77" name="TextBox 76"/>
-                    <p:cNvSpPr txBox="1"/>
-                    <p:nvPr/>
-                  </p:nvSpPr>
-                  <p:spPr>
-                    <a:xfrm>
-                      <a:off x="9051431" y="4112494"/>
-                      <a:ext cx="3124323" cy="461665"/>
-                    </a:xfrm>
-                    <a:prstGeom prst="rect">
-                      <a:avLst/>
-                    </a:prstGeom>
-                    <a:noFill/>
-                  </p:spPr>
-                  <p:txBody>
-                    <a:bodyPr wrap="none" rtlCol="0">
-                      <a:spAutoFit/>
-                    </a:bodyPr>
-                    <a:lstStyle/>
-                    <a:p>
-                      <a:r>
-                        <a:rPr lang="en-US" sz="2400" dirty="0" smtClean="0">
-                          <a:latin typeface="Gill Sans"/>
-                          <a:cs typeface="Gill Sans"/>
-                        </a:rPr>
-                        <a:t>(c) Sampled Clean Data</a:t>
-                      </a:r>
-                      <a:endParaRPr lang="en-US" sz="2400" dirty="0">
-                        <a:latin typeface="Gill Sans"/>
-                        <a:cs typeface="Gill Sans"/>
-                      </a:endParaRPr>
-                    </a:p>
-                  </p:txBody>
-                </p:sp>
-                <p:cxnSp>
-                  <p:nvCxnSpPr>
-                    <p:cNvPr id="31" name="Straight Connector 30"/>
-                    <p:cNvCxnSpPr/>
-                    <p:nvPr/>
-                  </p:nvCxnSpPr>
-                  <p:spPr>
-                    <a:xfrm flipV="1">
-                      <a:off x="1921357" y="964236"/>
-                      <a:ext cx="2142643" cy="3125833"/>
-                    </a:xfrm>
-                    <a:prstGeom prst="line">
-                      <a:avLst/>
-                    </a:prstGeom>
-                    <a:ln w="50800">
-                      <a:solidFill>
-                        <a:srgbClr val="3366FF"/>
-                      </a:solidFill>
-                    </a:ln>
-                    <a:effectLst/>
-                  </p:spPr>
-                  <p:style>
-                    <a:lnRef idx="2">
-                      <a:schemeClr val="accent1"/>
-                    </a:lnRef>
-                    <a:fillRef idx="0">
-                      <a:schemeClr val="accent1"/>
-                    </a:fillRef>
-                    <a:effectRef idx="1">
-                      <a:schemeClr val="accent1"/>
-                    </a:effectRef>
-                    <a:fontRef idx="minor">
-                      <a:schemeClr val="tx1"/>
-                    </a:fontRef>
-                  </p:style>
-                </p:cxnSp>
-                <p:cxnSp>
-                  <p:nvCxnSpPr>
-                    <p:cNvPr id="51" name="Straight Connector 50"/>
-                    <p:cNvCxnSpPr/>
-                    <p:nvPr/>
-                  </p:nvCxnSpPr>
-                  <p:spPr>
-                    <a:xfrm flipV="1">
-                      <a:off x="1046625" y="964236"/>
-                      <a:ext cx="1163141" cy="1790702"/>
-                    </a:xfrm>
-                    <a:prstGeom prst="line">
-                      <a:avLst/>
-                    </a:prstGeom>
-                    <a:ln w="50800">
-                      <a:solidFill>
-                        <a:srgbClr val="FF0000"/>
-                      </a:solidFill>
-                    </a:ln>
-                    <a:effectLst/>
-                  </p:spPr>
-                  <p:style>
-                    <a:lnRef idx="2">
-                      <a:schemeClr val="accent1"/>
-                    </a:lnRef>
-                    <a:fillRef idx="0">
-                      <a:schemeClr val="accent1"/>
-                    </a:fillRef>
-                    <a:effectRef idx="1">
-                      <a:schemeClr val="accent1"/>
-                    </a:effectRef>
-                    <a:fontRef idx="minor">
-                      <a:schemeClr val="tx1"/>
-                    </a:fontRef>
-                  </p:style>
-                </p:cxnSp>
               </p:grpSp>
-              <p:sp>
-                <p:nvSpPr>
-                  <p:cNvPr id="2" name="Rectangle 1"/>
-                  <p:cNvSpPr/>
+              <p:cxnSp>
+                <p:nvCxnSpPr>
+                  <p:cNvPr id="48" name="Straight Connector 47"/>
+                  <p:cNvCxnSpPr/>
                   <p:nvPr/>
-                </p:nvSpPr>
+                </p:nvCxnSpPr>
                 <p:spPr>
-                  <a:xfrm>
-                    <a:off x="3539845" y="3334016"/>
-                    <a:ext cx="197311" cy="200528"/>
+                  <a:xfrm flipV="1">
+                    <a:off x="6015940" y="1103539"/>
+                    <a:ext cx="1907694" cy="2936971"/>
                   </a:xfrm>
-                  <a:prstGeom prst="rect">
+                  <a:prstGeom prst="line">
                     <a:avLst/>
                   </a:prstGeom>
-                  <a:solidFill>
-                    <a:srgbClr val="00FF66"/>
-                  </a:solidFill>
-                  <a:ln w="34925">
+                  <a:ln w="50800">
                     <a:solidFill>
-                      <a:schemeClr val="tx1"/>
+                      <a:srgbClr val="3366FF">
+                        <a:alpha val="40000"/>
+                      </a:srgbClr>
                     </a:solidFill>
                   </a:ln>
                   <a:effectLst/>
                 </p:spPr>
                 <p:style>
-                  <a:lnRef idx="1">
+                  <a:lnRef idx="2">
                     <a:schemeClr val="accent1"/>
                   </a:lnRef>
-                  <a:fillRef idx="3">
+                  <a:fillRef idx="0">
                     <a:schemeClr val="accent1"/>
                   </a:fillRef>
-                  <a:effectRef idx="2">
+                  <a:effectRef idx="1">
                     <a:schemeClr val="accent1"/>
                   </a:effectRef>
                   <a:fontRef idx="minor">
-                    <a:schemeClr val="lt1"/>
+                    <a:schemeClr val="tx1"/>
                   </a:fontRef>
                 </p:style>
-                <p:txBody>
-                  <a:bodyPr rtlCol="0" anchor="ctr"/>
-                  <a:lstStyle/>
-                  <a:p>
-                    <a:pPr algn="ctr"/>
-                    <a:endParaRPr lang="en-US"/>
-                  </a:p>
-                </p:txBody>
-              </p:sp>
-              <p:sp>
-                <p:nvSpPr>
-                  <p:cNvPr id="3" name="TextBox 2"/>
-                  <p:cNvSpPr txBox="1"/>
+              </p:cxnSp>
+              <p:cxnSp>
+                <p:nvCxnSpPr>
+                  <p:cNvPr id="58" name="Straight Connector 57"/>
+                  <p:cNvCxnSpPr/>
                   <p:nvPr/>
-                </p:nvSpPr>
+                </p:nvCxnSpPr>
                 <p:spPr>
-                  <a:xfrm>
-                    <a:off x="3700024" y="3249614"/>
-                    <a:ext cx="723200" cy="369332"/>
+                  <a:xfrm flipV="1">
+                    <a:off x="10083780" y="1119738"/>
+                    <a:ext cx="1907694" cy="2936971"/>
                   </a:xfrm>
-                  <a:prstGeom prst="rect">
+                  <a:prstGeom prst="line">
                     <a:avLst/>
                   </a:prstGeom>
-                  <a:noFill/>
-                </p:spPr>
-                <p:txBody>
-                  <a:bodyPr wrap="none" rtlCol="0">
-                    <a:spAutoFit/>
-                  </a:bodyPr>
-                  <a:lstStyle/>
-                  <a:p>
-                    <a:r>
-                      <a:rPr lang="en-US" dirty="0" smtClean="0">
-                        <a:latin typeface="Gill Sans"/>
-                        <a:cs typeface="Gill Sans"/>
-                      </a:rPr>
-                      <a:t>Clean</a:t>
-                    </a:r>
-                    <a:endParaRPr lang="en-US" dirty="0">
-                      <a:latin typeface="Gill Sans"/>
-                      <a:cs typeface="Gill Sans"/>
-                    </a:endParaRPr>
-                  </a:p>
-                </p:txBody>
-              </p:sp>
-              <p:sp>
-                <p:nvSpPr>
-                  <p:cNvPr id="49" name="Rectangle 48"/>
-                  <p:cNvSpPr/>
-                  <p:nvPr/>
-                </p:nvSpPr>
-                <p:spPr>
-                  <a:xfrm>
-                    <a:off x="3539845" y="3703348"/>
-                    <a:ext cx="197311" cy="200528"/>
-                  </a:xfrm>
-                  <a:prstGeom prst="rect">
-                    <a:avLst/>
-                  </a:prstGeom>
-                  <a:solidFill>
-                    <a:schemeClr val="accent6">
-                      <a:lumMod val="50000"/>
-                    </a:schemeClr>
-                  </a:solidFill>
-                  <a:ln w="34925">
+                  <a:ln w="50800">
                     <a:solidFill>
-                      <a:schemeClr val="tx1"/>
+                      <a:srgbClr val="3366FF">
+                        <a:alpha val="40000"/>
+                      </a:srgbClr>
                     </a:solidFill>
                   </a:ln>
                   <a:effectLst/>
                 </p:spPr>
                 <p:style>
-                  <a:lnRef idx="1">
+                  <a:lnRef idx="2">
                     <a:schemeClr val="accent1"/>
                   </a:lnRef>
-                  <a:fillRef idx="3">
+                  <a:fillRef idx="0">
                     <a:schemeClr val="accent1"/>
                   </a:fillRef>
-                  <a:effectRef idx="2">
+                  <a:effectRef idx="1">
                     <a:schemeClr val="accent1"/>
                   </a:effectRef>
                   <a:fontRef idx="minor">
-                    <a:schemeClr val="lt1"/>
+                    <a:schemeClr val="tx1"/>
                   </a:fontRef>
                 </p:style>
-                <p:txBody>
-                  <a:bodyPr rtlCol="0" anchor="ctr"/>
-                  <a:lstStyle/>
-                  <a:p>
-                    <a:pPr algn="ctr"/>
-                    <a:endParaRPr lang="en-US"/>
-                  </a:p>
-                </p:txBody>
-              </p:sp>
-              <p:sp>
-                <p:nvSpPr>
-                  <p:cNvPr id="50" name="TextBox 49"/>
-                  <p:cNvSpPr txBox="1"/>
-                  <p:nvPr/>
-                </p:nvSpPr>
-                <p:spPr>
-                  <a:xfrm>
-                    <a:off x="3700024" y="3618946"/>
-                    <a:ext cx="684803" cy="369332"/>
-                  </a:xfrm>
-                  <a:prstGeom prst="rect">
-                    <a:avLst/>
-                  </a:prstGeom>
-                  <a:noFill/>
-                </p:spPr>
-                <p:txBody>
-                  <a:bodyPr wrap="none" rtlCol="0">
-                    <a:spAutoFit/>
-                  </a:bodyPr>
-                  <a:lstStyle/>
-                  <a:p>
-                    <a:r>
-                      <a:rPr lang="en-US" dirty="0" smtClean="0">
-                        <a:latin typeface="Gill Sans"/>
-                        <a:cs typeface="Gill Sans"/>
-                      </a:rPr>
-                      <a:t>Dirty</a:t>
-                    </a:r>
-                    <a:endParaRPr lang="en-US" dirty="0">
+              </p:cxnSp>
+            </p:grpSp>
+            <p:sp>
+              <p:nvSpPr>
+                <p:cNvPr id="14" name="TextBox 13"/>
+                <p:cNvSpPr txBox="1"/>
+                <p:nvPr/>
+              </p:nvSpPr>
+              <p:spPr>
+                <a:xfrm>
+                  <a:off x="1378157" y="3644898"/>
+                  <a:ext cx="750363" cy="369332"/>
+                </a:xfrm>
+                <a:prstGeom prst="rect">
+                  <a:avLst/>
+                </a:prstGeom>
+                <a:noFill/>
+              </p:spPr>
+              <p:txBody>
+                <a:bodyPr wrap="none" rtlCol="0">
+                  <a:spAutoFit/>
+                </a:bodyPr>
+                <a:lstStyle/>
+                <a:p>
+                  <a:r>
+                    <a:rPr lang="en-US" b="1" dirty="0" smtClean="0">
+                      <a:solidFill>
+                        <a:srgbClr val="3366FF"/>
+                      </a:solidFill>
                       <a:latin typeface="Gill Sans"/>
                       <a:cs typeface="Gill Sans"/>
-                    </a:endParaRPr>
-                  </a:p>
-                </p:txBody>
-              </p:sp>
-            </p:grpSp>
-            <p:cxnSp>
-              <p:nvCxnSpPr>
-                <p:cNvPr id="48" name="Straight Connector 47"/>
-                <p:cNvCxnSpPr/>
+                    </a:rPr>
+                    <a:t>True</a:t>
+                  </a:r>
+                  <a:endParaRPr lang="en-US" b="1" dirty="0">
+                    <a:solidFill>
+                      <a:srgbClr val="3366FF"/>
+                    </a:solidFill>
+                    <a:latin typeface="Gill Sans"/>
+                    <a:cs typeface="Gill Sans"/>
+                  </a:endParaRPr>
+                </a:p>
+              </p:txBody>
+            </p:sp>
+            <p:sp>
+              <p:nvSpPr>
+                <p:cNvPr id="60" name="TextBox 59"/>
+                <p:cNvSpPr txBox="1"/>
                 <p:nvPr/>
-              </p:nvCxnSpPr>
+              </p:nvSpPr>
               <p:spPr>
-                <a:xfrm flipV="1">
-                  <a:off x="6015940" y="1103539"/>
-                  <a:ext cx="1907694" cy="2936971"/>
+                <a:xfrm>
+                  <a:off x="299105" y="2593702"/>
+                  <a:ext cx="941283" cy="369332"/>
                 </a:xfrm>
-                <a:prstGeom prst="line">
+                <a:prstGeom prst="rect">
                   <a:avLst/>
                 </a:prstGeom>
-                <a:ln w="50800">
-                  <a:solidFill>
-                    <a:srgbClr val="3366FF">
-                      <a:alpha val="40000"/>
-                    </a:srgbClr>
-                  </a:solidFill>
-                </a:ln>
-                <a:effectLst/>
+                <a:noFill/>
               </p:spPr>
-              <p:style>
-                <a:lnRef idx="2">
-                  <a:schemeClr val="accent1"/>
-                </a:lnRef>
-                <a:fillRef idx="0">
-                  <a:schemeClr val="accent1"/>
-                </a:fillRef>
-                <a:effectRef idx="1">
-                  <a:schemeClr val="accent1"/>
-                </a:effectRef>
-                <a:fontRef idx="minor">
-                  <a:schemeClr val="tx1"/>
-                </a:fontRef>
-              </p:style>
-            </p:cxnSp>
-            <p:cxnSp>
-              <p:nvCxnSpPr>
-                <p:cNvPr id="58" name="Straight Connector 57"/>
-                <p:cNvCxnSpPr/>
+              <p:txBody>
+                <a:bodyPr wrap="none" rtlCol="0">
+                  <a:spAutoFit/>
+                </a:bodyPr>
+                <a:lstStyle/>
+                <a:p>
+                  <a:r>
+                    <a:rPr lang="en-US" b="1" dirty="0" smtClean="0">
+                      <a:solidFill>
+                        <a:srgbClr val="FF0000"/>
+                      </a:solidFill>
+                      <a:latin typeface="Gill Sans"/>
+                      <a:cs typeface="Gill Sans"/>
+                    </a:rPr>
+                    <a:t>Result</a:t>
+                  </a:r>
+                  <a:endParaRPr lang="en-US" b="1" dirty="0">
+                    <a:solidFill>
+                      <a:srgbClr val="FF0000"/>
+                    </a:solidFill>
+                    <a:latin typeface="Gill Sans"/>
+                    <a:cs typeface="Gill Sans"/>
+                  </a:endParaRPr>
+                </a:p>
+              </p:txBody>
+            </p:sp>
+            <p:sp>
+              <p:nvSpPr>
+                <p:cNvPr id="64" name="TextBox 63"/>
+                <p:cNvSpPr txBox="1"/>
                 <p:nvPr/>
-              </p:nvCxnSpPr>
+              </p:nvSpPr>
               <p:spPr>
-                <a:xfrm flipV="1">
-                  <a:off x="10083780" y="1119738"/>
-                  <a:ext cx="1907694" cy="2936971"/>
+                <a:xfrm>
+                  <a:off x="6750236" y="3282400"/>
+                  <a:ext cx="941283" cy="369332"/>
                 </a:xfrm>
-                <a:prstGeom prst="line">
+                <a:prstGeom prst="rect">
                   <a:avLst/>
                 </a:prstGeom>
-                <a:ln w="50800">
-                  <a:solidFill>
-                    <a:srgbClr val="3366FF">
-                      <a:alpha val="40000"/>
-                    </a:srgbClr>
-                  </a:solidFill>
-                </a:ln>
-                <a:effectLst/>
+                <a:noFill/>
               </p:spPr>
-              <p:style>
-                <a:lnRef idx="2">
-                  <a:schemeClr val="accent1"/>
-                </a:lnRef>
-                <a:fillRef idx="0">
-                  <a:schemeClr val="accent1"/>
-                </a:fillRef>
-                <a:effectRef idx="1">
-                  <a:schemeClr val="accent1"/>
-                </a:effectRef>
-                <a:fontRef idx="minor">
-                  <a:schemeClr val="tx1"/>
-                </a:fontRef>
-              </p:style>
-            </p:cxnSp>
+              <p:txBody>
+                <a:bodyPr wrap="none" rtlCol="0">
+                  <a:spAutoFit/>
+                </a:bodyPr>
+                <a:lstStyle/>
+                <a:p>
+                  <a:r>
+                    <a:rPr lang="en-US" b="1" dirty="0" smtClean="0">
+                      <a:solidFill>
+                        <a:srgbClr val="FF0000"/>
+                      </a:solidFill>
+                      <a:latin typeface="Gill Sans"/>
+                      <a:cs typeface="Gill Sans"/>
+                    </a:rPr>
+                    <a:t>Result</a:t>
+                  </a:r>
+                  <a:endParaRPr lang="en-US" b="1" dirty="0">
+                    <a:solidFill>
+                      <a:srgbClr val="FF0000"/>
+                    </a:solidFill>
+                    <a:latin typeface="Gill Sans"/>
+                    <a:cs typeface="Gill Sans"/>
+                  </a:endParaRPr>
+                </a:p>
+              </p:txBody>
+            </p:sp>
+            <p:sp>
+              <p:nvSpPr>
+                <p:cNvPr id="66" name="TextBox 65"/>
+                <p:cNvSpPr txBox="1"/>
+                <p:nvPr/>
+              </p:nvSpPr>
+              <p:spPr>
+                <a:xfrm>
+                  <a:off x="10466503" y="3437836"/>
+                  <a:ext cx="941283" cy="369332"/>
+                </a:xfrm>
+                <a:prstGeom prst="rect">
+                  <a:avLst/>
+                </a:prstGeom>
+                <a:noFill/>
+              </p:spPr>
+              <p:txBody>
+                <a:bodyPr wrap="none" rtlCol="0">
+                  <a:spAutoFit/>
+                </a:bodyPr>
+                <a:lstStyle/>
+                <a:p>
+                  <a:r>
+                    <a:rPr lang="en-US" b="1" dirty="0" smtClean="0">
+                      <a:solidFill>
+                        <a:srgbClr val="FF0000"/>
+                      </a:solidFill>
+                      <a:latin typeface="Gill Sans"/>
+                      <a:cs typeface="Gill Sans"/>
+                    </a:rPr>
+                    <a:t>Result</a:t>
+                  </a:r>
+                  <a:endParaRPr lang="en-US" b="1" dirty="0">
+                    <a:solidFill>
+                      <a:srgbClr val="FF0000"/>
+                    </a:solidFill>
+                    <a:latin typeface="Gill Sans"/>
+                    <a:cs typeface="Gill Sans"/>
+                  </a:endParaRPr>
+                </a:p>
+              </p:txBody>
+            </p:sp>
           </p:grpSp>
           <p:sp>
             <p:nvSpPr>
-              <p:cNvPr id="14" name="TextBox 13"/>
+              <p:cNvPr id="67" name="TextBox 66"/>
               <p:cNvSpPr txBox="1"/>
               <p:nvPr/>
             </p:nvSpPr>
             <p:spPr>
               <a:xfrm>
-                <a:off x="1378157" y="3644898"/>
+                <a:off x="5415687" y="3623437"/>
                 <a:ext cx="750363" cy="369332"/>
               </a:xfrm>
               <a:prstGeom prst="rect">
@@ -14701,7 +14844,7 @@
                 <a:r>
                   <a:rPr lang="en-US" b="1" dirty="0" smtClean="0">
                     <a:solidFill>
-                      <a:srgbClr val="3366FF"/>
+                      <a:srgbClr val="A0B0FF"/>
                     </a:solidFill>
                     <a:latin typeface="Gill Sans"/>
                     <a:cs typeface="Gill Sans"/>
@@ -14710,7 +14853,7 @@
                 </a:r>
                 <a:endParaRPr lang="en-US" b="1" dirty="0">
                   <a:solidFill>
-                    <a:srgbClr val="3366FF"/>
+                    <a:srgbClr val="A0B0FF"/>
                   </a:solidFill>
                   <a:latin typeface="Gill Sans"/>
                   <a:cs typeface="Gill Sans"/>
@@ -14720,14 +14863,14 @@
           </p:sp>
           <p:sp>
             <p:nvSpPr>
-              <p:cNvPr id="60" name="TextBox 59"/>
+              <p:cNvPr id="69" name="TextBox 68"/>
               <p:cNvSpPr txBox="1"/>
               <p:nvPr/>
             </p:nvSpPr>
             <p:spPr>
               <a:xfrm>
-                <a:off x="299105" y="2593702"/>
-                <a:ext cx="941283" cy="369332"/>
+                <a:off x="9498403" y="3644898"/>
+                <a:ext cx="750363" cy="369332"/>
               </a:xfrm>
               <a:prstGeom prst="rect">
                 <a:avLst/>
@@ -14743,100 +14886,16 @@
                 <a:r>
                   <a:rPr lang="en-US" b="1" dirty="0" smtClean="0">
                     <a:solidFill>
-                      <a:srgbClr val="FF0000"/>
+                      <a:srgbClr val="A0B0FF"/>
                     </a:solidFill>
                     <a:latin typeface="Gill Sans"/>
                     <a:cs typeface="Gill Sans"/>
                   </a:rPr>
-                  <a:t>Result</a:t>
+                  <a:t>True</a:t>
                 </a:r>
                 <a:endParaRPr lang="en-US" b="1" dirty="0">
                   <a:solidFill>
-                    <a:srgbClr val="FF0000"/>
-                  </a:solidFill>
-                  <a:latin typeface="Gill Sans"/>
-                  <a:cs typeface="Gill Sans"/>
-                </a:endParaRPr>
-              </a:p>
-            </p:txBody>
-          </p:sp>
-          <p:sp>
-            <p:nvSpPr>
-              <p:cNvPr id="64" name="TextBox 63"/>
-              <p:cNvSpPr txBox="1"/>
-              <p:nvPr/>
-            </p:nvSpPr>
-            <p:spPr>
-              <a:xfrm>
-                <a:off x="6750236" y="3282400"/>
-                <a:ext cx="941283" cy="369332"/>
-              </a:xfrm>
-              <a:prstGeom prst="rect">
-                <a:avLst/>
-              </a:prstGeom>
-              <a:noFill/>
-            </p:spPr>
-            <p:txBody>
-              <a:bodyPr wrap="none" rtlCol="0">
-                <a:spAutoFit/>
-              </a:bodyPr>
-              <a:lstStyle/>
-              <a:p>
-                <a:r>
-                  <a:rPr lang="en-US" b="1" dirty="0" smtClean="0">
-                    <a:solidFill>
-                      <a:srgbClr val="FF0000"/>
-                    </a:solidFill>
-                    <a:latin typeface="Gill Sans"/>
-                    <a:cs typeface="Gill Sans"/>
-                  </a:rPr>
-                  <a:t>Result</a:t>
-                </a:r>
-                <a:endParaRPr lang="en-US" b="1" dirty="0">
-                  <a:solidFill>
-                    <a:srgbClr val="FF0000"/>
-                  </a:solidFill>
-                  <a:latin typeface="Gill Sans"/>
-                  <a:cs typeface="Gill Sans"/>
-                </a:endParaRPr>
-              </a:p>
-            </p:txBody>
-          </p:sp>
-          <p:sp>
-            <p:nvSpPr>
-              <p:cNvPr id="66" name="TextBox 65"/>
-              <p:cNvSpPr txBox="1"/>
-              <p:nvPr/>
-            </p:nvSpPr>
-            <p:spPr>
-              <a:xfrm>
-                <a:off x="10466503" y="3437836"/>
-                <a:ext cx="941283" cy="369332"/>
-              </a:xfrm>
-              <a:prstGeom prst="rect">
-                <a:avLst/>
-              </a:prstGeom>
-              <a:noFill/>
-            </p:spPr>
-            <p:txBody>
-              <a:bodyPr wrap="none" rtlCol="0">
-                <a:spAutoFit/>
-              </a:bodyPr>
-              <a:lstStyle/>
-              <a:p>
-                <a:r>
-                  <a:rPr lang="en-US" b="1" dirty="0" smtClean="0">
-                    <a:solidFill>
-                      <a:srgbClr val="FF0000"/>
-                    </a:solidFill>
-                    <a:latin typeface="Gill Sans"/>
-                    <a:cs typeface="Gill Sans"/>
-                  </a:rPr>
-                  <a:t>Result</a:t>
-                </a:r>
-                <a:endParaRPr lang="en-US" b="1" dirty="0">
-                  <a:solidFill>
-                    <a:srgbClr val="FF0000"/>
+                    <a:srgbClr val="A0B0FF"/>
                   </a:solidFill>
                   <a:latin typeface="Gill Sans"/>
                   <a:cs typeface="Gill Sans"/>
@@ -14847,14 +14906,14 @@
         </p:grpSp>
         <p:sp>
           <p:nvSpPr>
-            <p:cNvPr id="67" name="TextBox 66"/>
+            <p:cNvPr id="6" name="TextBox 5"/>
             <p:cNvSpPr txBox="1"/>
             <p:nvPr/>
           </p:nvSpPr>
           <p:spPr>
             <a:xfrm>
-              <a:off x="5415687" y="3623437"/>
-              <a:ext cx="750363" cy="369332"/>
+              <a:off x="295189" y="938458"/>
+              <a:ext cx="301660" cy="369332"/>
             </a:xfrm>
             <a:prstGeom prst="rect">
               <a:avLst/>
@@ -14868,35 +14927,23 @@
             <a:lstStyle/>
             <a:p>
               <a:r>
-                <a:rPr lang="en-US" b="1" dirty="0" smtClean="0">
-                  <a:solidFill>
-                    <a:srgbClr val="A0B0FF"/>
-                  </a:solidFill>
-                  <a:latin typeface="Gill Sans"/>
-                  <a:cs typeface="Gill Sans"/>
-                </a:rPr>
-                <a:t>True</a:t>
+                <a:rPr lang="en-US" dirty="0"/>
+                <a:t>1</a:t>
               </a:r>
-              <a:endParaRPr lang="en-US" b="1" dirty="0">
-                <a:solidFill>
-                  <a:srgbClr val="A0B0FF"/>
-                </a:solidFill>
-                <a:latin typeface="Gill Sans"/>
-                <a:cs typeface="Gill Sans"/>
-              </a:endParaRPr>
+              <a:endParaRPr lang="en-US" dirty="0"/>
             </a:p>
           </p:txBody>
         </p:sp>
         <p:sp>
           <p:nvSpPr>
-            <p:cNvPr id="69" name="TextBox 68"/>
+            <p:cNvPr id="57" name="TextBox 56"/>
             <p:cNvSpPr txBox="1"/>
             <p:nvPr/>
           </p:nvSpPr>
           <p:spPr>
             <a:xfrm>
-              <a:off x="9498403" y="3644898"/>
-              <a:ext cx="750363" cy="369332"/>
+              <a:off x="1174021" y="842328"/>
+              <a:ext cx="301660" cy="369332"/>
             </a:xfrm>
             <a:prstGeom prst="rect">
               <a:avLst/>
@@ -14910,22 +14957,460 @@
             <a:lstStyle/>
             <a:p>
               <a:r>
-                <a:rPr lang="en-US" b="1" dirty="0" smtClean="0">
-                  <a:solidFill>
-                    <a:srgbClr val="A0B0FF"/>
-                  </a:solidFill>
-                  <a:latin typeface="Gill Sans"/>
-                  <a:cs typeface="Gill Sans"/>
-                </a:rPr>
-                <a:t>True</a:t>
+                <a:rPr lang="en-US" dirty="0"/>
+                <a:t>2</a:t>
               </a:r>
-              <a:endParaRPr lang="en-US" b="1" dirty="0">
-                <a:solidFill>
-                  <a:srgbClr val="A0B0FF"/>
-                </a:solidFill>
-                <a:latin typeface="Gill Sans"/>
-                <a:cs typeface="Gill Sans"/>
-              </a:endParaRPr>
+              <a:endParaRPr lang="en-US" dirty="0"/>
+            </a:p>
+          </p:txBody>
+        </p:sp>
+        <p:sp>
+          <p:nvSpPr>
+            <p:cNvPr id="59" name="TextBox 58"/>
+            <p:cNvSpPr txBox="1"/>
+            <p:nvPr/>
+          </p:nvSpPr>
+          <p:spPr>
+            <a:xfrm>
+              <a:off x="783570" y="1676419"/>
+              <a:ext cx="301660" cy="369332"/>
+            </a:xfrm>
+            <a:prstGeom prst="rect">
+              <a:avLst/>
+            </a:prstGeom>
+            <a:noFill/>
+          </p:spPr>
+          <p:txBody>
+            <a:bodyPr wrap="none" rtlCol="0">
+              <a:spAutoFit/>
+            </a:bodyPr>
+            <a:lstStyle/>
+            <a:p>
+              <a:r>
+                <a:rPr lang="en-US" dirty="0" smtClean="0"/>
+                <a:t>3</a:t>
+              </a:r>
+              <a:endParaRPr lang="en-US" dirty="0"/>
+            </a:p>
+          </p:txBody>
+        </p:sp>
+        <p:sp>
+          <p:nvSpPr>
+            <p:cNvPr id="62" name="TextBox 61"/>
+            <p:cNvSpPr txBox="1"/>
+            <p:nvPr/>
+          </p:nvSpPr>
+          <p:spPr>
+            <a:xfrm>
+              <a:off x="483948" y="2091691"/>
+              <a:ext cx="301660" cy="369332"/>
+            </a:xfrm>
+            <a:prstGeom prst="rect">
+              <a:avLst/>
+            </a:prstGeom>
+            <a:noFill/>
+          </p:spPr>
+          <p:txBody>
+            <a:bodyPr wrap="none" rtlCol="0">
+              <a:spAutoFit/>
+            </a:bodyPr>
+            <a:lstStyle/>
+            <a:p>
+              <a:r>
+                <a:rPr lang="en-US" dirty="0"/>
+                <a:t>4</a:t>
+              </a:r>
+              <a:endParaRPr lang="en-US" dirty="0"/>
+            </a:p>
+          </p:txBody>
+        </p:sp>
+        <p:sp>
+          <p:nvSpPr>
+            <p:cNvPr id="63" name="TextBox 62"/>
+            <p:cNvSpPr txBox="1"/>
+            <p:nvPr/>
+          </p:nvSpPr>
+          <p:spPr>
+            <a:xfrm>
+              <a:off x="354688" y="1577932"/>
+              <a:ext cx="301660" cy="369332"/>
+            </a:xfrm>
+            <a:prstGeom prst="rect">
+              <a:avLst/>
+            </a:prstGeom>
+            <a:noFill/>
+          </p:spPr>
+          <p:txBody>
+            <a:bodyPr wrap="none" rtlCol="0">
+              <a:spAutoFit/>
+            </a:bodyPr>
+            <a:lstStyle/>
+            <a:p>
+              <a:r>
+                <a:rPr lang="en-US" dirty="0" smtClean="0"/>
+                <a:t>5</a:t>
+              </a:r>
+              <a:endParaRPr lang="en-US" dirty="0"/>
+            </a:p>
+          </p:txBody>
+        </p:sp>
+        <p:sp>
+          <p:nvSpPr>
+            <p:cNvPr id="65" name="TextBox 64"/>
+            <p:cNvSpPr txBox="1"/>
+            <p:nvPr/>
+          </p:nvSpPr>
+          <p:spPr>
+            <a:xfrm>
+              <a:off x="4251775" y="916668"/>
+              <a:ext cx="301660" cy="369332"/>
+            </a:xfrm>
+            <a:prstGeom prst="rect">
+              <a:avLst/>
+            </a:prstGeom>
+            <a:noFill/>
+          </p:spPr>
+          <p:txBody>
+            <a:bodyPr wrap="none" rtlCol="0">
+              <a:spAutoFit/>
+            </a:bodyPr>
+            <a:lstStyle/>
+            <a:p>
+              <a:r>
+                <a:rPr lang="en-US" dirty="0"/>
+                <a:t>1</a:t>
+              </a:r>
+              <a:endParaRPr lang="en-US" dirty="0"/>
+            </a:p>
+          </p:txBody>
+        </p:sp>
+        <p:sp>
+          <p:nvSpPr>
+            <p:cNvPr id="70" name="TextBox 69"/>
+            <p:cNvSpPr txBox="1"/>
+            <p:nvPr/>
+          </p:nvSpPr>
+          <p:spPr>
+            <a:xfrm>
+              <a:off x="2028021" y="992081"/>
+              <a:ext cx="359256" cy="369332"/>
+            </a:xfrm>
+            <a:prstGeom prst="rect">
+              <a:avLst/>
+            </a:prstGeom>
+            <a:noFill/>
+          </p:spPr>
+          <p:txBody>
+            <a:bodyPr wrap="none" rtlCol="0">
+              <a:spAutoFit/>
+            </a:bodyPr>
+            <a:lstStyle/>
+            <a:p>
+              <a:r>
+                <a:rPr lang="en-US" dirty="0" smtClean="0"/>
+                <a:t>1’</a:t>
+              </a:r>
+              <a:endParaRPr lang="en-US" dirty="0"/>
+            </a:p>
+          </p:txBody>
+        </p:sp>
+        <p:sp>
+          <p:nvSpPr>
+            <p:cNvPr id="71" name="TextBox 70"/>
+            <p:cNvSpPr txBox="1"/>
+            <p:nvPr/>
+          </p:nvSpPr>
+          <p:spPr>
+            <a:xfrm>
+              <a:off x="2977408" y="867729"/>
+              <a:ext cx="359256" cy="369332"/>
+            </a:xfrm>
+            <a:prstGeom prst="rect">
+              <a:avLst/>
+            </a:prstGeom>
+            <a:noFill/>
+          </p:spPr>
+          <p:txBody>
+            <a:bodyPr wrap="none" rtlCol="0">
+              <a:spAutoFit/>
+            </a:bodyPr>
+            <a:lstStyle/>
+            <a:p>
+              <a:r>
+                <a:rPr lang="en-US" dirty="0" smtClean="0"/>
+                <a:t>2’</a:t>
+              </a:r>
+              <a:endParaRPr lang="en-US" dirty="0"/>
+            </a:p>
+          </p:txBody>
+        </p:sp>
+        <p:sp>
+          <p:nvSpPr>
+            <p:cNvPr id="78" name="TextBox 77"/>
+            <p:cNvSpPr txBox="1"/>
+            <p:nvPr/>
+          </p:nvSpPr>
+          <p:spPr>
+            <a:xfrm>
+              <a:off x="2516402" y="1730042"/>
+              <a:ext cx="359256" cy="369332"/>
+            </a:xfrm>
+            <a:prstGeom prst="rect">
+              <a:avLst/>
+            </a:prstGeom>
+            <a:noFill/>
+          </p:spPr>
+          <p:txBody>
+            <a:bodyPr wrap="none" rtlCol="0">
+              <a:spAutoFit/>
+            </a:bodyPr>
+            <a:lstStyle/>
+            <a:p>
+              <a:r>
+                <a:rPr lang="en-US" dirty="0" smtClean="0"/>
+                <a:t>3’</a:t>
+              </a:r>
+              <a:endParaRPr lang="en-US" dirty="0"/>
+            </a:p>
+          </p:txBody>
+        </p:sp>
+        <p:sp>
+          <p:nvSpPr>
+            <p:cNvPr id="79" name="TextBox 78"/>
+            <p:cNvSpPr txBox="1"/>
+            <p:nvPr/>
+          </p:nvSpPr>
+          <p:spPr>
+            <a:xfrm>
+              <a:off x="2216780" y="2145314"/>
+              <a:ext cx="359256" cy="369332"/>
+            </a:xfrm>
+            <a:prstGeom prst="rect">
+              <a:avLst/>
+            </a:prstGeom>
+            <a:noFill/>
+          </p:spPr>
+          <p:txBody>
+            <a:bodyPr wrap="none" rtlCol="0">
+              <a:spAutoFit/>
+            </a:bodyPr>
+            <a:lstStyle/>
+            <a:p>
+              <a:r>
+                <a:rPr lang="en-US" dirty="0" smtClean="0"/>
+                <a:t>4’</a:t>
+              </a:r>
+              <a:endParaRPr lang="en-US" dirty="0"/>
+            </a:p>
+          </p:txBody>
+        </p:sp>
+        <p:sp>
+          <p:nvSpPr>
+            <p:cNvPr id="80" name="TextBox 79"/>
+            <p:cNvSpPr txBox="1"/>
+            <p:nvPr/>
+          </p:nvSpPr>
+          <p:spPr>
+            <a:xfrm>
+              <a:off x="2087520" y="1631555"/>
+              <a:ext cx="359256" cy="369332"/>
+            </a:xfrm>
+            <a:prstGeom prst="rect">
+              <a:avLst/>
+            </a:prstGeom>
+            <a:noFill/>
+          </p:spPr>
+          <p:txBody>
+            <a:bodyPr wrap="none" rtlCol="0">
+              <a:spAutoFit/>
+            </a:bodyPr>
+            <a:lstStyle/>
+            <a:p>
+              <a:r>
+                <a:rPr lang="en-US" dirty="0" smtClean="0"/>
+                <a:t>5’</a:t>
+              </a:r>
+              <a:endParaRPr lang="en-US" dirty="0"/>
+            </a:p>
+          </p:txBody>
+        </p:sp>
+        <p:sp>
+          <p:nvSpPr>
+            <p:cNvPr id="81" name="TextBox 80"/>
+            <p:cNvSpPr txBox="1"/>
+            <p:nvPr/>
+          </p:nvSpPr>
+          <p:spPr>
+            <a:xfrm>
+              <a:off x="5061447" y="924437"/>
+              <a:ext cx="301660" cy="369332"/>
+            </a:xfrm>
+            <a:prstGeom prst="rect">
+              <a:avLst/>
+            </a:prstGeom>
+            <a:noFill/>
+          </p:spPr>
+          <p:txBody>
+            <a:bodyPr wrap="none" rtlCol="0">
+              <a:spAutoFit/>
+            </a:bodyPr>
+            <a:lstStyle/>
+            <a:p>
+              <a:r>
+                <a:rPr lang="en-US" dirty="0"/>
+                <a:t>2</a:t>
+              </a:r>
+              <a:endParaRPr lang="en-US" dirty="0"/>
+            </a:p>
+          </p:txBody>
+        </p:sp>
+        <p:sp>
+          <p:nvSpPr>
+            <p:cNvPr id="82" name="TextBox 81"/>
+            <p:cNvSpPr txBox="1"/>
+            <p:nvPr/>
+          </p:nvSpPr>
+          <p:spPr>
+            <a:xfrm>
+              <a:off x="4656885" y="1814972"/>
+              <a:ext cx="301660" cy="369332"/>
+            </a:xfrm>
+            <a:prstGeom prst="rect">
+              <a:avLst/>
+            </a:prstGeom>
+            <a:noFill/>
+          </p:spPr>
+          <p:txBody>
+            <a:bodyPr wrap="none" rtlCol="0">
+              <a:spAutoFit/>
+            </a:bodyPr>
+            <a:lstStyle/>
+            <a:p>
+              <a:r>
+                <a:rPr lang="en-US" dirty="0" smtClean="0"/>
+                <a:t>3</a:t>
+              </a:r>
+              <a:endParaRPr lang="en-US" dirty="0"/>
+            </a:p>
+          </p:txBody>
+        </p:sp>
+        <p:sp>
+          <p:nvSpPr>
+            <p:cNvPr id="83" name="TextBox 82"/>
+            <p:cNvSpPr txBox="1"/>
+            <p:nvPr/>
+          </p:nvSpPr>
+          <p:spPr>
+            <a:xfrm>
+              <a:off x="5896930" y="2156604"/>
+              <a:ext cx="359256" cy="369332"/>
+            </a:xfrm>
+            <a:prstGeom prst="rect">
+              <a:avLst/>
+            </a:prstGeom>
+            <a:noFill/>
+          </p:spPr>
+          <p:txBody>
+            <a:bodyPr wrap="none" rtlCol="0">
+              <a:spAutoFit/>
+            </a:bodyPr>
+            <a:lstStyle/>
+            <a:p>
+              <a:r>
+                <a:rPr lang="en-US" dirty="0" smtClean="0"/>
+                <a:t>4’</a:t>
+              </a:r>
+              <a:endParaRPr lang="en-US" dirty="0"/>
+            </a:p>
+          </p:txBody>
+        </p:sp>
+        <p:sp>
+          <p:nvSpPr>
+            <p:cNvPr id="85" name="TextBox 84"/>
+            <p:cNvSpPr txBox="1"/>
+            <p:nvPr/>
+          </p:nvSpPr>
+          <p:spPr>
+            <a:xfrm>
+              <a:off x="5725337" y="1642845"/>
+              <a:ext cx="359256" cy="369332"/>
+            </a:xfrm>
+            <a:prstGeom prst="rect">
+              <a:avLst/>
+            </a:prstGeom>
+            <a:noFill/>
+          </p:spPr>
+          <p:txBody>
+            <a:bodyPr wrap="none" rtlCol="0">
+              <a:spAutoFit/>
+            </a:bodyPr>
+            <a:lstStyle/>
+            <a:p>
+              <a:r>
+                <a:rPr lang="en-US" dirty="0" smtClean="0"/>
+                <a:t>5’</a:t>
+              </a:r>
+              <a:endParaRPr lang="en-US" dirty="0"/>
+            </a:p>
+          </p:txBody>
+        </p:sp>
+        <p:sp>
+          <p:nvSpPr>
+            <p:cNvPr id="86" name="TextBox 85"/>
+            <p:cNvSpPr txBox="1"/>
+            <p:nvPr/>
+          </p:nvSpPr>
+          <p:spPr>
+            <a:xfrm>
+              <a:off x="10339074" y="2026784"/>
+              <a:ext cx="359256" cy="369332"/>
+            </a:xfrm>
+            <a:prstGeom prst="rect">
+              <a:avLst/>
+            </a:prstGeom>
+            <a:noFill/>
+          </p:spPr>
+          <p:txBody>
+            <a:bodyPr wrap="none" rtlCol="0">
+              <a:spAutoFit/>
+            </a:bodyPr>
+            <a:lstStyle/>
+            <a:p>
+              <a:r>
+                <a:rPr lang="en-US" dirty="0" smtClean="0"/>
+                <a:t>4’</a:t>
+              </a:r>
+              <a:endParaRPr lang="en-US" dirty="0"/>
+            </a:p>
+          </p:txBody>
+        </p:sp>
+        <p:sp>
+          <p:nvSpPr>
+            <p:cNvPr id="87" name="TextBox 86"/>
+            <p:cNvSpPr txBox="1"/>
+            <p:nvPr/>
+          </p:nvSpPr>
+          <p:spPr>
+            <a:xfrm>
+              <a:off x="10167481" y="1513025"/>
+              <a:ext cx="359256" cy="369332"/>
+            </a:xfrm>
+            <a:prstGeom prst="rect">
+              <a:avLst/>
+            </a:prstGeom>
+            <a:noFill/>
+          </p:spPr>
+          <p:txBody>
+            <a:bodyPr wrap="none" rtlCol="0">
+              <a:spAutoFit/>
+            </a:bodyPr>
+            <a:lstStyle/>
+            <a:p>
+              <a:r>
+                <a:rPr lang="en-US" dirty="0" smtClean="0"/>
+                <a:t>5’</a:t>
+              </a:r>
+              <a:endParaRPr lang="en-US" dirty="0"/>
             </a:p>
           </p:txBody>
         </p:sp>

</xml_diff>